<commit_message>
update spacex example: add landing pads data
</commit_message>
<xml_diff>
--- a/spacex_example/spacex_template.pptx
+++ b/spacex_example/spacex_template.pptx
@@ -15,16 +15,19 @@
     <p:sldId id="260" r:id="rId10"/>
     <p:sldId id="261" r:id="rId11"/>
     <p:sldId id="262" r:id="rId12"/>
+    <p:sldId id="263" r:id="rId13"/>
+    <p:sldId id="264" r:id="rId14"/>
+    <p:sldId id="265" r:id="rId15"/>
   </p:sldIdLst>
   <p:sldSz cy="5143500" cx="9144000"/>
   <p:notesSz cx="6858000" cy="9144000"/>
   <p:embeddedFontLst>
     <p:embeddedFont>
       <p:font typeface="Nunito"/>
-      <p:regular r:id="rId13"/>
-      <p:bold r:id="rId14"/>
-      <p:italic r:id="rId15"/>
-      <p:boldItalic r:id="rId16"/>
+      <p:regular r:id="rId16"/>
+      <p:bold r:id="rId17"/>
+      <p:italic r:id="rId18"/>
+      <p:boldItalic r:id="rId19"/>
     </p:embeddedFont>
   </p:embeddedFontLst>
   <p:defaultTextStyle>
@@ -800,12 +803,12 @@
 </p:notes>
 </file>
 
-<file path=ppt/notesSlides/notesSlide2.xml><?xml version="1.0" encoding="utf-8"?>
+<file path=ppt/notesSlides/notesSlide10.xml><?xml version="1.0" encoding="utf-8"?>
 <p:notes xmlns:a="http://schemas.openxmlformats.org/drawingml/2006/main" xmlns:r="http://schemas.openxmlformats.org/officeDocument/2006/relationships" xmlns:mc="http://schemas.openxmlformats.org/markup-compatibility/2006" xmlns:mv="urn:schemas-microsoft-com:mac:vml" xmlns:p="http://schemas.openxmlformats.org/presentationml/2006/main" xmlns:c="http://schemas.openxmlformats.org/drawingml/2006/chart" xmlns:dgm="http://schemas.openxmlformats.org/drawingml/2006/diagram" xmlns:o="urn:schemas-microsoft-com:office:office" xmlns:v="urn:schemas-microsoft-com:vml" xmlns:pvml="urn:schemas-microsoft-com:office:powerpoint" xmlns:com="http://schemas.openxmlformats.org/drawingml/2006/compatibility" xmlns:p14="http://schemas.microsoft.com/office/powerpoint/2010/main" xmlns:p15="http://schemas.microsoft.com/office/powerpoint/2012/main" xmlns:ahyp="http://schemas.microsoft.com/office/drawing/2018/hyperlinkcolor" showMasterPhAnim="0" showMasterSp="0">
   <p:cSld>
     <p:spTree>
       <p:nvGrpSpPr>
-        <p:cNvPr id="130" name="Shape 130"/>
+        <p:cNvPr id="181" name="Shape 181"/>
         <p:cNvGrpSpPr/>
         <p:nvPr/>
       </p:nvGrpSpPr>
@@ -819,7 +822,7 @@
       </p:grpSpPr>
       <p:sp>
         <p:nvSpPr>
-          <p:cNvPr id="131" name="Google Shape;131;ge49eb32b0a_0_244:notes"/>
+          <p:cNvPr id="182" name="Google Shape;182;ge49eb32b0a_0_264:notes"/>
           <p:cNvSpPr/>
           <p:nvPr>
             <p:ph idx="2" type="sldImg"/>
@@ -854,7 +857,106 @@
       </p:sp>
       <p:sp>
         <p:nvSpPr>
-          <p:cNvPr id="132" name="Google Shape;132;ge49eb32b0a_0_244:notes"/>
+          <p:cNvPr id="183" name="Google Shape;183;ge49eb32b0a_0_264:notes"/>
+          <p:cNvSpPr txBox="1"/>
+          <p:nvPr>
+            <p:ph idx="1" type="body"/>
+          </p:nvPr>
+        </p:nvSpPr>
+        <p:spPr>
+          <a:xfrm>
+            <a:off x="685800" y="4343400"/>
+            <a:ext cx="5486400" cy="4114800"/>
+          </a:xfrm>
+          <a:prstGeom prst="rect">
+            <a:avLst/>
+          </a:prstGeom>
+        </p:spPr>
+        <p:txBody>
+          <a:bodyPr anchorCtr="0" anchor="t" bIns="91425" lIns="91425" spcFirstLastPara="1" rIns="91425" wrap="square" tIns="91425">
+            <a:noAutofit/>
+          </a:bodyPr>
+          <a:lstStyle/>
+          <a:p>
+            <a:pPr indent="0" lvl="0" marL="0" rtl="0" algn="l">
+              <a:spcBef>
+                <a:spcPts val="0"/>
+              </a:spcBef>
+              <a:spcAft>
+                <a:spcPts val="0"/>
+              </a:spcAft>
+              <a:buNone/>
+            </a:pPr>
+            <a:r>
+              <a:t/>
+            </a:r>
+            <a:endParaRPr/>
+          </a:p>
+        </p:txBody>
+      </p:sp>
+    </p:spTree>
+  </p:cSld>
+  <p:clrMapOvr>
+    <a:masterClrMapping/>
+  </p:clrMapOvr>
+</p:notes>
+</file>
+
+<file path=ppt/notesSlides/notesSlide2.xml><?xml version="1.0" encoding="utf-8"?>
+<p:notes xmlns:a="http://schemas.openxmlformats.org/drawingml/2006/main" xmlns:r="http://schemas.openxmlformats.org/officeDocument/2006/relationships" xmlns:mc="http://schemas.openxmlformats.org/markup-compatibility/2006" xmlns:mv="urn:schemas-microsoft-com:mac:vml" xmlns:p="http://schemas.openxmlformats.org/presentationml/2006/main" xmlns:c="http://schemas.openxmlformats.org/drawingml/2006/chart" xmlns:dgm="http://schemas.openxmlformats.org/drawingml/2006/diagram" xmlns:o="urn:schemas-microsoft-com:office:office" xmlns:v="urn:schemas-microsoft-com:vml" xmlns:pvml="urn:schemas-microsoft-com:office:powerpoint" xmlns:com="http://schemas.openxmlformats.org/drawingml/2006/compatibility" xmlns:p14="http://schemas.microsoft.com/office/powerpoint/2010/main" xmlns:p15="http://schemas.microsoft.com/office/powerpoint/2012/main" xmlns:ahyp="http://schemas.microsoft.com/office/drawing/2018/hyperlinkcolor" showMasterPhAnim="0" showMasterSp="0">
+  <p:cSld>
+    <p:spTree>
+      <p:nvGrpSpPr>
+        <p:cNvPr id="130" name="Shape 130"/>
+        <p:cNvGrpSpPr/>
+        <p:nvPr/>
+      </p:nvGrpSpPr>
+      <p:grpSpPr>
+        <a:xfrm>
+          <a:off x="0" y="0"/>
+          <a:ext cx="0" cy="0"/>
+          <a:chOff x="0" y="0"/>
+          <a:chExt cx="0" cy="0"/>
+        </a:xfrm>
+      </p:grpSpPr>
+      <p:sp>
+        <p:nvSpPr>
+          <p:cNvPr id="131" name="Google Shape;131;ge4bd750958_0_5:notes"/>
+          <p:cNvSpPr/>
+          <p:nvPr>
+            <p:ph idx="2" type="sldImg"/>
+          </p:nvPr>
+        </p:nvSpPr>
+        <p:spPr>
+          <a:xfrm>
+            <a:off x="381300" y="685800"/>
+            <a:ext cx="6096000" cy="3429000"/>
+          </a:xfrm>
+          <a:custGeom>
+            <a:rect b="b" l="l" r="r" t="t"/>
+            <a:pathLst>
+              <a:path extrusionOk="0" h="120000" w="120000">
+                <a:moveTo>
+                  <a:pt x="0" y="0"/>
+                </a:moveTo>
+                <a:lnTo>
+                  <a:pt x="120000" y="0"/>
+                </a:lnTo>
+                <a:lnTo>
+                  <a:pt x="120000" y="120000"/>
+                </a:lnTo>
+                <a:lnTo>
+                  <a:pt x="0" y="120000"/>
+                </a:lnTo>
+                <a:close/>
+              </a:path>
+            </a:pathLst>
+          </a:custGeom>
+        </p:spPr>
+      </p:sp>
+      <p:sp>
+        <p:nvSpPr>
+          <p:cNvPr id="132" name="Google Shape;132;ge4bd750958_0_5:notes"/>
           <p:cNvSpPr txBox="1"/>
           <p:nvPr>
             <p:ph idx="1" type="body"/>
@@ -918,7 +1020,7 @@
       </p:grpSpPr>
       <p:sp>
         <p:nvSpPr>
-          <p:cNvPr id="137" name="Google Shape;137;ge49eb32b0a_0_259:notes"/>
+          <p:cNvPr id="137" name="Google Shape;137;ge49eb32b0a_0_244:notes"/>
           <p:cNvSpPr/>
           <p:nvPr>
             <p:ph idx="2" type="sldImg"/>
@@ -953,7 +1055,7 @@
       </p:sp>
       <p:sp>
         <p:nvSpPr>
-          <p:cNvPr id="138" name="Google Shape;138;ge49eb32b0a_0_259:notes"/>
+          <p:cNvPr id="138" name="Google Shape;138;ge49eb32b0a_0_244:notes"/>
           <p:cNvSpPr txBox="1"/>
           <p:nvPr>
             <p:ph idx="1" type="body"/>
@@ -1003,7 +1105,7 @@
   <p:cSld>
     <p:spTree>
       <p:nvGrpSpPr>
-        <p:cNvPr id="143" name="Shape 143"/>
+        <p:cNvPr id="142" name="Shape 142"/>
         <p:cNvGrpSpPr/>
         <p:nvPr/>
       </p:nvGrpSpPr>
@@ -1017,7 +1119,7 @@
       </p:grpSpPr>
       <p:sp>
         <p:nvSpPr>
-          <p:cNvPr id="144" name="Google Shape;144;ge49eb32b0a_0_249:notes"/>
+          <p:cNvPr id="143" name="Google Shape;143;ge49eb32b0a_0_259:notes"/>
           <p:cNvSpPr/>
           <p:nvPr>
             <p:ph idx="2" type="sldImg"/>
@@ -1052,7 +1154,7 @@
       </p:sp>
       <p:sp>
         <p:nvSpPr>
-          <p:cNvPr id="145" name="Google Shape;145;ge49eb32b0a_0_249:notes"/>
+          <p:cNvPr id="144" name="Google Shape;144;ge49eb32b0a_0_259:notes"/>
           <p:cNvSpPr txBox="1"/>
           <p:nvPr>
             <p:ph idx="1" type="body"/>
@@ -1116,7 +1218,7 @@
       </p:grpSpPr>
       <p:sp>
         <p:nvSpPr>
-          <p:cNvPr id="150" name="Google Shape;150;ge49eb32b0a_0_264:notes"/>
+          <p:cNvPr id="150" name="Google Shape;150;ge49eb32b0a_0_254:notes"/>
           <p:cNvSpPr/>
           <p:nvPr>
             <p:ph idx="2" type="sldImg"/>
@@ -1151,7 +1253,7 @@
       </p:sp>
       <p:sp>
         <p:nvSpPr>
-          <p:cNvPr id="151" name="Google Shape;151;ge49eb32b0a_0_264:notes"/>
+          <p:cNvPr id="151" name="Google Shape;151;ge49eb32b0a_0_254:notes"/>
           <p:cNvSpPr txBox="1"/>
           <p:nvPr>
             <p:ph idx="1" type="body"/>
@@ -1201,7 +1303,7 @@
   <p:cSld>
     <p:spTree>
       <p:nvGrpSpPr>
-        <p:cNvPr id="156" name="Shape 156"/>
+        <p:cNvPr id="155" name="Shape 155"/>
         <p:cNvGrpSpPr/>
         <p:nvPr/>
       </p:nvGrpSpPr>
@@ -1215,7 +1317,7 @@
       </p:grpSpPr>
       <p:sp>
         <p:nvSpPr>
-          <p:cNvPr id="157" name="Google Shape;157;ge49eb32b0a_0_254:notes"/>
+          <p:cNvPr id="156" name="Google Shape;156;ge49eb32b0a_0_269:notes"/>
           <p:cNvSpPr/>
           <p:nvPr>
             <p:ph idx="2" type="sldImg"/>
@@ -1250,7 +1352,7 @@
       </p:sp>
       <p:sp>
         <p:nvSpPr>
-          <p:cNvPr id="158" name="Google Shape;158;ge49eb32b0a_0_254:notes"/>
+          <p:cNvPr id="157" name="Google Shape;157;ge49eb32b0a_0_269:notes"/>
           <p:cNvSpPr txBox="1"/>
           <p:nvPr>
             <p:ph idx="1" type="body"/>
@@ -1314,7 +1416,7 @@
       </p:grpSpPr>
       <p:sp>
         <p:nvSpPr>
-          <p:cNvPr id="163" name="Google Shape;163;ge49eb32b0a_0_269:notes"/>
+          <p:cNvPr id="163" name="Google Shape;163;ge4bd750958_0_10:notes"/>
           <p:cNvSpPr/>
           <p:nvPr>
             <p:ph idx="2" type="sldImg"/>
@@ -1349,7 +1451,205 @@
       </p:sp>
       <p:sp>
         <p:nvSpPr>
-          <p:cNvPr id="164" name="Google Shape;164;ge49eb32b0a_0_269:notes"/>
+          <p:cNvPr id="164" name="Google Shape;164;ge4bd750958_0_10:notes"/>
+          <p:cNvSpPr txBox="1"/>
+          <p:nvPr>
+            <p:ph idx="1" type="body"/>
+          </p:nvPr>
+        </p:nvSpPr>
+        <p:spPr>
+          <a:xfrm>
+            <a:off x="685800" y="4343400"/>
+            <a:ext cx="5486400" cy="4114800"/>
+          </a:xfrm>
+          <a:prstGeom prst="rect">
+            <a:avLst/>
+          </a:prstGeom>
+        </p:spPr>
+        <p:txBody>
+          <a:bodyPr anchorCtr="0" anchor="t" bIns="91425" lIns="91425" spcFirstLastPara="1" rIns="91425" wrap="square" tIns="91425">
+            <a:noAutofit/>
+          </a:bodyPr>
+          <a:lstStyle/>
+          <a:p>
+            <a:pPr indent="0" lvl="0" marL="0" rtl="0" algn="l">
+              <a:spcBef>
+                <a:spcPts val="0"/>
+              </a:spcBef>
+              <a:spcAft>
+                <a:spcPts val="0"/>
+              </a:spcAft>
+              <a:buNone/>
+            </a:pPr>
+            <a:r>
+              <a:t/>
+            </a:r>
+            <a:endParaRPr/>
+          </a:p>
+        </p:txBody>
+      </p:sp>
+    </p:spTree>
+  </p:cSld>
+  <p:clrMapOvr>
+    <a:masterClrMapping/>
+  </p:clrMapOvr>
+</p:notes>
+</file>
+
+<file path=ppt/notesSlides/notesSlide8.xml><?xml version="1.0" encoding="utf-8"?>
+<p:notes xmlns:a="http://schemas.openxmlformats.org/drawingml/2006/main" xmlns:r="http://schemas.openxmlformats.org/officeDocument/2006/relationships" xmlns:mc="http://schemas.openxmlformats.org/markup-compatibility/2006" xmlns:mv="urn:schemas-microsoft-com:mac:vml" xmlns:p="http://schemas.openxmlformats.org/presentationml/2006/main" xmlns:c="http://schemas.openxmlformats.org/drawingml/2006/chart" xmlns:dgm="http://schemas.openxmlformats.org/drawingml/2006/diagram" xmlns:o="urn:schemas-microsoft-com:office:office" xmlns:v="urn:schemas-microsoft-com:vml" xmlns:pvml="urn:schemas-microsoft-com:office:powerpoint" xmlns:com="http://schemas.openxmlformats.org/drawingml/2006/compatibility" xmlns:p14="http://schemas.microsoft.com/office/powerpoint/2010/main" xmlns:p15="http://schemas.microsoft.com/office/powerpoint/2012/main" xmlns:ahyp="http://schemas.microsoft.com/office/drawing/2018/hyperlinkcolor" showMasterPhAnim="0" showMasterSp="0">
+  <p:cSld>
+    <p:spTree>
+      <p:nvGrpSpPr>
+        <p:cNvPr id="168" name="Shape 168"/>
+        <p:cNvGrpSpPr/>
+        <p:nvPr/>
+      </p:nvGrpSpPr>
+      <p:grpSpPr>
+        <a:xfrm>
+          <a:off x="0" y="0"/>
+          <a:ext cx="0" cy="0"/>
+          <a:chOff x="0" y="0"/>
+          <a:chExt cx="0" cy="0"/>
+        </a:xfrm>
+      </p:grpSpPr>
+      <p:sp>
+        <p:nvSpPr>
+          <p:cNvPr id="169" name="Google Shape;169;ge4bd750958_0_26:notes"/>
+          <p:cNvSpPr/>
+          <p:nvPr>
+            <p:ph idx="2" type="sldImg"/>
+          </p:nvPr>
+        </p:nvSpPr>
+        <p:spPr>
+          <a:xfrm>
+            <a:off x="381300" y="685800"/>
+            <a:ext cx="6096000" cy="3429000"/>
+          </a:xfrm>
+          <a:custGeom>
+            <a:rect b="b" l="l" r="r" t="t"/>
+            <a:pathLst>
+              <a:path extrusionOk="0" h="120000" w="120000">
+                <a:moveTo>
+                  <a:pt x="0" y="0"/>
+                </a:moveTo>
+                <a:lnTo>
+                  <a:pt x="120000" y="0"/>
+                </a:lnTo>
+                <a:lnTo>
+                  <a:pt x="120000" y="120000"/>
+                </a:lnTo>
+                <a:lnTo>
+                  <a:pt x="0" y="120000"/>
+                </a:lnTo>
+                <a:close/>
+              </a:path>
+            </a:pathLst>
+          </a:custGeom>
+        </p:spPr>
+      </p:sp>
+      <p:sp>
+        <p:nvSpPr>
+          <p:cNvPr id="170" name="Google Shape;170;ge4bd750958_0_26:notes"/>
+          <p:cNvSpPr txBox="1"/>
+          <p:nvPr>
+            <p:ph idx="1" type="body"/>
+          </p:nvPr>
+        </p:nvSpPr>
+        <p:spPr>
+          <a:xfrm>
+            <a:off x="685800" y="4343400"/>
+            <a:ext cx="5486400" cy="4114800"/>
+          </a:xfrm>
+          <a:prstGeom prst="rect">
+            <a:avLst/>
+          </a:prstGeom>
+        </p:spPr>
+        <p:txBody>
+          <a:bodyPr anchorCtr="0" anchor="t" bIns="91425" lIns="91425" spcFirstLastPara="1" rIns="91425" wrap="square" tIns="91425">
+            <a:noAutofit/>
+          </a:bodyPr>
+          <a:lstStyle/>
+          <a:p>
+            <a:pPr indent="0" lvl="0" marL="0" rtl="0" algn="l">
+              <a:spcBef>
+                <a:spcPts val="0"/>
+              </a:spcBef>
+              <a:spcAft>
+                <a:spcPts val="0"/>
+              </a:spcAft>
+              <a:buNone/>
+            </a:pPr>
+            <a:r>
+              <a:t/>
+            </a:r>
+            <a:endParaRPr/>
+          </a:p>
+        </p:txBody>
+      </p:sp>
+    </p:spTree>
+  </p:cSld>
+  <p:clrMapOvr>
+    <a:masterClrMapping/>
+  </p:clrMapOvr>
+</p:notes>
+</file>
+
+<file path=ppt/notesSlides/notesSlide9.xml><?xml version="1.0" encoding="utf-8"?>
+<p:notes xmlns:a="http://schemas.openxmlformats.org/drawingml/2006/main" xmlns:r="http://schemas.openxmlformats.org/officeDocument/2006/relationships" xmlns:mc="http://schemas.openxmlformats.org/markup-compatibility/2006" xmlns:mv="urn:schemas-microsoft-com:mac:vml" xmlns:p="http://schemas.openxmlformats.org/presentationml/2006/main" xmlns:c="http://schemas.openxmlformats.org/drawingml/2006/chart" xmlns:dgm="http://schemas.openxmlformats.org/drawingml/2006/diagram" xmlns:o="urn:schemas-microsoft-com:office:office" xmlns:v="urn:schemas-microsoft-com:vml" xmlns:pvml="urn:schemas-microsoft-com:office:powerpoint" xmlns:com="http://schemas.openxmlformats.org/drawingml/2006/compatibility" xmlns:p14="http://schemas.microsoft.com/office/powerpoint/2010/main" xmlns:p15="http://schemas.microsoft.com/office/powerpoint/2012/main" xmlns:ahyp="http://schemas.microsoft.com/office/drawing/2018/hyperlinkcolor" showMasterPhAnim="0" showMasterSp="0">
+  <p:cSld>
+    <p:spTree>
+      <p:nvGrpSpPr>
+        <p:cNvPr id="175" name="Shape 175"/>
+        <p:cNvGrpSpPr/>
+        <p:nvPr/>
+      </p:nvGrpSpPr>
+      <p:grpSpPr>
+        <a:xfrm>
+          <a:off x="0" y="0"/>
+          <a:ext cx="0" cy="0"/>
+          <a:chOff x="0" y="0"/>
+          <a:chExt cx="0" cy="0"/>
+        </a:xfrm>
+      </p:grpSpPr>
+      <p:sp>
+        <p:nvSpPr>
+          <p:cNvPr id="176" name="Google Shape;176;ge49eb32b0a_0_249:notes"/>
+          <p:cNvSpPr/>
+          <p:nvPr>
+            <p:ph idx="2" type="sldImg"/>
+          </p:nvPr>
+        </p:nvSpPr>
+        <p:spPr>
+          <a:xfrm>
+            <a:off x="381300" y="685800"/>
+            <a:ext cx="6096000" cy="3429000"/>
+          </a:xfrm>
+          <a:custGeom>
+            <a:rect b="b" l="l" r="r" t="t"/>
+            <a:pathLst>
+              <a:path extrusionOk="0" h="120000" w="120000">
+                <a:moveTo>
+                  <a:pt x="0" y="0"/>
+                </a:moveTo>
+                <a:lnTo>
+                  <a:pt x="120000" y="0"/>
+                </a:lnTo>
+                <a:lnTo>
+                  <a:pt x="120000" y="120000"/>
+                </a:lnTo>
+                <a:lnTo>
+                  <a:pt x="0" y="120000"/>
+                </a:lnTo>
+                <a:close/>
+              </a:path>
+            </a:pathLst>
+          </a:custGeom>
+        </p:spPr>
+      </p:sp>
+      <p:sp>
+        <p:nvSpPr>
+          <p:cNvPr id="177" name="Google Shape;177;ge49eb32b0a_0_249:notes"/>
           <p:cNvSpPr txBox="1"/>
           <p:nvPr>
             <p:ph idx="1" type="body"/>
@@ -9516,7 +9816,7 @@
             </a:pPr>
             <a:r>
               <a:rPr lang="nl"/>
-              <a:t>{main_title}</a:t>
+              <a:t>SpaceX</a:t>
             </a:r>
             <a:endParaRPr/>
           </a:p>
@@ -9557,6 +9857,220 @@
             <a:r>
               <a:rPr lang="nl"/>
               <a:t>{data_source}</a:t>
+            </a:r>
+            <a:endParaRPr/>
+          </a:p>
+        </p:txBody>
+      </p:sp>
+    </p:spTree>
+  </p:cSld>
+  <p:clrMapOvr>
+    <a:masterClrMapping/>
+  </p:clrMapOvr>
+</p:sld>
+</file>
+
+<file path=ppt/slides/slide10.xml><?xml version="1.0" encoding="utf-8"?>
+<p:sld xmlns:a="http://schemas.openxmlformats.org/drawingml/2006/main" xmlns:r="http://schemas.openxmlformats.org/officeDocument/2006/relationships" xmlns:mc="http://schemas.openxmlformats.org/markup-compatibility/2006" xmlns:mv="urn:schemas-microsoft-com:mac:vml" xmlns:p="http://schemas.openxmlformats.org/presentationml/2006/main" xmlns:c="http://schemas.openxmlformats.org/drawingml/2006/chart" xmlns:dgm="http://schemas.openxmlformats.org/drawingml/2006/diagram" xmlns:o="urn:schemas-microsoft-com:office:office" xmlns:v="urn:schemas-microsoft-com:vml" xmlns:pvml="urn:schemas-microsoft-com:office:powerpoint" xmlns:com="http://schemas.openxmlformats.org/drawingml/2006/compatibility" xmlns:p14="http://schemas.microsoft.com/office/powerpoint/2010/main" xmlns:p15="http://schemas.microsoft.com/office/powerpoint/2012/main" xmlns:ahyp="http://schemas.microsoft.com/office/drawing/2018/hyperlinkcolor">
+  <p:cSld>
+    <p:spTree>
+      <p:nvGrpSpPr>
+        <p:cNvPr id="184" name="Shape 184"/>
+        <p:cNvGrpSpPr/>
+        <p:nvPr/>
+      </p:nvGrpSpPr>
+      <p:grpSpPr>
+        <a:xfrm>
+          <a:off x="0" y="0"/>
+          <a:ext cx="0" cy="0"/>
+          <a:chOff x="0" y="0"/>
+          <a:chExt cx="0" cy="0"/>
+        </a:xfrm>
+      </p:grpSpPr>
+      <p:sp>
+        <p:nvSpPr>
+          <p:cNvPr id="185" name="Google Shape;185;p22"/>
+          <p:cNvSpPr txBox="1"/>
+          <p:nvPr>
+            <p:ph type="title"/>
+          </p:nvPr>
+        </p:nvSpPr>
+        <p:spPr>
+          <a:xfrm>
+            <a:off x="819150" y="845600"/>
+            <a:ext cx="7505700" cy="954600"/>
+          </a:xfrm>
+          <a:prstGeom prst="rect">
+            <a:avLst/>
+          </a:prstGeom>
+        </p:spPr>
+        <p:txBody>
+          <a:bodyPr anchorCtr="0" anchor="t" bIns="91425" lIns="91425" spcFirstLastPara="1" rIns="91425" wrap="square" tIns="91425">
+            <a:normAutofit/>
+          </a:bodyPr>
+          <a:lstStyle/>
+          <a:p>
+            <a:pPr indent="0" lvl="0" marL="0" rtl="0" algn="l">
+              <a:spcBef>
+                <a:spcPts val="0"/>
+              </a:spcBef>
+              <a:spcAft>
+                <a:spcPts val="0"/>
+              </a:spcAft>
+              <a:buNone/>
+            </a:pPr>
+            <a:r>
+              <a:rPr lang="nl"/>
+              <a:t>{!ships}Ship: {name}</a:t>
+            </a:r>
+            <a:endParaRPr/>
+          </a:p>
+        </p:txBody>
+      </p:sp>
+      <p:sp>
+        <p:nvSpPr>
+          <p:cNvPr id="186" name="Google Shape;186;p22"/>
+          <p:cNvSpPr txBox="1"/>
+          <p:nvPr>
+            <p:ph idx="1" type="body"/>
+          </p:nvPr>
+        </p:nvSpPr>
+        <p:spPr>
+          <a:xfrm>
+            <a:off x="819150" y="1990725"/>
+            <a:ext cx="3753000" cy="2448000"/>
+          </a:xfrm>
+          <a:prstGeom prst="rect">
+            <a:avLst/>
+          </a:prstGeom>
+        </p:spPr>
+        <p:txBody>
+          <a:bodyPr anchorCtr="0" anchor="t" bIns="91425" lIns="91425" spcFirstLastPara="1" rIns="91425" wrap="square" tIns="91425">
+            <a:normAutofit/>
+          </a:bodyPr>
+          <a:lstStyle/>
+          <a:p>
+            <a:pPr indent="-311150" lvl="0" marL="457200" rtl="0" algn="l">
+              <a:spcBef>
+                <a:spcPts val="0"/>
+              </a:spcBef>
+              <a:spcAft>
+                <a:spcPts val="0"/>
+              </a:spcAft>
+              <a:buSzPts val="1300"/>
+              <a:buChar char="●"/>
+            </a:pPr>
+            <a:r>
+              <a:rPr lang="nl"/>
+              <a:t>Roles: </a:t>
+            </a:r>
+            <a:endParaRPr/>
+          </a:p>
+          <a:p>
+            <a:pPr indent="-298450" lvl="1" marL="914400" rtl="0" algn="l">
+              <a:spcBef>
+                <a:spcPts val="0"/>
+              </a:spcBef>
+              <a:spcAft>
+                <a:spcPts val="0"/>
+              </a:spcAft>
+              <a:buSzPts val="1100"/>
+              <a:buChar char="○"/>
+            </a:pPr>
+            <a:r>
+              <a:rPr lang="nl"/>
+              <a:t>{#roles}{.}</a:t>
+            </a:r>
+            <a:endParaRPr/>
+          </a:p>
+          <a:p>
+            <a:pPr indent="-298450" lvl="1" marL="914400" rtl="0" algn="l">
+              <a:spcBef>
+                <a:spcPts val="0"/>
+              </a:spcBef>
+              <a:spcAft>
+                <a:spcPts val="0"/>
+              </a:spcAft>
+              <a:buSzPts val="1100"/>
+              <a:buChar char="○"/>
+            </a:pPr>
+            <a:r>
+              <a:rPr lang="nl"/>
+              <a:t>{/roles}</a:t>
+            </a:r>
+            <a:endParaRPr/>
+          </a:p>
+          <a:p>
+            <a:pPr indent="-311150" lvl="0" marL="457200" rtl="0" algn="l">
+              <a:spcBef>
+                <a:spcPts val="0"/>
+              </a:spcBef>
+              <a:spcAft>
+                <a:spcPts val="0"/>
+              </a:spcAft>
+              <a:buSzPts val="1300"/>
+              <a:buChar char="●"/>
+            </a:pPr>
+            <a:r>
+              <a:rPr lang="nl"/>
+              <a:t>Home port: {home_port}</a:t>
+            </a:r>
+            <a:endParaRPr/>
+          </a:p>
+          <a:p>
+            <a:pPr indent="-311150" lvl="0" marL="457200" rtl="0" algn="l">
+              <a:spcBef>
+                <a:spcPts val="0"/>
+              </a:spcBef>
+              <a:spcAft>
+                <a:spcPts val="0"/>
+              </a:spcAft>
+              <a:buSzPts val="1300"/>
+              <a:buChar char="●"/>
+            </a:pPr>
+            <a:r>
+              <a:rPr lang="nl"/>
+              <a:t>Year built: {year_built}</a:t>
+            </a:r>
+            <a:endParaRPr/>
+          </a:p>
+        </p:txBody>
+      </p:sp>
+      <p:sp>
+        <p:nvSpPr>
+          <p:cNvPr id="187" name="Google Shape;187;p22"/>
+          <p:cNvSpPr txBox="1"/>
+          <p:nvPr>
+            <p:ph idx="1" type="body"/>
+          </p:nvPr>
+        </p:nvSpPr>
+        <p:spPr>
+          <a:xfrm>
+            <a:off x="4572150" y="1990725"/>
+            <a:ext cx="3753000" cy="2448000"/>
+          </a:xfrm>
+          <a:prstGeom prst="rect">
+            <a:avLst/>
+          </a:prstGeom>
+        </p:spPr>
+        <p:txBody>
+          <a:bodyPr anchorCtr="0" anchor="t" bIns="91425" lIns="91425" spcFirstLastPara="1" rIns="91425" wrap="square" tIns="91425">
+            <a:normAutofit/>
+          </a:bodyPr>
+          <a:lstStyle/>
+          <a:p>
+            <a:pPr indent="0" lvl="0" marL="0" rtl="0" algn="l">
+              <a:spcBef>
+                <a:spcPts val="0"/>
+              </a:spcBef>
+              <a:spcAft>
+                <a:spcPts val="1200"/>
+              </a:spcAft>
+              <a:buNone/>
+            </a:pPr>
+            <a:r>
+              <a:rPr lang="nl"/>
+              <a:t>{%image}</a:t>
             </a:r>
             <a:endParaRPr/>
           </a:p>
@@ -9621,7 +10135,7 @@
             </a:pPr>
             <a:r>
               <a:rPr lang="nl"/>
-              <a:t>Rockets</a:t>
+              <a:t>About SpaceX</a:t>
             </a:r>
             <a:endParaRPr/>
           </a:p>
@@ -9650,18 +10164,121 @@
           </a:bodyPr>
           <a:lstStyle/>
           <a:p>
-            <a:pPr indent="0" lvl="0" marL="0" rtl="0" algn="l">
-              <a:spcBef>
-                <a:spcPts val="0"/>
-              </a:spcBef>
-              <a:spcAft>
-                <a:spcPts val="1200"/>
-              </a:spcAft>
-              <a:buNone/>
+            <a:pPr indent="-311150" lvl="0" marL="457200" rtl="0" algn="l">
+              <a:spcBef>
+                <a:spcPts val="0"/>
+              </a:spcBef>
+              <a:spcAft>
+                <a:spcPts val="0"/>
+              </a:spcAft>
+              <a:buSzPts val="1300"/>
+              <a:buChar char="●"/>
             </a:pPr>
             <a:r>
               <a:rPr lang="nl"/>
-              <a:t>{rockets_description}</a:t>
+              <a:t>Description: {summary}</a:t>
+            </a:r>
+            <a:endParaRPr/>
+          </a:p>
+          <a:p>
+            <a:pPr indent="-311150" lvl="0" marL="457200" rtl="0" algn="l">
+              <a:spcBef>
+                <a:spcPts val="0"/>
+              </a:spcBef>
+              <a:spcAft>
+                <a:spcPts val="0"/>
+              </a:spcAft>
+              <a:buSzPts val="1300"/>
+              <a:buChar char="●"/>
+            </a:pPr>
+            <a:r>
+              <a:rPr lang="nl"/>
+              <a:t>Founder: {founder}</a:t>
+            </a:r>
+            <a:endParaRPr/>
+          </a:p>
+          <a:p>
+            <a:pPr indent="-311150" lvl="0" marL="457200" rtl="0" algn="l">
+              <a:spcBef>
+                <a:spcPts val="0"/>
+              </a:spcBef>
+              <a:spcAft>
+                <a:spcPts val="0"/>
+              </a:spcAft>
+              <a:buSzPts val="1300"/>
+              <a:buChar char="●"/>
+            </a:pPr>
+            <a:r>
+              <a:rPr lang="nl"/>
+              <a:t>Founded: {founded}</a:t>
+            </a:r>
+            <a:endParaRPr/>
+          </a:p>
+          <a:p>
+            <a:pPr indent="-311150" lvl="0" marL="457200" rtl="0" algn="l">
+              <a:spcBef>
+                <a:spcPts val="0"/>
+              </a:spcBef>
+              <a:spcAft>
+                <a:spcPts val="0"/>
+              </a:spcAft>
+              <a:buSzPts val="1300"/>
+              <a:buChar char="●"/>
+            </a:pPr>
+            <a:r>
+              <a:rPr lang="nl"/>
+              <a:t>Employees: {employees}</a:t>
+            </a:r>
+            <a:endParaRPr/>
+          </a:p>
+          <a:p>
+            <a:pPr indent="-311150" lvl="0" marL="457200" rtl="0" algn="l">
+              <a:spcBef>
+                <a:spcPts val="0"/>
+              </a:spcBef>
+              <a:spcAft>
+                <a:spcPts val="0"/>
+              </a:spcAft>
+              <a:buSzPts val="1300"/>
+              <a:buChar char="●"/>
+            </a:pPr>
+            <a:r>
+              <a:rPr lang="nl"/>
+              <a:t>Valuation: ${valuation}</a:t>
+            </a:r>
+            <a:endParaRPr/>
+          </a:p>
+          <a:p>
+            <a:pPr indent="-311150" lvl="0" marL="457200" rtl="0" algn="l">
+              <a:spcBef>
+                <a:spcPts val="0"/>
+              </a:spcBef>
+              <a:spcAft>
+                <a:spcPts val="0"/>
+              </a:spcAft>
+              <a:buSzPts val="1300"/>
+              <a:buChar char="●"/>
+            </a:pPr>
+            <a:r>
+              <a:rPr lang="nl"/>
+              <a:t>Headquarters: {headquarters.address}, {headquarters.city}, {headquarters.state}</a:t>
+            </a:r>
+            <a:endParaRPr/>
+          </a:p>
+          <a:p>
+            <a:pPr indent="-311150" lvl="0" marL="457200" rtl="0" algn="l">
+              <a:spcBef>
+                <a:spcPts val="0"/>
+              </a:spcBef>
+              <a:spcAft>
+                <a:spcPts val="0"/>
+              </a:spcAft>
+              <a:buSzPts val="1300"/>
+              <a:buChar char="●"/>
+            </a:pPr>
+            <a:r>
+              <a:rPr lang="nl"/>
+              <a:t>Website: {links.website}</a:t>
             </a:r>
             <a:endParaRPr/>
           </a:p>
@@ -9726,6 +10343,111 @@
             </a:pPr>
             <a:r>
               <a:rPr lang="nl"/>
+              <a:t>Rockets</a:t>
+            </a:r>
+            <a:endParaRPr/>
+          </a:p>
+        </p:txBody>
+      </p:sp>
+      <p:sp>
+        <p:nvSpPr>
+          <p:cNvPr id="141" name="Google Shape;141;p15"/>
+          <p:cNvSpPr txBox="1"/>
+          <p:nvPr>
+            <p:ph idx="1" type="body"/>
+          </p:nvPr>
+        </p:nvSpPr>
+        <p:spPr>
+          <a:xfrm>
+            <a:off x="819150" y="1990725"/>
+            <a:ext cx="7505700" cy="2448000"/>
+          </a:xfrm>
+          <a:prstGeom prst="rect">
+            <a:avLst/>
+          </a:prstGeom>
+        </p:spPr>
+        <p:txBody>
+          <a:bodyPr anchorCtr="0" anchor="t" bIns="91425" lIns="91425" spcFirstLastPara="1" rIns="91425" wrap="square" tIns="91425">
+            <a:normAutofit/>
+          </a:bodyPr>
+          <a:lstStyle/>
+          <a:p>
+            <a:pPr indent="0" lvl="0" marL="0" rtl="0" algn="l">
+              <a:spcBef>
+                <a:spcPts val="0"/>
+              </a:spcBef>
+              <a:spcAft>
+                <a:spcPts val="1200"/>
+              </a:spcAft>
+              <a:buNone/>
+            </a:pPr>
+            <a:r>
+              <a:rPr lang="nl"/>
+              <a:t>{rockets_description}</a:t>
+            </a:r>
+            <a:endParaRPr/>
+          </a:p>
+        </p:txBody>
+      </p:sp>
+    </p:spTree>
+  </p:cSld>
+  <p:clrMapOvr>
+    <a:masterClrMapping/>
+  </p:clrMapOvr>
+</p:sld>
+</file>
+
+<file path=ppt/slides/slide4.xml><?xml version="1.0" encoding="utf-8"?>
+<p:sld xmlns:a="http://schemas.openxmlformats.org/drawingml/2006/main" xmlns:r="http://schemas.openxmlformats.org/officeDocument/2006/relationships" xmlns:mc="http://schemas.openxmlformats.org/markup-compatibility/2006" xmlns:mv="urn:schemas-microsoft-com:mac:vml" xmlns:p="http://schemas.openxmlformats.org/presentationml/2006/main" xmlns:c="http://schemas.openxmlformats.org/drawingml/2006/chart" xmlns:dgm="http://schemas.openxmlformats.org/drawingml/2006/diagram" xmlns:o="urn:schemas-microsoft-com:office:office" xmlns:v="urn:schemas-microsoft-com:vml" xmlns:pvml="urn:schemas-microsoft-com:office:powerpoint" xmlns:com="http://schemas.openxmlformats.org/drawingml/2006/compatibility" xmlns:p14="http://schemas.microsoft.com/office/powerpoint/2010/main" xmlns:p15="http://schemas.microsoft.com/office/powerpoint/2012/main" xmlns:ahyp="http://schemas.microsoft.com/office/drawing/2018/hyperlinkcolor">
+  <p:cSld>
+    <p:spTree>
+      <p:nvGrpSpPr>
+        <p:cNvPr id="145" name="Shape 145"/>
+        <p:cNvGrpSpPr/>
+        <p:nvPr/>
+      </p:nvGrpSpPr>
+      <p:grpSpPr>
+        <a:xfrm>
+          <a:off x="0" y="0"/>
+          <a:ext cx="0" cy="0"/>
+          <a:chOff x="0" y="0"/>
+          <a:chExt cx="0" cy="0"/>
+        </a:xfrm>
+      </p:grpSpPr>
+      <p:sp>
+        <p:nvSpPr>
+          <p:cNvPr id="146" name="Google Shape;146;p16"/>
+          <p:cNvSpPr txBox="1"/>
+          <p:nvPr>
+            <p:ph type="title"/>
+          </p:nvPr>
+        </p:nvSpPr>
+        <p:spPr>
+          <a:xfrm>
+            <a:off x="819150" y="845600"/>
+            <a:ext cx="7505700" cy="954600"/>
+          </a:xfrm>
+          <a:prstGeom prst="rect">
+            <a:avLst/>
+          </a:prstGeom>
+        </p:spPr>
+        <p:txBody>
+          <a:bodyPr anchorCtr="0" anchor="t" bIns="91425" lIns="91425" spcFirstLastPara="1" rIns="91425" wrap="square" tIns="91425">
+            <a:normAutofit/>
+          </a:bodyPr>
+          <a:lstStyle/>
+          <a:p>
+            <a:pPr indent="0" lvl="0" marL="0" rtl="0" algn="l">
+              <a:spcBef>
+                <a:spcPts val="0"/>
+              </a:spcBef>
+              <a:spcAft>
+                <a:spcPts val="0"/>
+              </a:spcAft>
+              <a:buNone/>
+            </a:pPr>
+            <a:r>
+              <a:rPr lang="nl"/>
               <a:t>{!rockets}Rocket: {name}</a:t>
             </a:r>
             <a:endParaRPr/>
@@ -9734,7 +10456,7 @@
       </p:sp>
       <p:sp>
         <p:nvSpPr>
-          <p:cNvPr id="141" name="Google Shape;141;p15"/>
+          <p:cNvPr id="147" name="Google Shape;147;p16"/>
           <p:cNvSpPr txBox="1"/>
           <p:nvPr>
             <p:ph idx="1" type="body"/>
@@ -9843,7 +10565,7 @@
       </p:sp>
       <p:sp>
         <p:nvSpPr>
-          <p:cNvPr id="142" name="Google Shape;142;p15"/>
+          <p:cNvPr id="148" name="Google Shape;148;p16"/>
           <p:cNvSpPr txBox="1"/>
           <p:nvPr>
             <p:ph idx="1" type="body"/>
@@ -9876,111 +10598,6 @@
             <a:r>
               <a:rPr lang="nl"/>
               <a:t>{%image}</a:t>
-            </a:r>
-            <a:endParaRPr/>
-          </a:p>
-        </p:txBody>
-      </p:sp>
-    </p:spTree>
-  </p:cSld>
-  <p:clrMapOvr>
-    <a:masterClrMapping/>
-  </p:clrMapOvr>
-</p:sld>
-</file>
-
-<file path=ppt/slides/slide4.xml><?xml version="1.0" encoding="utf-8"?>
-<p:sld xmlns:a="http://schemas.openxmlformats.org/drawingml/2006/main" xmlns:r="http://schemas.openxmlformats.org/officeDocument/2006/relationships" xmlns:mc="http://schemas.openxmlformats.org/markup-compatibility/2006" xmlns:mv="urn:schemas-microsoft-com:mac:vml" xmlns:p="http://schemas.openxmlformats.org/presentationml/2006/main" xmlns:c="http://schemas.openxmlformats.org/drawingml/2006/chart" xmlns:dgm="http://schemas.openxmlformats.org/drawingml/2006/diagram" xmlns:o="urn:schemas-microsoft-com:office:office" xmlns:v="urn:schemas-microsoft-com:vml" xmlns:pvml="urn:schemas-microsoft-com:office:powerpoint" xmlns:com="http://schemas.openxmlformats.org/drawingml/2006/compatibility" xmlns:p14="http://schemas.microsoft.com/office/powerpoint/2010/main" xmlns:p15="http://schemas.microsoft.com/office/powerpoint/2012/main" xmlns:ahyp="http://schemas.microsoft.com/office/drawing/2018/hyperlinkcolor">
-  <p:cSld>
-    <p:spTree>
-      <p:nvGrpSpPr>
-        <p:cNvPr id="146" name="Shape 146"/>
-        <p:cNvGrpSpPr/>
-        <p:nvPr/>
-      </p:nvGrpSpPr>
-      <p:grpSpPr>
-        <a:xfrm>
-          <a:off x="0" y="0"/>
-          <a:ext cx="0" cy="0"/>
-          <a:chOff x="0" y="0"/>
-          <a:chExt cx="0" cy="0"/>
-        </a:xfrm>
-      </p:grpSpPr>
-      <p:sp>
-        <p:nvSpPr>
-          <p:cNvPr id="147" name="Google Shape;147;p16"/>
-          <p:cNvSpPr txBox="1"/>
-          <p:nvPr>
-            <p:ph type="title"/>
-          </p:nvPr>
-        </p:nvSpPr>
-        <p:spPr>
-          <a:xfrm>
-            <a:off x="819150" y="845600"/>
-            <a:ext cx="7505700" cy="954600"/>
-          </a:xfrm>
-          <a:prstGeom prst="rect">
-            <a:avLst/>
-          </a:prstGeom>
-        </p:spPr>
-        <p:txBody>
-          <a:bodyPr anchorCtr="0" anchor="t" bIns="91425" lIns="91425" spcFirstLastPara="1" rIns="91425" wrap="square" tIns="91425">
-            <a:normAutofit/>
-          </a:bodyPr>
-          <a:lstStyle/>
-          <a:p>
-            <a:pPr indent="0" lvl="0" marL="0" rtl="0" algn="l">
-              <a:spcBef>
-                <a:spcPts val="0"/>
-              </a:spcBef>
-              <a:spcAft>
-                <a:spcPts val="0"/>
-              </a:spcAft>
-              <a:buNone/>
-            </a:pPr>
-            <a:r>
-              <a:rPr lang="nl"/>
-              <a:t>Ships</a:t>
-            </a:r>
-            <a:endParaRPr/>
-          </a:p>
-        </p:txBody>
-      </p:sp>
-      <p:sp>
-        <p:nvSpPr>
-          <p:cNvPr id="148" name="Google Shape;148;p16"/>
-          <p:cNvSpPr txBox="1"/>
-          <p:nvPr>
-            <p:ph idx="1" type="body"/>
-          </p:nvPr>
-        </p:nvSpPr>
-        <p:spPr>
-          <a:xfrm>
-            <a:off x="819150" y="1990725"/>
-            <a:ext cx="7505700" cy="2448000"/>
-          </a:xfrm>
-          <a:prstGeom prst="rect">
-            <a:avLst/>
-          </a:prstGeom>
-        </p:spPr>
-        <p:txBody>
-          <a:bodyPr anchorCtr="0" anchor="t" bIns="91425" lIns="91425" spcFirstLastPara="1" rIns="91425" wrap="square" tIns="91425">
-            <a:normAutofit/>
-          </a:bodyPr>
-          <a:lstStyle/>
-          <a:p>
-            <a:pPr indent="0" lvl="0" marL="0" rtl="0" algn="l">
-              <a:spcBef>
-                <a:spcPts val="0"/>
-              </a:spcBef>
-              <a:spcAft>
-                <a:spcPts val="1200"/>
-              </a:spcAft>
-              <a:buNone/>
-            </a:pPr>
-            <a:r>
-              <a:rPr lang="nl"/>
-              <a:t>{ships_description}</a:t>
             </a:r>
             <a:endParaRPr/>
           </a:p>
@@ -10045,7 +10662,7 @@
             </a:pPr>
             <a:r>
               <a:rPr lang="nl"/>
-              <a:t>{!ships}Ship: {name}</a:t>
+              <a:t>Dragons</a:t>
             </a:r>
             <a:endParaRPr/>
           </a:p>
@@ -10054,6 +10671,111 @@
       <p:sp>
         <p:nvSpPr>
           <p:cNvPr id="154" name="Google Shape;154;p17"/>
+          <p:cNvSpPr txBox="1"/>
+          <p:nvPr>
+            <p:ph idx="1" type="body"/>
+          </p:nvPr>
+        </p:nvSpPr>
+        <p:spPr>
+          <a:xfrm>
+            <a:off x="819150" y="1990725"/>
+            <a:ext cx="7505700" cy="2448000"/>
+          </a:xfrm>
+          <a:prstGeom prst="rect">
+            <a:avLst/>
+          </a:prstGeom>
+        </p:spPr>
+        <p:txBody>
+          <a:bodyPr anchorCtr="0" anchor="t" bIns="91425" lIns="91425" spcFirstLastPara="1" rIns="91425" wrap="square" tIns="91425">
+            <a:normAutofit/>
+          </a:bodyPr>
+          <a:lstStyle/>
+          <a:p>
+            <a:pPr indent="0" lvl="0" marL="0" rtl="0" algn="l">
+              <a:spcBef>
+                <a:spcPts val="0"/>
+              </a:spcBef>
+              <a:spcAft>
+                <a:spcPts val="1200"/>
+              </a:spcAft>
+              <a:buNone/>
+            </a:pPr>
+            <a:r>
+              <a:rPr lang="nl"/>
+              <a:t>{dragons_description}</a:t>
+            </a:r>
+            <a:endParaRPr/>
+          </a:p>
+        </p:txBody>
+      </p:sp>
+    </p:spTree>
+  </p:cSld>
+  <p:clrMapOvr>
+    <a:masterClrMapping/>
+  </p:clrMapOvr>
+</p:sld>
+</file>
+
+<file path=ppt/slides/slide6.xml><?xml version="1.0" encoding="utf-8"?>
+<p:sld xmlns:a="http://schemas.openxmlformats.org/drawingml/2006/main" xmlns:r="http://schemas.openxmlformats.org/officeDocument/2006/relationships" xmlns:mc="http://schemas.openxmlformats.org/markup-compatibility/2006" xmlns:mv="urn:schemas-microsoft-com:mac:vml" xmlns:p="http://schemas.openxmlformats.org/presentationml/2006/main" xmlns:c="http://schemas.openxmlformats.org/drawingml/2006/chart" xmlns:dgm="http://schemas.openxmlformats.org/drawingml/2006/diagram" xmlns:o="urn:schemas-microsoft-com:office:office" xmlns:v="urn:schemas-microsoft-com:vml" xmlns:pvml="urn:schemas-microsoft-com:office:powerpoint" xmlns:com="http://schemas.openxmlformats.org/drawingml/2006/compatibility" xmlns:p14="http://schemas.microsoft.com/office/powerpoint/2010/main" xmlns:p15="http://schemas.microsoft.com/office/powerpoint/2012/main" xmlns:ahyp="http://schemas.microsoft.com/office/drawing/2018/hyperlinkcolor">
+  <p:cSld>
+    <p:spTree>
+      <p:nvGrpSpPr>
+        <p:cNvPr id="158" name="Shape 158"/>
+        <p:cNvGrpSpPr/>
+        <p:nvPr/>
+      </p:nvGrpSpPr>
+      <p:grpSpPr>
+        <a:xfrm>
+          <a:off x="0" y="0"/>
+          <a:ext cx="0" cy="0"/>
+          <a:chOff x="0" y="0"/>
+          <a:chExt cx="0" cy="0"/>
+        </a:xfrm>
+      </p:grpSpPr>
+      <p:sp>
+        <p:nvSpPr>
+          <p:cNvPr id="159" name="Google Shape;159;p18"/>
+          <p:cNvSpPr txBox="1"/>
+          <p:nvPr>
+            <p:ph type="title"/>
+          </p:nvPr>
+        </p:nvSpPr>
+        <p:spPr>
+          <a:xfrm>
+            <a:off x="819150" y="845600"/>
+            <a:ext cx="7505700" cy="954600"/>
+          </a:xfrm>
+          <a:prstGeom prst="rect">
+            <a:avLst/>
+          </a:prstGeom>
+        </p:spPr>
+        <p:txBody>
+          <a:bodyPr anchorCtr="0" anchor="t" bIns="91425" lIns="91425" spcFirstLastPara="1" rIns="91425" wrap="square" tIns="91425">
+            <a:normAutofit/>
+          </a:bodyPr>
+          <a:lstStyle/>
+          <a:p>
+            <a:pPr indent="0" lvl="0" marL="0" rtl="0" algn="l">
+              <a:spcBef>
+                <a:spcPts val="0"/>
+              </a:spcBef>
+              <a:spcAft>
+                <a:spcPts val="0"/>
+              </a:spcAft>
+              <a:buNone/>
+            </a:pPr>
+            <a:r>
+              <a:rPr lang="nl"/>
+              <a:t>{!dragons}Dragon: {name}</a:t>
+            </a:r>
+            <a:endParaRPr/>
+          </a:p>
+        </p:txBody>
+      </p:sp>
+      <p:sp>
+        <p:nvSpPr>
+          <p:cNvPr id="160" name="Google Shape;160;p18"/>
           <p:cNvSpPr txBox="1"/>
           <p:nvPr>
             <p:ph idx="1" type="body"/>
@@ -10086,41 +10808,7 @@
             </a:pPr>
             <a:r>
               <a:rPr lang="nl"/>
-              <a:t>Roles: </a:t>
-            </a:r>
-            <a:endParaRPr/>
-          </a:p>
-          <a:p>
-            <a:pPr indent="-298450" lvl="1" marL="914400" rtl="0" algn="l">
-              <a:spcBef>
-                <a:spcPts val="0"/>
-              </a:spcBef>
-              <a:spcAft>
-                <a:spcPts val="0"/>
-              </a:spcAft>
-              <a:buSzPts val="1100"/>
-              <a:buChar char="○"/>
-            </a:pPr>
-            <a:r>
-              <a:rPr lang="nl"/>
-              <a:t>{#roles}{.}</a:t>
-            </a:r>
-            <a:endParaRPr/>
-          </a:p>
-          <a:p>
-            <a:pPr indent="-298450" lvl="1" marL="914400" rtl="0" algn="l">
-              <a:spcBef>
-                <a:spcPts val="0"/>
-              </a:spcBef>
-              <a:spcAft>
-                <a:spcPts val="0"/>
-              </a:spcAft>
-              <a:buSzPts val="1100"/>
-              <a:buChar char="○"/>
-            </a:pPr>
-            <a:r>
-              <a:rPr lang="nl"/>
-              <a:t>{/roles}</a:t>
+              <a:t>Diameter: {diameter.meters} m</a:t>
             </a:r>
             <a:endParaRPr/>
           </a:p>
@@ -10137,7 +10825,7 @@
             </a:pPr>
             <a:r>
               <a:rPr lang="nl"/>
-              <a:t>Home port: {home_port}</a:t>
+              <a:t>Dry mass: {dry_mass_kg} kg</a:t>
             </a:r>
             <a:endParaRPr/>
           </a:p>
@@ -10154,7 +10842,24 @@
             </a:pPr>
             <a:r>
               <a:rPr lang="nl"/>
-              <a:t>Year built: {year_built}</a:t>
+              <a:t>Wikipedia: {*wikipedia}</a:t>
+            </a:r>
+            <a:endParaRPr/>
+          </a:p>
+          <a:p>
+            <a:pPr indent="-311150" lvl="0" marL="457200" rtl="0" algn="l">
+              <a:spcBef>
+                <a:spcPts val="0"/>
+              </a:spcBef>
+              <a:spcAft>
+                <a:spcPts val="0"/>
+              </a:spcAft>
+              <a:buSzPts val="1300"/>
+              <a:buChar char="●"/>
+            </a:pPr>
+            <a:r>
+              <a:rPr lang="nl"/>
+              <a:t>Description: {description}</a:t>
             </a:r>
             <a:endParaRPr/>
           </a:p>
@@ -10162,7 +10867,7 @@
       </p:sp>
       <p:sp>
         <p:nvSpPr>
-          <p:cNvPr id="155" name="Google Shape;155;p17"/>
+          <p:cNvPr id="161" name="Google Shape;161;p18"/>
           <p:cNvSpPr txBox="1"/>
           <p:nvPr>
             <p:ph idx="1" type="body"/>
@@ -10195,111 +10900,6 @@
             <a:r>
               <a:rPr lang="nl"/>
               <a:t>{%image}</a:t>
-            </a:r>
-            <a:endParaRPr/>
-          </a:p>
-        </p:txBody>
-      </p:sp>
-    </p:spTree>
-  </p:cSld>
-  <p:clrMapOvr>
-    <a:masterClrMapping/>
-  </p:clrMapOvr>
-</p:sld>
-</file>
-
-<file path=ppt/slides/slide6.xml><?xml version="1.0" encoding="utf-8"?>
-<p:sld xmlns:a="http://schemas.openxmlformats.org/drawingml/2006/main" xmlns:r="http://schemas.openxmlformats.org/officeDocument/2006/relationships" xmlns:mc="http://schemas.openxmlformats.org/markup-compatibility/2006" xmlns:mv="urn:schemas-microsoft-com:mac:vml" xmlns:p="http://schemas.openxmlformats.org/presentationml/2006/main" xmlns:c="http://schemas.openxmlformats.org/drawingml/2006/chart" xmlns:dgm="http://schemas.openxmlformats.org/drawingml/2006/diagram" xmlns:o="urn:schemas-microsoft-com:office:office" xmlns:v="urn:schemas-microsoft-com:vml" xmlns:pvml="urn:schemas-microsoft-com:office:powerpoint" xmlns:com="http://schemas.openxmlformats.org/drawingml/2006/compatibility" xmlns:p14="http://schemas.microsoft.com/office/powerpoint/2010/main" xmlns:p15="http://schemas.microsoft.com/office/powerpoint/2012/main" xmlns:ahyp="http://schemas.microsoft.com/office/drawing/2018/hyperlinkcolor">
-  <p:cSld>
-    <p:spTree>
-      <p:nvGrpSpPr>
-        <p:cNvPr id="159" name="Shape 159"/>
-        <p:cNvGrpSpPr/>
-        <p:nvPr/>
-      </p:nvGrpSpPr>
-      <p:grpSpPr>
-        <a:xfrm>
-          <a:off x="0" y="0"/>
-          <a:ext cx="0" cy="0"/>
-          <a:chOff x="0" y="0"/>
-          <a:chExt cx="0" cy="0"/>
-        </a:xfrm>
-      </p:grpSpPr>
-      <p:sp>
-        <p:nvSpPr>
-          <p:cNvPr id="160" name="Google Shape;160;p18"/>
-          <p:cNvSpPr txBox="1"/>
-          <p:nvPr>
-            <p:ph type="title"/>
-          </p:nvPr>
-        </p:nvSpPr>
-        <p:spPr>
-          <a:xfrm>
-            <a:off x="819150" y="845600"/>
-            <a:ext cx="7505700" cy="954600"/>
-          </a:xfrm>
-          <a:prstGeom prst="rect">
-            <a:avLst/>
-          </a:prstGeom>
-        </p:spPr>
-        <p:txBody>
-          <a:bodyPr anchorCtr="0" anchor="t" bIns="91425" lIns="91425" spcFirstLastPara="1" rIns="91425" wrap="square" tIns="91425">
-            <a:normAutofit/>
-          </a:bodyPr>
-          <a:lstStyle/>
-          <a:p>
-            <a:pPr indent="0" lvl="0" marL="0" rtl="0" algn="l">
-              <a:spcBef>
-                <a:spcPts val="0"/>
-              </a:spcBef>
-              <a:spcAft>
-                <a:spcPts val="0"/>
-              </a:spcAft>
-              <a:buNone/>
-            </a:pPr>
-            <a:r>
-              <a:rPr lang="nl"/>
-              <a:t>Dragons</a:t>
-            </a:r>
-            <a:endParaRPr/>
-          </a:p>
-        </p:txBody>
-      </p:sp>
-      <p:sp>
-        <p:nvSpPr>
-          <p:cNvPr id="161" name="Google Shape;161;p18"/>
-          <p:cNvSpPr txBox="1"/>
-          <p:nvPr>
-            <p:ph idx="1" type="body"/>
-          </p:nvPr>
-        </p:nvSpPr>
-        <p:spPr>
-          <a:xfrm>
-            <a:off x="819150" y="1990725"/>
-            <a:ext cx="7505700" cy="2448000"/>
-          </a:xfrm>
-          <a:prstGeom prst="rect">
-            <a:avLst/>
-          </a:prstGeom>
-        </p:spPr>
-        <p:txBody>
-          <a:bodyPr anchorCtr="0" anchor="t" bIns="91425" lIns="91425" spcFirstLastPara="1" rIns="91425" wrap="square" tIns="91425">
-            <a:normAutofit/>
-          </a:bodyPr>
-          <a:lstStyle/>
-          <a:p>
-            <a:pPr indent="0" lvl="0" marL="0" rtl="0" algn="l">
-              <a:spcBef>
-                <a:spcPts val="0"/>
-              </a:spcBef>
-              <a:spcAft>
-                <a:spcPts val="1200"/>
-              </a:spcAft>
-              <a:buNone/>
-            </a:pPr>
-            <a:r>
-              <a:rPr lang="nl"/>
-              <a:t>{dragons_description}</a:t>
             </a:r>
             <a:endParaRPr/>
           </a:p>
@@ -10364,7 +10964,7 @@
             </a:pPr>
             <a:r>
               <a:rPr lang="nl"/>
-              <a:t>{!dragons}Dragon: {name}</a:t>
+              <a:t>Landing pads</a:t>
             </a:r>
             <a:endParaRPr/>
           </a:p>
@@ -10373,6 +10973,111 @@
       <p:sp>
         <p:nvSpPr>
           <p:cNvPr id="167" name="Google Shape;167;p19"/>
+          <p:cNvSpPr txBox="1"/>
+          <p:nvPr>
+            <p:ph idx="1" type="body"/>
+          </p:nvPr>
+        </p:nvSpPr>
+        <p:spPr>
+          <a:xfrm>
+            <a:off x="819150" y="1990725"/>
+            <a:ext cx="7505700" cy="2448000"/>
+          </a:xfrm>
+          <a:prstGeom prst="rect">
+            <a:avLst/>
+          </a:prstGeom>
+        </p:spPr>
+        <p:txBody>
+          <a:bodyPr anchorCtr="0" anchor="t" bIns="91425" lIns="91425" spcFirstLastPara="1" rIns="91425" wrap="square" tIns="91425">
+            <a:normAutofit/>
+          </a:bodyPr>
+          <a:lstStyle/>
+          <a:p>
+            <a:pPr indent="0" lvl="0" marL="0" rtl="0" algn="l">
+              <a:spcBef>
+                <a:spcPts val="0"/>
+              </a:spcBef>
+              <a:spcAft>
+                <a:spcPts val="1200"/>
+              </a:spcAft>
+              <a:buNone/>
+            </a:pPr>
+            <a:r>
+              <a:rPr lang="nl"/>
+              <a:t>{landing_pads_description}</a:t>
+            </a:r>
+            <a:endParaRPr/>
+          </a:p>
+        </p:txBody>
+      </p:sp>
+    </p:spTree>
+  </p:cSld>
+  <p:clrMapOvr>
+    <a:masterClrMapping/>
+  </p:clrMapOvr>
+</p:sld>
+</file>
+
+<file path=ppt/slides/slide8.xml><?xml version="1.0" encoding="utf-8"?>
+<p:sld xmlns:a="http://schemas.openxmlformats.org/drawingml/2006/main" xmlns:r="http://schemas.openxmlformats.org/officeDocument/2006/relationships" xmlns:mc="http://schemas.openxmlformats.org/markup-compatibility/2006" xmlns:mv="urn:schemas-microsoft-com:mac:vml" xmlns:p="http://schemas.openxmlformats.org/presentationml/2006/main" xmlns:c="http://schemas.openxmlformats.org/drawingml/2006/chart" xmlns:dgm="http://schemas.openxmlformats.org/drawingml/2006/diagram" xmlns:o="urn:schemas-microsoft-com:office:office" xmlns:v="urn:schemas-microsoft-com:vml" xmlns:pvml="urn:schemas-microsoft-com:office:powerpoint" xmlns:com="http://schemas.openxmlformats.org/drawingml/2006/compatibility" xmlns:p14="http://schemas.microsoft.com/office/powerpoint/2010/main" xmlns:p15="http://schemas.microsoft.com/office/powerpoint/2012/main" xmlns:ahyp="http://schemas.microsoft.com/office/drawing/2018/hyperlinkcolor">
+  <p:cSld>
+    <p:spTree>
+      <p:nvGrpSpPr>
+        <p:cNvPr id="171" name="Shape 171"/>
+        <p:cNvGrpSpPr/>
+        <p:nvPr/>
+      </p:nvGrpSpPr>
+      <p:grpSpPr>
+        <a:xfrm>
+          <a:off x="0" y="0"/>
+          <a:ext cx="0" cy="0"/>
+          <a:chOff x="0" y="0"/>
+          <a:chExt cx="0" cy="0"/>
+        </a:xfrm>
+      </p:grpSpPr>
+      <p:sp>
+        <p:nvSpPr>
+          <p:cNvPr id="172" name="Google Shape;172;p20"/>
+          <p:cNvSpPr txBox="1"/>
+          <p:nvPr>
+            <p:ph type="title"/>
+          </p:nvPr>
+        </p:nvSpPr>
+        <p:spPr>
+          <a:xfrm>
+            <a:off x="819150" y="845600"/>
+            <a:ext cx="7505700" cy="954600"/>
+          </a:xfrm>
+          <a:prstGeom prst="rect">
+            <a:avLst/>
+          </a:prstGeom>
+        </p:spPr>
+        <p:txBody>
+          <a:bodyPr anchorCtr="0" anchor="t" bIns="91425" lIns="91425" spcFirstLastPara="1" rIns="91425" wrap="square" tIns="91425">
+            <a:normAutofit/>
+          </a:bodyPr>
+          <a:lstStyle/>
+          <a:p>
+            <a:pPr indent="0" lvl="0" marL="0" rtl="0" algn="l">
+              <a:spcBef>
+                <a:spcPts val="0"/>
+              </a:spcBef>
+              <a:spcAft>
+                <a:spcPts val="0"/>
+              </a:spcAft>
+              <a:buNone/>
+            </a:pPr>
+            <a:r>
+              <a:rPr lang="nl"/>
+              <a:t>{!landing_pads}Landing pad: {full_name}</a:t>
+            </a:r>
+            <a:endParaRPr/>
+          </a:p>
+        </p:txBody>
+      </p:sp>
+      <p:sp>
+        <p:nvSpPr>
+          <p:cNvPr id="173" name="Google Shape;173;p20"/>
           <p:cNvSpPr txBox="1"/>
           <p:nvPr>
             <p:ph idx="1" type="body"/>
@@ -10405,7 +11110,7 @@
             </a:pPr>
             <a:r>
               <a:rPr lang="nl"/>
-              <a:t>Diameter: {diameter.meters} m</a:t>
+              <a:t>Description: {details}</a:t>
             </a:r>
             <a:endParaRPr/>
           </a:p>
@@ -10422,7 +11127,58 @@
             </a:pPr>
             <a:r>
               <a:rPr lang="nl"/>
-              <a:t>Dry mass: {dry_mass_kg} kg</a:t>
+              <a:t>Type: {type}</a:t>
+            </a:r>
+            <a:endParaRPr/>
+          </a:p>
+          <a:p>
+            <a:pPr indent="-311150" lvl="0" marL="457200" rtl="0" algn="l">
+              <a:spcBef>
+                <a:spcPts val="0"/>
+              </a:spcBef>
+              <a:spcAft>
+                <a:spcPts val="0"/>
+              </a:spcAft>
+              <a:buSzPts val="1300"/>
+              <a:buChar char="●"/>
+            </a:pPr>
+            <a:r>
+              <a:rPr lang="nl"/>
+              <a:t>Location: {locality}, {region}</a:t>
+            </a:r>
+            <a:endParaRPr/>
+          </a:p>
+          <a:p>
+            <a:pPr indent="-311150" lvl="0" marL="457200" rtl="0" algn="l">
+              <a:spcBef>
+                <a:spcPts val="0"/>
+              </a:spcBef>
+              <a:spcAft>
+                <a:spcPts val="0"/>
+              </a:spcAft>
+              <a:buSzPts val="1300"/>
+              <a:buChar char="●"/>
+            </a:pPr>
+            <a:r>
+              <a:rPr lang="nl"/>
+              <a:t>Succeeded landing attempts: {landing_successes}/{landing_attempts}</a:t>
+            </a:r>
+            <a:endParaRPr/>
+          </a:p>
+          <a:p>
+            <a:pPr indent="-311150" lvl="0" marL="457200" rtl="0" algn="l">
+              <a:spcBef>
+                <a:spcPts val="0"/>
+              </a:spcBef>
+              <a:spcAft>
+                <a:spcPts val="0"/>
+              </a:spcAft>
+              <a:buSzPts val="1300"/>
+              <a:buChar char="●"/>
+            </a:pPr>
+            <a:r>
+              <a:rPr lang="nl"/>
+              <a:t>Status: {status}</a:t>
             </a:r>
             <a:endParaRPr/>
           </a:p>
@@ -10443,28 +11199,11 @@
             </a:r>
             <a:endParaRPr/>
           </a:p>
-          <a:p>
-            <a:pPr indent="-311150" lvl="0" marL="457200" rtl="0" algn="l">
-              <a:spcBef>
-                <a:spcPts val="0"/>
-              </a:spcBef>
-              <a:spcAft>
-                <a:spcPts val="0"/>
-              </a:spcAft>
-              <a:buSzPts val="1300"/>
-              <a:buChar char="●"/>
-            </a:pPr>
-            <a:r>
-              <a:rPr lang="nl"/>
-              <a:t>Description: {description}</a:t>
-            </a:r>
-            <a:endParaRPr/>
-          </a:p>
         </p:txBody>
       </p:sp>
       <p:sp>
         <p:nvSpPr>
-          <p:cNvPr id="168" name="Google Shape;168;p19"/>
+          <p:cNvPr id="174" name="Google Shape;174;p20"/>
           <p:cNvSpPr txBox="1"/>
           <p:nvPr>
             <p:ph idx="1" type="body"/>
@@ -10510,7 +11249,391 @@
 </p:sld>
 </file>
 
+<file path=ppt/slides/slide9.xml><?xml version="1.0" encoding="utf-8"?>
+<p:sld xmlns:a="http://schemas.openxmlformats.org/drawingml/2006/main" xmlns:r="http://schemas.openxmlformats.org/officeDocument/2006/relationships" xmlns:mc="http://schemas.openxmlformats.org/markup-compatibility/2006" xmlns:mv="urn:schemas-microsoft-com:mac:vml" xmlns:p="http://schemas.openxmlformats.org/presentationml/2006/main" xmlns:c="http://schemas.openxmlformats.org/drawingml/2006/chart" xmlns:dgm="http://schemas.openxmlformats.org/drawingml/2006/diagram" xmlns:o="urn:schemas-microsoft-com:office:office" xmlns:v="urn:schemas-microsoft-com:vml" xmlns:pvml="urn:schemas-microsoft-com:office:powerpoint" xmlns:com="http://schemas.openxmlformats.org/drawingml/2006/compatibility" xmlns:p14="http://schemas.microsoft.com/office/powerpoint/2010/main" xmlns:p15="http://schemas.microsoft.com/office/powerpoint/2012/main" xmlns:ahyp="http://schemas.microsoft.com/office/drawing/2018/hyperlinkcolor">
+  <p:cSld>
+    <p:spTree>
+      <p:nvGrpSpPr>
+        <p:cNvPr id="178" name="Shape 178"/>
+        <p:cNvGrpSpPr/>
+        <p:nvPr/>
+      </p:nvGrpSpPr>
+      <p:grpSpPr>
+        <a:xfrm>
+          <a:off x="0" y="0"/>
+          <a:ext cx="0" cy="0"/>
+          <a:chOff x="0" y="0"/>
+          <a:chExt cx="0" cy="0"/>
+        </a:xfrm>
+      </p:grpSpPr>
+      <p:sp>
+        <p:nvSpPr>
+          <p:cNvPr id="179" name="Google Shape;179;p21"/>
+          <p:cNvSpPr txBox="1"/>
+          <p:nvPr>
+            <p:ph type="title"/>
+          </p:nvPr>
+        </p:nvSpPr>
+        <p:spPr>
+          <a:xfrm>
+            <a:off x="819150" y="845600"/>
+            <a:ext cx="7505700" cy="954600"/>
+          </a:xfrm>
+          <a:prstGeom prst="rect">
+            <a:avLst/>
+          </a:prstGeom>
+        </p:spPr>
+        <p:txBody>
+          <a:bodyPr anchorCtr="0" anchor="t" bIns="91425" lIns="91425" spcFirstLastPara="1" rIns="91425" wrap="square" tIns="91425">
+            <a:normAutofit/>
+          </a:bodyPr>
+          <a:lstStyle/>
+          <a:p>
+            <a:pPr indent="0" lvl="0" marL="0" rtl="0" algn="l">
+              <a:spcBef>
+                <a:spcPts val="0"/>
+              </a:spcBef>
+              <a:spcAft>
+                <a:spcPts val="0"/>
+              </a:spcAft>
+              <a:buNone/>
+            </a:pPr>
+            <a:r>
+              <a:rPr lang="nl"/>
+              <a:t>Ships</a:t>
+            </a:r>
+            <a:endParaRPr/>
+          </a:p>
+        </p:txBody>
+      </p:sp>
+      <p:sp>
+        <p:nvSpPr>
+          <p:cNvPr id="180" name="Google Shape;180;p21"/>
+          <p:cNvSpPr txBox="1"/>
+          <p:nvPr>
+            <p:ph idx="1" type="body"/>
+          </p:nvPr>
+        </p:nvSpPr>
+        <p:spPr>
+          <a:xfrm>
+            <a:off x="819150" y="1990725"/>
+            <a:ext cx="7505700" cy="2448000"/>
+          </a:xfrm>
+          <a:prstGeom prst="rect">
+            <a:avLst/>
+          </a:prstGeom>
+        </p:spPr>
+        <p:txBody>
+          <a:bodyPr anchorCtr="0" anchor="t" bIns="91425" lIns="91425" spcFirstLastPara="1" rIns="91425" wrap="square" tIns="91425">
+            <a:normAutofit/>
+          </a:bodyPr>
+          <a:lstStyle/>
+          <a:p>
+            <a:pPr indent="0" lvl="0" marL="0" rtl="0" algn="l">
+              <a:spcBef>
+                <a:spcPts val="0"/>
+              </a:spcBef>
+              <a:spcAft>
+                <a:spcPts val="1200"/>
+              </a:spcAft>
+              <a:buNone/>
+            </a:pPr>
+            <a:r>
+              <a:rPr lang="nl"/>
+              <a:t>{ships_description}</a:t>
+            </a:r>
+            <a:endParaRPr/>
+          </a:p>
+        </p:txBody>
+      </p:sp>
+    </p:spTree>
+  </p:cSld>
+  <p:clrMapOvr>
+    <a:masterClrMapping/>
+  </p:clrMapOvr>
+</p:sld>
+</file>
+
 <file path=ppt/theme/theme1.xml><?xml version="1.0" encoding="utf-8"?>
+<a:theme xmlns:a="http://schemas.openxmlformats.org/drawingml/2006/main" xmlns:r="http://schemas.openxmlformats.org/officeDocument/2006/relationships">
+  <a:themeElements>
+    <a:clrScheme name="Default">
+      <a:dk1>
+        <a:srgbClr val="000000"/>
+      </a:dk1>
+      <a:lt1>
+        <a:srgbClr val="FFFFFF"/>
+      </a:lt1>
+      <a:dk2>
+        <a:srgbClr val="158158"/>
+      </a:dk2>
+      <a:lt2>
+        <a:srgbClr val="F3F3F3"/>
+      </a:lt2>
+      <a:accent1>
+        <a:srgbClr val="058DC7"/>
+      </a:accent1>
+      <a:accent2>
+        <a:srgbClr val="50B432"/>
+      </a:accent2>
+      <a:accent3>
+        <a:srgbClr val="ED561B"/>
+      </a:accent3>
+      <a:accent4>
+        <a:srgbClr val="EDEF00"/>
+      </a:accent4>
+      <a:accent5>
+        <a:srgbClr val="24CBE5"/>
+      </a:accent5>
+      <a:accent6>
+        <a:srgbClr val="64E572"/>
+      </a:accent6>
+      <a:hlink>
+        <a:srgbClr val="2200CC"/>
+      </a:hlink>
+      <a:folHlink>
+        <a:srgbClr val="551A8B"/>
+      </a:folHlink>
+    </a:clrScheme>
+    <a:fontScheme name="Office">
+      <a:majorFont>
+        <a:latin typeface="Arial"/>
+        <a:ea typeface=""/>
+        <a:cs typeface=""/>
+        <a:font script="Jpan" typeface="ＭＳ Ｐゴシック"/>
+        <a:font script="Hang" typeface="맑은 고딕"/>
+        <a:font script="Hans" typeface="宋体"/>
+        <a:font script="Hant" typeface="新細明體"/>
+        <a:font script="Arab" typeface="Times New Roman"/>
+        <a:font script="Hebr" typeface="Times New Roman"/>
+        <a:font script="Thai" typeface="Angsana New"/>
+        <a:font script="Ethi" typeface="Nyala"/>
+        <a:font script="Beng" typeface="Vrinda"/>
+        <a:font script="Gujr" typeface="Shruti"/>
+        <a:font script="Khmr" typeface="MoolBoran"/>
+        <a:font script="Knda" typeface="Tunga"/>
+        <a:font script="Guru" typeface="Raavi"/>
+        <a:font script="Cans" typeface="Euphemia"/>
+        <a:font script="Cher" typeface="Plantagenet Cherokee"/>
+        <a:font script="Yiii" typeface="Microsoft Yi Baiti"/>
+        <a:font script="Tibt" typeface="Microsoft Himalaya"/>
+        <a:font script="Thaa" typeface="MV Boli"/>
+        <a:font script="Deva" typeface="Mangal"/>
+        <a:font script="Telu" typeface="Gautami"/>
+        <a:font script="Taml" typeface="Latha"/>
+        <a:font script="Syrc" typeface="Estrangelo Edessa"/>
+        <a:font script="Orya" typeface="Kalinga"/>
+        <a:font script="Mlym" typeface="Kartika"/>
+        <a:font script="Laoo" typeface="DokChampa"/>
+        <a:font script="Sinh" typeface="Iskoola Pota"/>
+        <a:font script="Mong" typeface="Mongolian Baiti"/>
+        <a:font script="Viet" typeface="Times New Roman"/>
+        <a:font script="Uigh" typeface="Microsoft Uighur"/>
+        <a:font script="Geor" typeface="Sylfaen"/>
+      </a:majorFont>
+      <a:minorFont>
+        <a:latin typeface="Arial"/>
+        <a:ea typeface=""/>
+        <a:cs typeface=""/>
+        <a:font script="Jpan" typeface="ＭＳ Ｐゴシック"/>
+        <a:font script="Hang" typeface="맑은 고딕"/>
+        <a:font script="Hans" typeface="宋体"/>
+        <a:font script="Hant" typeface="新細明體"/>
+        <a:font script="Arab" typeface="Arial"/>
+        <a:font script="Hebr" typeface="Arial"/>
+        <a:font script="Thai" typeface="Cordia New"/>
+        <a:font script="Ethi" typeface="Nyala"/>
+        <a:font script="Beng" typeface="Vrinda"/>
+        <a:font script="Gujr" typeface="Shruti"/>
+        <a:font script="Khmr" typeface="DaunPenh"/>
+        <a:font script="Knda" typeface="Tunga"/>
+        <a:font script="Guru" typeface="Raavi"/>
+        <a:font script="Cans" typeface="Euphemia"/>
+        <a:font script="Cher" typeface="Plantagenet Cherokee"/>
+        <a:font script="Yiii" typeface="Microsoft Yi Baiti"/>
+        <a:font script="Tibt" typeface="Microsoft Himalaya"/>
+        <a:font script="Thaa" typeface="MV Boli"/>
+        <a:font script="Deva" typeface="Mangal"/>
+        <a:font script="Telu" typeface="Gautami"/>
+        <a:font script="Taml" typeface="Latha"/>
+        <a:font script="Syrc" typeface="Estrangelo Edessa"/>
+        <a:font script="Orya" typeface="Kalinga"/>
+        <a:font script="Mlym" typeface="Kartika"/>
+        <a:font script="Laoo" typeface="DokChampa"/>
+        <a:font script="Sinh" typeface="Iskoola Pota"/>
+        <a:font script="Mong" typeface="Mongolian Baiti"/>
+        <a:font script="Viet" typeface="Arial"/>
+        <a:font script="Uigh" typeface="Microsoft Uighur"/>
+        <a:font script="Geor" typeface="Sylfaen"/>
+      </a:minorFont>
+    </a:fontScheme>
+    <a:fmtScheme name="Office">
+      <a:fillStyleLst>
+        <a:solidFill>
+          <a:schemeClr val="phClr"/>
+        </a:solidFill>
+        <a:gradFill rotWithShape="1">
+          <a:gsLst>
+            <a:gs pos="0">
+              <a:schemeClr val="phClr">
+                <a:tint val="50000"/>
+                <a:satMod val="300000"/>
+              </a:schemeClr>
+            </a:gs>
+            <a:gs pos="35000">
+              <a:schemeClr val="phClr">
+                <a:tint val="37000"/>
+                <a:satMod val="300000"/>
+              </a:schemeClr>
+            </a:gs>
+            <a:gs pos="100000">
+              <a:schemeClr val="phClr">
+                <a:tint val="15000"/>
+                <a:satMod val="350000"/>
+              </a:schemeClr>
+            </a:gs>
+          </a:gsLst>
+          <a:lin ang="16200000" scaled="1"/>
+        </a:gradFill>
+        <a:gradFill rotWithShape="1">
+          <a:gsLst>
+            <a:gs pos="0">
+              <a:schemeClr val="phClr">
+                <a:tint val="100000"/>
+                <a:shade val="100000"/>
+                <a:satMod val="130000"/>
+              </a:schemeClr>
+            </a:gs>
+            <a:gs pos="100000">
+              <a:schemeClr val="phClr">
+                <a:tint val="50000"/>
+                <a:shade val="100000"/>
+                <a:satMod val="350000"/>
+              </a:schemeClr>
+            </a:gs>
+          </a:gsLst>
+          <a:lin ang="16200000" scaled="0"/>
+        </a:gradFill>
+      </a:fillStyleLst>
+      <a:lnStyleLst>
+        <a:ln w="9525" cap="flat" cmpd="sng" algn="ctr">
+          <a:solidFill>
+            <a:schemeClr val="phClr">
+              <a:shade val="95000"/>
+              <a:satMod val="105000"/>
+            </a:schemeClr>
+          </a:solidFill>
+          <a:prstDash val="solid"/>
+        </a:ln>
+        <a:ln w="25400" cap="flat" cmpd="sng" algn="ctr">
+          <a:solidFill>
+            <a:schemeClr val="phClr"/>
+          </a:solidFill>
+          <a:prstDash val="solid"/>
+        </a:ln>
+        <a:ln w="38100" cap="flat" cmpd="sng" algn="ctr">
+          <a:solidFill>
+            <a:schemeClr val="phClr"/>
+          </a:solidFill>
+          <a:prstDash val="solid"/>
+        </a:ln>
+      </a:lnStyleLst>
+      <a:effectStyleLst>
+        <a:effectStyle>
+          <a:effectLst>
+            <a:outerShdw blurRad="40000" dist="20000" dir="5400000" rotWithShape="0">
+              <a:srgbClr val="000000">
+                <a:alpha val="38000"/>
+              </a:srgbClr>
+            </a:outerShdw>
+          </a:effectLst>
+        </a:effectStyle>
+        <a:effectStyle>
+          <a:effectLst>
+            <a:outerShdw blurRad="40000" dist="23000" dir="5400000" rotWithShape="0">
+              <a:srgbClr val="000000">
+                <a:alpha val="35000"/>
+              </a:srgbClr>
+            </a:outerShdw>
+          </a:effectLst>
+        </a:effectStyle>
+        <a:effectStyle>
+          <a:effectLst>
+            <a:outerShdw blurRad="40000" dist="23000" dir="5400000" rotWithShape="0">
+              <a:srgbClr val="000000">
+                <a:alpha val="35000"/>
+              </a:srgbClr>
+            </a:outerShdw>
+          </a:effectLst>
+          <a:scene3d>
+            <a:camera prst="orthographicFront">
+              <a:rot lat="0" lon="0" rev="0"/>
+            </a:camera>
+            <a:lightRig rig="threePt" dir="t">
+              <a:rot lat="0" lon="0" rev="1200000"/>
+            </a:lightRig>
+          </a:scene3d>
+          <a:sp3d>
+            <a:bevelT w="63500" h="25400"/>
+          </a:sp3d>
+        </a:effectStyle>
+      </a:effectStyleLst>
+      <a:bgFillStyleLst>
+        <a:solidFill>
+          <a:schemeClr val="phClr"/>
+        </a:solidFill>
+        <a:gradFill rotWithShape="1">
+          <a:gsLst>
+            <a:gs pos="0">
+              <a:schemeClr val="phClr">
+                <a:tint val="40000"/>
+                <a:satMod val="350000"/>
+              </a:schemeClr>
+            </a:gs>
+            <a:gs pos="40000">
+              <a:schemeClr val="phClr">
+                <a:tint val="45000"/>
+                <a:shade val="99000"/>
+                <a:satMod val="350000"/>
+              </a:schemeClr>
+            </a:gs>
+            <a:gs pos="100000">
+              <a:schemeClr val="phClr">
+                <a:shade val="20000"/>
+                <a:satMod val="255000"/>
+              </a:schemeClr>
+            </a:gs>
+          </a:gsLst>
+          <a:path path="circle">
+            <a:fillToRect l="50000" t="-80000" r="50000" b="180000"/>
+          </a:path>
+        </a:gradFill>
+        <a:gradFill rotWithShape="1">
+          <a:gsLst>
+            <a:gs pos="0">
+              <a:schemeClr val="phClr">
+                <a:tint val="80000"/>
+                <a:satMod val="300000"/>
+              </a:schemeClr>
+            </a:gs>
+            <a:gs pos="100000">
+              <a:schemeClr val="phClr">
+                <a:shade val="30000"/>
+                <a:satMod val="200000"/>
+              </a:schemeClr>
+            </a:gs>
+          </a:gsLst>
+          <a:path path="circle">
+            <a:fillToRect l="50000" t="50000" r="50000" b="50000"/>
+          </a:path>
+        </a:gradFill>
+      </a:bgFillStyleLst>
+    </a:fmtScheme>
+  </a:themeElements>
+</a:theme>
+</file>
+
+<file path=ppt/theme/theme2.xml><?xml version="1.0" encoding="utf-8"?>
 <a:theme xmlns:a="http://schemas.openxmlformats.org/drawingml/2006/main" xmlns:r="http://schemas.openxmlformats.org/officeDocument/2006/relationships" name="Shift">
   <a:themeElements>
     <a:clrScheme name="Shift">
@@ -10787,283 +11910,4 @@
     </a:fmtScheme>
   </a:themeElements>
 </a:theme>
-</file>
-
-<file path=ppt/theme/theme2.xml><?xml version="1.0" encoding="utf-8"?>
-<a:theme xmlns:a="http://schemas.openxmlformats.org/drawingml/2006/main" xmlns:r="http://schemas.openxmlformats.org/officeDocument/2006/relationships">
-  <a:themeElements>
-    <a:clrScheme name="Default">
-      <a:dk1>
-        <a:srgbClr val="000000"/>
-      </a:dk1>
-      <a:lt1>
-        <a:srgbClr val="FFFFFF"/>
-      </a:lt1>
-      <a:dk2>
-        <a:srgbClr val="158158"/>
-      </a:dk2>
-      <a:lt2>
-        <a:srgbClr val="F3F3F3"/>
-      </a:lt2>
-      <a:accent1>
-        <a:srgbClr val="058DC7"/>
-      </a:accent1>
-      <a:accent2>
-        <a:srgbClr val="50B432"/>
-      </a:accent2>
-      <a:accent3>
-        <a:srgbClr val="ED561B"/>
-      </a:accent3>
-      <a:accent4>
-        <a:srgbClr val="EDEF00"/>
-      </a:accent4>
-      <a:accent5>
-        <a:srgbClr val="24CBE5"/>
-      </a:accent5>
-      <a:accent6>
-        <a:srgbClr val="64E572"/>
-      </a:accent6>
-      <a:hlink>
-        <a:srgbClr val="2200CC"/>
-      </a:hlink>
-      <a:folHlink>
-        <a:srgbClr val="551A8B"/>
-      </a:folHlink>
-    </a:clrScheme>
-    <a:fontScheme name="Office">
-      <a:majorFont>
-        <a:latin typeface="Arial"/>
-        <a:ea typeface=""/>
-        <a:cs typeface=""/>
-        <a:font script="Jpan" typeface="ＭＳ Ｐゴシック"/>
-        <a:font script="Hang" typeface="맑은 고딕"/>
-        <a:font script="Hans" typeface="宋体"/>
-        <a:font script="Hant" typeface="新細明體"/>
-        <a:font script="Arab" typeface="Times New Roman"/>
-        <a:font script="Hebr" typeface="Times New Roman"/>
-        <a:font script="Thai" typeface="Angsana New"/>
-        <a:font script="Ethi" typeface="Nyala"/>
-        <a:font script="Beng" typeface="Vrinda"/>
-        <a:font script="Gujr" typeface="Shruti"/>
-        <a:font script="Khmr" typeface="MoolBoran"/>
-        <a:font script="Knda" typeface="Tunga"/>
-        <a:font script="Guru" typeface="Raavi"/>
-        <a:font script="Cans" typeface="Euphemia"/>
-        <a:font script="Cher" typeface="Plantagenet Cherokee"/>
-        <a:font script="Yiii" typeface="Microsoft Yi Baiti"/>
-        <a:font script="Tibt" typeface="Microsoft Himalaya"/>
-        <a:font script="Thaa" typeface="MV Boli"/>
-        <a:font script="Deva" typeface="Mangal"/>
-        <a:font script="Telu" typeface="Gautami"/>
-        <a:font script="Taml" typeface="Latha"/>
-        <a:font script="Syrc" typeface="Estrangelo Edessa"/>
-        <a:font script="Orya" typeface="Kalinga"/>
-        <a:font script="Mlym" typeface="Kartika"/>
-        <a:font script="Laoo" typeface="DokChampa"/>
-        <a:font script="Sinh" typeface="Iskoola Pota"/>
-        <a:font script="Mong" typeface="Mongolian Baiti"/>
-        <a:font script="Viet" typeface="Times New Roman"/>
-        <a:font script="Uigh" typeface="Microsoft Uighur"/>
-        <a:font script="Geor" typeface="Sylfaen"/>
-      </a:majorFont>
-      <a:minorFont>
-        <a:latin typeface="Arial"/>
-        <a:ea typeface=""/>
-        <a:cs typeface=""/>
-        <a:font script="Jpan" typeface="ＭＳ Ｐゴシック"/>
-        <a:font script="Hang" typeface="맑은 고딕"/>
-        <a:font script="Hans" typeface="宋体"/>
-        <a:font script="Hant" typeface="新細明體"/>
-        <a:font script="Arab" typeface="Arial"/>
-        <a:font script="Hebr" typeface="Arial"/>
-        <a:font script="Thai" typeface="Cordia New"/>
-        <a:font script="Ethi" typeface="Nyala"/>
-        <a:font script="Beng" typeface="Vrinda"/>
-        <a:font script="Gujr" typeface="Shruti"/>
-        <a:font script="Khmr" typeface="DaunPenh"/>
-        <a:font script="Knda" typeface="Tunga"/>
-        <a:font script="Guru" typeface="Raavi"/>
-        <a:font script="Cans" typeface="Euphemia"/>
-        <a:font script="Cher" typeface="Plantagenet Cherokee"/>
-        <a:font script="Yiii" typeface="Microsoft Yi Baiti"/>
-        <a:font script="Tibt" typeface="Microsoft Himalaya"/>
-        <a:font script="Thaa" typeface="MV Boli"/>
-        <a:font script="Deva" typeface="Mangal"/>
-        <a:font script="Telu" typeface="Gautami"/>
-        <a:font script="Taml" typeface="Latha"/>
-        <a:font script="Syrc" typeface="Estrangelo Edessa"/>
-        <a:font script="Orya" typeface="Kalinga"/>
-        <a:font script="Mlym" typeface="Kartika"/>
-        <a:font script="Laoo" typeface="DokChampa"/>
-        <a:font script="Sinh" typeface="Iskoola Pota"/>
-        <a:font script="Mong" typeface="Mongolian Baiti"/>
-        <a:font script="Viet" typeface="Arial"/>
-        <a:font script="Uigh" typeface="Microsoft Uighur"/>
-        <a:font script="Geor" typeface="Sylfaen"/>
-      </a:minorFont>
-    </a:fontScheme>
-    <a:fmtScheme name="Office">
-      <a:fillStyleLst>
-        <a:solidFill>
-          <a:schemeClr val="phClr"/>
-        </a:solidFill>
-        <a:gradFill rotWithShape="1">
-          <a:gsLst>
-            <a:gs pos="0">
-              <a:schemeClr val="phClr">
-                <a:tint val="50000"/>
-                <a:satMod val="300000"/>
-              </a:schemeClr>
-            </a:gs>
-            <a:gs pos="35000">
-              <a:schemeClr val="phClr">
-                <a:tint val="37000"/>
-                <a:satMod val="300000"/>
-              </a:schemeClr>
-            </a:gs>
-            <a:gs pos="100000">
-              <a:schemeClr val="phClr">
-                <a:tint val="15000"/>
-                <a:satMod val="350000"/>
-              </a:schemeClr>
-            </a:gs>
-          </a:gsLst>
-          <a:lin ang="16200000" scaled="1"/>
-        </a:gradFill>
-        <a:gradFill rotWithShape="1">
-          <a:gsLst>
-            <a:gs pos="0">
-              <a:schemeClr val="phClr">
-                <a:tint val="100000"/>
-                <a:shade val="100000"/>
-                <a:satMod val="130000"/>
-              </a:schemeClr>
-            </a:gs>
-            <a:gs pos="100000">
-              <a:schemeClr val="phClr">
-                <a:tint val="50000"/>
-                <a:shade val="100000"/>
-                <a:satMod val="350000"/>
-              </a:schemeClr>
-            </a:gs>
-          </a:gsLst>
-          <a:lin ang="16200000" scaled="0"/>
-        </a:gradFill>
-      </a:fillStyleLst>
-      <a:lnStyleLst>
-        <a:ln w="9525" cap="flat" cmpd="sng" algn="ctr">
-          <a:solidFill>
-            <a:schemeClr val="phClr">
-              <a:shade val="95000"/>
-              <a:satMod val="105000"/>
-            </a:schemeClr>
-          </a:solidFill>
-          <a:prstDash val="solid"/>
-        </a:ln>
-        <a:ln w="25400" cap="flat" cmpd="sng" algn="ctr">
-          <a:solidFill>
-            <a:schemeClr val="phClr"/>
-          </a:solidFill>
-          <a:prstDash val="solid"/>
-        </a:ln>
-        <a:ln w="38100" cap="flat" cmpd="sng" algn="ctr">
-          <a:solidFill>
-            <a:schemeClr val="phClr"/>
-          </a:solidFill>
-          <a:prstDash val="solid"/>
-        </a:ln>
-      </a:lnStyleLst>
-      <a:effectStyleLst>
-        <a:effectStyle>
-          <a:effectLst>
-            <a:outerShdw blurRad="40000" dist="20000" dir="5400000" rotWithShape="0">
-              <a:srgbClr val="000000">
-                <a:alpha val="38000"/>
-              </a:srgbClr>
-            </a:outerShdw>
-          </a:effectLst>
-        </a:effectStyle>
-        <a:effectStyle>
-          <a:effectLst>
-            <a:outerShdw blurRad="40000" dist="23000" dir="5400000" rotWithShape="0">
-              <a:srgbClr val="000000">
-                <a:alpha val="35000"/>
-              </a:srgbClr>
-            </a:outerShdw>
-          </a:effectLst>
-        </a:effectStyle>
-        <a:effectStyle>
-          <a:effectLst>
-            <a:outerShdw blurRad="40000" dist="23000" dir="5400000" rotWithShape="0">
-              <a:srgbClr val="000000">
-                <a:alpha val="35000"/>
-              </a:srgbClr>
-            </a:outerShdw>
-          </a:effectLst>
-          <a:scene3d>
-            <a:camera prst="orthographicFront">
-              <a:rot lat="0" lon="0" rev="0"/>
-            </a:camera>
-            <a:lightRig rig="threePt" dir="t">
-              <a:rot lat="0" lon="0" rev="1200000"/>
-            </a:lightRig>
-          </a:scene3d>
-          <a:sp3d>
-            <a:bevelT w="63500" h="25400"/>
-          </a:sp3d>
-        </a:effectStyle>
-      </a:effectStyleLst>
-      <a:bgFillStyleLst>
-        <a:solidFill>
-          <a:schemeClr val="phClr"/>
-        </a:solidFill>
-        <a:gradFill rotWithShape="1">
-          <a:gsLst>
-            <a:gs pos="0">
-              <a:schemeClr val="phClr">
-                <a:tint val="40000"/>
-                <a:satMod val="350000"/>
-              </a:schemeClr>
-            </a:gs>
-            <a:gs pos="40000">
-              <a:schemeClr val="phClr">
-                <a:tint val="45000"/>
-                <a:shade val="99000"/>
-                <a:satMod val="350000"/>
-              </a:schemeClr>
-            </a:gs>
-            <a:gs pos="100000">
-              <a:schemeClr val="phClr">
-                <a:shade val="20000"/>
-                <a:satMod val="255000"/>
-              </a:schemeClr>
-            </a:gs>
-          </a:gsLst>
-          <a:path path="circle">
-            <a:fillToRect l="50000" t="-80000" r="50000" b="180000"/>
-          </a:path>
-        </a:gradFill>
-        <a:gradFill rotWithShape="1">
-          <a:gsLst>
-            <a:gs pos="0">
-              <a:schemeClr val="phClr">
-                <a:tint val="80000"/>
-                <a:satMod val="300000"/>
-              </a:schemeClr>
-            </a:gs>
-            <a:gs pos="100000">
-              <a:schemeClr val="phClr">
-                <a:shade val="30000"/>
-                <a:satMod val="200000"/>
-              </a:schemeClr>
-            </a:gs>
-          </a:gsLst>
-          <a:path path="circle">
-            <a:fillToRect l="50000" t="50000" r="50000" b="50000"/>
-          </a:path>
-        </a:gradFill>
-      </a:bgFillStyleLst>
-    </a:fmtScheme>
-  </a:themeElements>
-</a:theme>
 </file>
</xml_diff>

<commit_message>
update spacex example: add launch pads and shorten descriptions
</commit_message>
<xml_diff>
--- a/spacex_example/spacex_template.pptx
+++ b/spacex_example/spacex_template.pptx
@@ -18,16 +18,18 @@
     <p:sldId id="263" r:id="rId13"/>
     <p:sldId id="264" r:id="rId14"/>
     <p:sldId id="265" r:id="rId15"/>
+    <p:sldId id="266" r:id="rId16"/>
+    <p:sldId id="267" r:id="rId17"/>
   </p:sldIdLst>
   <p:sldSz cy="5143500" cx="9144000"/>
   <p:notesSz cx="6858000" cy="9144000"/>
   <p:embeddedFontLst>
     <p:embeddedFont>
       <p:font typeface="Nunito"/>
-      <p:regular r:id="rId16"/>
-      <p:bold r:id="rId17"/>
-      <p:italic r:id="rId18"/>
-      <p:boldItalic r:id="rId19"/>
+      <p:regular r:id="rId18"/>
+      <p:bold r:id="rId19"/>
+      <p:italic r:id="rId20"/>
+      <p:boldItalic r:id="rId21"/>
     </p:embeddedFont>
   </p:embeddedFontLst>
   <p:defaultTextStyle>
@@ -822,7 +824,7 @@
       </p:grpSpPr>
       <p:sp>
         <p:nvSpPr>
-          <p:cNvPr id="182" name="Google Shape;182;ge49eb32b0a_0_264:notes"/>
+          <p:cNvPr id="182" name="Google Shape;182;ge4bd750958_0_26:notes"/>
           <p:cNvSpPr/>
           <p:nvPr>
             <p:ph idx="2" type="sldImg"/>
@@ -857,7 +859,205 @@
       </p:sp>
       <p:sp>
         <p:nvSpPr>
-          <p:cNvPr id="183" name="Google Shape;183;ge49eb32b0a_0_264:notes"/>
+          <p:cNvPr id="183" name="Google Shape;183;ge4bd750958_0_26:notes"/>
+          <p:cNvSpPr txBox="1"/>
+          <p:nvPr>
+            <p:ph idx="1" type="body"/>
+          </p:nvPr>
+        </p:nvSpPr>
+        <p:spPr>
+          <a:xfrm>
+            <a:off x="685800" y="4343400"/>
+            <a:ext cx="5486400" cy="4114800"/>
+          </a:xfrm>
+          <a:prstGeom prst="rect">
+            <a:avLst/>
+          </a:prstGeom>
+        </p:spPr>
+        <p:txBody>
+          <a:bodyPr anchorCtr="0" anchor="t" bIns="91425" lIns="91425" spcFirstLastPara="1" rIns="91425" wrap="square" tIns="91425">
+            <a:noAutofit/>
+          </a:bodyPr>
+          <a:lstStyle/>
+          <a:p>
+            <a:pPr indent="0" lvl="0" marL="0" rtl="0" algn="l">
+              <a:spcBef>
+                <a:spcPts val="0"/>
+              </a:spcBef>
+              <a:spcAft>
+                <a:spcPts val="0"/>
+              </a:spcAft>
+              <a:buNone/>
+            </a:pPr>
+            <a:r>
+              <a:t/>
+            </a:r>
+            <a:endParaRPr/>
+          </a:p>
+        </p:txBody>
+      </p:sp>
+    </p:spTree>
+  </p:cSld>
+  <p:clrMapOvr>
+    <a:masterClrMapping/>
+  </p:clrMapOvr>
+</p:notes>
+</file>
+
+<file path=ppt/notesSlides/notesSlide11.xml><?xml version="1.0" encoding="utf-8"?>
+<p:notes xmlns:a="http://schemas.openxmlformats.org/drawingml/2006/main" xmlns:r="http://schemas.openxmlformats.org/officeDocument/2006/relationships" xmlns:mc="http://schemas.openxmlformats.org/markup-compatibility/2006" xmlns:mv="urn:schemas-microsoft-com:mac:vml" xmlns:p="http://schemas.openxmlformats.org/presentationml/2006/main" xmlns:c="http://schemas.openxmlformats.org/drawingml/2006/chart" xmlns:dgm="http://schemas.openxmlformats.org/drawingml/2006/diagram" xmlns:o="urn:schemas-microsoft-com:office:office" xmlns:v="urn:schemas-microsoft-com:vml" xmlns:pvml="urn:schemas-microsoft-com:office:powerpoint" xmlns:com="http://schemas.openxmlformats.org/drawingml/2006/compatibility" xmlns:p14="http://schemas.microsoft.com/office/powerpoint/2010/main" xmlns:p15="http://schemas.microsoft.com/office/powerpoint/2012/main" xmlns:ahyp="http://schemas.microsoft.com/office/drawing/2018/hyperlinkcolor" showMasterPhAnim="0" showMasterSp="0">
+  <p:cSld>
+    <p:spTree>
+      <p:nvGrpSpPr>
+        <p:cNvPr id="188" name="Shape 188"/>
+        <p:cNvGrpSpPr/>
+        <p:nvPr/>
+      </p:nvGrpSpPr>
+      <p:grpSpPr>
+        <a:xfrm>
+          <a:off x="0" y="0"/>
+          <a:ext cx="0" cy="0"/>
+          <a:chOff x="0" y="0"/>
+          <a:chExt cx="0" cy="0"/>
+        </a:xfrm>
+      </p:grpSpPr>
+      <p:sp>
+        <p:nvSpPr>
+          <p:cNvPr id="189" name="Google Shape;189;ge49eb32b0a_0_249:notes"/>
+          <p:cNvSpPr/>
+          <p:nvPr>
+            <p:ph idx="2" type="sldImg"/>
+          </p:nvPr>
+        </p:nvSpPr>
+        <p:spPr>
+          <a:xfrm>
+            <a:off x="381300" y="685800"/>
+            <a:ext cx="6096000" cy="3429000"/>
+          </a:xfrm>
+          <a:custGeom>
+            <a:rect b="b" l="l" r="r" t="t"/>
+            <a:pathLst>
+              <a:path extrusionOk="0" h="120000" w="120000">
+                <a:moveTo>
+                  <a:pt x="0" y="0"/>
+                </a:moveTo>
+                <a:lnTo>
+                  <a:pt x="120000" y="0"/>
+                </a:lnTo>
+                <a:lnTo>
+                  <a:pt x="120000" y="120000"/>
+                </a:lnTo>
+                <a:lnTo>
+                  <a:pt x="0" y="120000"/>
+                </a:lnTo>
+                <a:close/>
+              </a:path>
+            </a:pathLst>
+          </a:custGeom>
+        </p:spPr>
+      </p:sp>
+      <p:sp>
+        <p:nvSpPr>
+          <p:cNvPr id="190" name="Google Shape;190;ge49eb32b0a_0_249:notes"/>
+          <p:cNvSpPr txBox="1"/>
+          <p:nvPr>
+            <p:ph idx="1" type="body"/>
+          </p:nvPr>
+        </p:nvSpPr>
+        <p:spPr>
+          <a:xfrm>
+            <a:off x="685800" y="4343400"/>
+            <a:ext cx="5486400" cy="4114800"/>
+          </a:xfrm>
+          <a:prstGeom prst="rect">
+            <a:avLst/>
+          </a:prstGeom>
+        </p:spPr>
+        <p:txBody>
+          <a:bodyPr anchorCtr="0" anchor="t" bIns="91425" lIns="91425" spcFirstLastPara="1" rIns="91425" wrap="square" tIns="91425">
+            <a:noAutofit/>
+          </a:bodyPr>
+          <a:lstStyle/>
+          <a:p>
+            <a:pPr indent="0" lvl="0" marL="0" rtl="0" algn="l">
+              <a:spcBef>
+                <a:spcPts val="0"/>
+              </a:spcBef>
+              <a:spcAft>
+                <a:spcPts val="0"/>
+              </a:spcAft>
+              <a:buNone/>
+            </a:pPr>
+            <a:r>
+              <a:t/>
+            </a:r>
+            <a:endParaRPr/>
+          </a:p>
+        </p:txBody>
+      </p:sp>
+    </p:spTree>
+  </p:cSld>
+  <p:clrMapOvr>
+    <a:masterClrMapping/>
+  </p:clrMapOvr>
+</p:notes>
+</file>
+
+<file path=ppt/notesSlides/notesSlide12.xml><?xml version="1.0" encoding="utf-8"?>
+<p:notes xmlns:a="http://schemas.openxmlformats.org/drawingml/2006/main" xmlns:r="http://schemas.openxmlformats.org/officeDocument/2006/relationships" xmlns:mc="http://schemas.openxmlformats.org/markup-compatibility/2006" xmlns:mv="urn:schemas-microsoft-com:mac:vml" xmlns:p="http://schemas.openxmlformats.org/presentationml/2006/main" xmlns:c="http://schemas.openxmlformats.org/drawingml/2006/chart" xmlns:dgm="http://schemas.openxmlformats.org/drawingml/2006/diagram" xmlns:o="urn:schemas-microsoft-com:office:office" xmlns:v="urn:schemas-microsoft-com:vml" xmlns:pvml="urn:schemas-microsoft-com:office:powerpoint" xmlns:com="http://schemas.openxmlformats.org/drawingml/2006/compatibility" xmlns:p14="http://schemas.microsoft.com/office/powerpoint/2010/main" xmlns:p15="http://schemas.microsoft.com/office/powerpoint/2012/main" xmlns:ahyp="http://schemas.microsoft.com/office/drawing/2018/hyperlinkcolor" showMasterPhAnim="0" showMasterSp="0">
+  <p:cSld>
+    <p:spTree>
+      <p:nvGrpSpPr>
+        <p:cNvPr id="194" name="Shape 194"/>
+        <p:cNvGrpSpPr/>
+        <p:nvPr/>
+      </p:nvGrpSpPr>
+      <p:grpSpPr>
+        <a:xfrm>
+          <a:off x="0" y="0"/>
+          <a:ext cx="0" cy="0"/>
+          <a:chOff x="0" y="0"/>
+          <a:chExt cx="0" cy="0"/>
+        </a:xfrm>
+      </p:grpSpPr>
+      <p:sp>
+        <p:nvSpPr>
+          <p:cNvPr id="195" name="Google Shape;195;ge49eb32b0a_0_264:notes"/>
+          <p:cNvSpPr/>
+          <p:nvPr>
+            <p:ph idx="2" type="sldImg"/>
+          </p:nvPr>
+        </p:nvSpPr>
+        <p:spPr>
+          <a:xfrm>
+            <a:off x="381300" y="685800"/>
+            <a:ext cx="6096000" cy="3429000"/>
+          </a:xfrm>
+          <a:custGeom>
+            <a:rect b="b" l="l" r="r" t="t"/>
+            <a:pathLst>
+              <a:path extrusionOk="0" h="120000" w="120000">
+                <a:moveTo>
+                  <a:pt x="0" y="0"/>
+                </a:moveTo>
+                <a:lnTo>
+                  <a:pt x="120000" y="0"/>
+                </a:lnTo>
+                <a:lnTo>
+                  <a:pt x="120000" y="120000"/>
+                </a:lnTo>
+                <a:lnTo>
+                  <a:pt x="0" y="120000"/>
+                </a:lnTo>
+                <a:close/>
+              </a:path>
+            </a:pathLst>
+          </a:custGeom>
+        </p:spPr>
+      </p:sp>
+      <p:sp>
+        <p:nvSpPr>
+          <p:cNvPr id="196" name="Google Shape;196;ge49eb32b0a_0_264:notes"/>
           <p:cNvSpPr txBox="1"/>
           <p:nvPr>
             <p:ph idx="1" type="body"/>
@@ -1416,7 +1616,7 @@
       </p:grpSpPr>
       <p:sp>
         <p:nvSpPr>
-          <p:cNvPr id="163" name="Google Shape;163;ge4bd750958_0_10:notes"/>
+          <p:cNvPr id="163" name="Google Shape;163;ge4bd750958_0_32:notes"/>
           <p:cNvSpPr/>
           <p:nvPr>
             <p:ph idx="2" type="sldImg"/>
@@ -1451,7 +1651,7 @@
       </p:sp>
       <p:sp>
         <p:nvSpPr>
-          <p:cNvPr id="164" name="Google Shape;164;ge4bd750958_0_10:notes"/>
+          <p:cNvPr id="164" name="Google Shape;164;ge4bd750958_0_32:notes"/>
           <p:cNvSpPr txBox="1"/>
           <p:nvPr>
             <p:ph idx="1" type="body"/>
@@ -1515,7 +1715,7 @@
       </p:grpSpPr>
       <p:sp>
         <p:nvSpPr>
-          <p:cNvPr id="169" name="Google Shape;169;ge4bd750958_0_26:notes"/>
+          <p:cNvPr id="169" name="Google Shape;169;ge4bd750958_0_37:notes"/>
           <p:cNvSpPr/>
           <p:nvPr>
             <p:ph idx="2" type="sldImg"/>
@@ -1550,7 +1750,7 @@
       </p:sp>
       <p:sp>
         <p:nvSpPr>
-          <p:cNvPr id="170" name="Google Shape;170;ge4bd750958_0_26:notes"/>
+          <p:cNvPr id="170" name="Google Shape;170;ge4bd750958_0_37:notes"/>
           <p:cNvSpPr txBox="1"/>
           <p:nvPr>
             <p:ph idx="1" type="body"/>
@@ -1614,7 +1814,7 @@
       </p:grpSpPr>
       <p:sp>
         <p:nvSpPr>
-          <p:cNvPr id="176" name="Google Shape;176;ge49eb32b0a_0_249:notes"/>
+          <p:cNvPr id="176" name="Google Shape;176;ge4bd750958_0_10:notes"/>
           <p:cNvSpPr/>
           <p:nvPr>
             <p:ph idx="2" type="sldImg"/>
@@ -1649,7 +1849,7 @@
       </p:sp>
       <p:sp>
         <p:nvSpPr>
-          <p:cNvPr id="177" name="Google Shape;177;ge49eb32b0a_0_249:notes"/>
+          <p:cNvPr id="177" name="Google Shape;177;ge4bd750958_0_10:notes"/>
           <p:cNvSpPr txBox="1"/>
           <p:nvPr>
             <p:ph idx="1" type="body"/>
@@ -9921,7 +10121,7 @@
             </a:pPr>
             <a:r>
               <a:rPr lang="nl"/>
-              <a:t>{!ships}Ship: {name}</a:t>
+              <a:t>{!landing_pads}Landing pad: {name}</a:t>
             </a:r>
             <a:endParaRPr/>
           </a:p>
@@ -9962,6 +10162,359 @@
             </a:pPr>
             <a:r>
               <a:rPr lang="nl"/>
+              <a:t>Full name: {full_name}</a:t>
+            </a:r>
+            <a:endParaRPr/>
+          </a:p>
+          <a:p>
+            <a:pPr indent="-311150" lvl="0" marL="457200" rtl="0" algn="l">
+              <a:spcBef>
+                <a:spcPts val="0"/>
+              </a:spcBef>
+              <a:spcAft>
+                <a:spcPts val="0"/>
+              </a:spcAft>
+              <a:buSzPts val="1300"/>
+              <a:buChar char="●"/>
+            </a:pPr>
+            <a:r>
+              <a:rPr lang="nl"/>
+              <a:t>Description: {details}</a:t>
+            </a:r>
+            <a:endParaRPr/>
+          </a:p>
+          <a:p>
+            <a:pPr indent="-311150" lvl="0" marL="457200" rtl="0" algn="l">
+              <a:spcBef>
+                <a:spcPts val="0"/>
+              </a:spcBef>
+              <a:spcAft>
+                <a:spcPts val="0"/>
+              </a:spcAft>
+              <a:buSzPts val="1300"/>
+              <a:buChar char="●"/>
+            </a:pPr>
+            <a:r>
+              <a:rPr lang="nl"/>
+              <a:t>Type: {type}</a:t>
+            </a:r>
+            <a:endParaRPr/>
+          </a:p>
+          <a:p>
+            <a:pPr indent="-311150" lvl="0" marL="457200" rtl="0" algn="l">
+              <a:spcBef>
+                <a:spcPts val="0"/>
+              </a:spcBef>
+              <a:spcAft>
+                <a:spcPts val="0"/>
+              </a:spcAft>
+              <a:buSzPts val="1300"/>
+              <a:buChar char="●"/>
+            </a:pPr>
+            <a:r>
+              <a:rPr lang="nl"/>
+              <a:t>Location: {locality}, {region}</a:t>
+            </a:r>
+            <a:endParaRPr/>
+          </a:p>
+          <a:p>
+            <a:pPr indent="-311150" lvl="0" marL="457200" rtl="0" algn="l">
+              <a:spcBef>
+                <a:spcPts val="0"/>
+              </a:spcBef>
+              <a:spcAft>
+                <a:spcPts val="0"/>
+              </a:spcAft>
+              <a:buSzPts val="1300"/>
+              <a:buChar char="●"/>
+            </a:pPr>
+            <a:r>
+              <a:rPr lang="nl"/>
+              <a:t>Succeeded landing attempts: {landing_successes}/{landing_attempts}</a:t>
+            </a:r>
+            <a:endParaRPr/>
+          </a:p>
+          <a:p>
+            <a:pPr indent="-311150" lvl="0" marL="457200" rtl="0" algn="l">
+              <a:spcBef>
+                <a:spcPts val="0"/>
+              </a:spcBef>
+              <a:spcAft>
+                <a:spcPts val="0"/>
+              </a:spcAft>
+              <a:buSzPts val="1300"/>
+              <a:buChar char="●"/>
+            </a:pPr>
+            <a:r>
+              <a:rPr lang="nl"/>
+              <a:t>Status: {status}</a:t>
+            </a:r>
+            <a:endParaRPr/>
+          </a:p>
+          <a:p>
+            <a:pPr indent="-311150" lvl="0" marL="457200" rtl="0" algn="l">
+              <a:spcBef>
+                <a:spcPts val="0"/>
+              </a:spcBef>
+              <a:spcAft>
+                <a:spcPts val="0"/>
+              </a:spcAft>
+              <a:buSzPts val="1300"/>
+              <a:buChar char="●"/>
+            </a:pPr>
+            <a:r>
+              <a:rPr lang="nl"/>
+              <a:t>Wikipedia: {*wikipedia}</a:t>
+            </a:r>
+            <a:endParaRPr/>
+          </a:p>
+        </p:txBody>
+      </p:sp>
+      <p:sp>
+        <p:nvSpPr>
+          <p:cNvPr id="187" name="Google Shape;187;p22"/>
+          <p:cNvSpPr txBox="1"/>
+          <p:nvPr>
+            <p:ph idx="1" type="body"/>
+          </p:nvPr>
+        </p:nvSpPr>
+        <p:spPr>
+          <a:xfrm>
+            <a:off x="4572150" y="1990725"/>
+            <a:ext cx="3753000" cy="2448000"/>
+          </a:xfrm>
+          <a:prstGeom prst="rect">
+            <a:avLst/>
+          </a:prstGeom>
+        </p:spPr>
+        <p:txBody>
+          <a:bodyPr anchorCtr="0" anchor="t" bIns="91425" lIns="91425" spcFirstLastPara="1" rIns="91425" wrap="square" tIns="91425">
+            <a:normAutofit/>
+          </a:bodyPr>
+          <a:lstStyle/>
+          <a:p>
+            <a:pPr indent="0" lvl="0" marL="0" rtl="0" algn="l">
+              <a:spcBef>
+                <a:spcPts val="0"/>
+              </a:spcBef>
+              <a:spcAft>
+                <a:spcPts val="1200"/>
+              </a:spcAft>
+              <a:buNone/>
+            </a:pPr>
+            <a:r>
+              <a:rPr lang="nl"/>
+              <a:t>{%image}</a:t>
+            </a:r>
+            <a:endParaRPr/>
+          </a:p>
+        </p:txBody>
+      </p:sp>
+    </p:spTree>
+  </p:cSld>
+  <p:clrMapOvr>
+    <a:masterClrMapping/>
+  </p:clrMapOvr>
+</p:sld>
+</file>
+
+<file path=ppt/slides/slide11.xml><?xml version="1.0" encoding="utf-8"?>
+<p:sld xmlns:a="http://schemas.openxmlformats.org/drawingml/2006/main" xmlns:r="http://schemas.openxmlformats.org/officeDocument/2006/relationships" xmlns:mc="http://schemas.openxmlformats.org/markup-compatibility/2006" xmlns:mv="urn:schemas-microsoft-com:mac:vml" xmlns:p="http://schemas.openxmlformats.org/presentationml/2006/main" xmlns:c="http://schemas.openxmlformats.org/drawingml/2006/chart" xmlns:dgm="http://schemas.openxmlformats.org/drawingml/2006/diagram" xmlns:o="urn:schemas-microsoft-com:office:office" xmlns:v="urn:schemas-microsoft-com:vml" xmlns:pvml="urn:schemas-microsoft-com:office:powerpoint" xmlns:com="http://schemas.openxmlformats.org/drawingml/2006/compatibility" xmlns:p14="http://schemas.microsoft.com/office/powerpoint/2010/main" xmlns:p15="http://schemas.microsoft.com/office/powerpoint/2012/main" xmlns:ahyp="http://schemas.microsoft.com/office/drawing/2018/hyperlinkcolor">
+  <p:cSld>
+    <p:spTree>
+      <p:nvGrpSpPr>
+        <p:cNvPr id="191" name="Shape 191"/>
+        <p:cNvGrpSpPr/>
+        <p:nvPr/>
+      </p:nvGrpSpPr>
+      <p:grpSpPr>
+        <a:xfrm>
+          <a:off x="0" y="0"/>
+          <a:ext cx="0" cy="0"/>
+          <a:chOff x="0" y="0"/>
+          <a:chExt cx="0" cy="0"/>
+        </a:xfrm>
+      </p:grpSpPr>
+      <p:sp>
+        <p:nvSpPr>
+          <p:cNvPr id="192" name="Google Shape;192;p23"/>
+          <p:cNvSpPr txBox="1"/>
+          <p:nvPr>
+            <p:ph type="title"/>
+          </p:nvPr>
+        </p:nvSpPr>
+        <p:spPr>
+          <a:xfrm>
+            <a:off x="819150" y="845600"/>
+            <a:ext cx="7505700" cy="954600"/>
+          </a:xfrm>
+          <a:prstGeom prst="rect">
+            <a:avLst/>
+          </a:prstGeom>
+        </p:spPr>
+        <p:txBody>
+          <a:bodyPr anchorCtr="0" anchor="t" bIns="91425" lIns="91425" spcFirstLastPara="1" rIns="91425" wrap="square" tIns="91425">
+            <a:normAutofit/>
+          </a:bodyPr>
+          <a:lstStyle/>
+          <a:p>
+            <a:pPr indent="0" lvl="0" marL="0" rtl="0" algn="l">
+              <a:spcBef>
+                <a:spcPts val="0"/>
+              </a:spcBef>
+              <a:spcAft>
+                <a:spcPts val="0"/>
+              </a:spcAft>
+              <a:buNone/>
+            </a:pPr>
+            <a:r>
+              <a:rPr lang="nl"/>
+              <a:t>Ships</a:t>
+            </a:r>
+            <a:endParaRPr/>
+          </a:p>
+        </p:txBody>
+      </p:sp>
+      <p:sp>
+        <p:nvSpPr>
+          <p:cNvPr id="193" name="Google Shape;193;p23"/>
+          <p:cNvSpPr txBox="1"/>
+          <p:nvPr>
+            <p:ph idx="1" type="body"/>
+          </p:nvPr>
+        </p:nvSpPr>
+        <p:spPr>
+          <a:xfrm>
+            <a:off x="819150" y="1990725"/>
+            <a:ext cx="7505700" cy="2448000"/>
+          </a:xfrm>
+          <a:prstGeom prst="rect">
+            <a:avLst/>
+          </a:prstGeom>
+        </p:spPr>
+        <p:txBody>
+          <a:bodyPr anchorCtr="0" anchor="t" bIns="91425" lIns="91425" spcFirstLastPara="1" rIns="91425" wrap="square" tIns="91425">
+            <a:normAutofit/>
+          </a:bodyPr>
+          <a:lstStyle/>
+          <a:p>
+            <a:pPr indent="0" lvl="0" marL="0" rtl="0" algn="l">
+              <a:spcBef>
+                <a:spcPts val="0"/>
+              </a:spcBef>
+              <a:spcAft>
+                <a:spcPts val="1200"/>
+              </a:spcAft>
+              <a:buNone/>
+            </a:pPr>
+            <a:r>
+              <a:rPr lang="nl"/>
+              <a:t>{ships_description}</a:t>
+            </a:r>
+            <a:endParaRPr/>
+          </a:p>
+        </p:txBody>
+      </p:sp>
+    </p:spTree>
+  </p:cSld>
+  <p:clrMapOvr>
+    <a:masterClrMapping/>
+  </p:clrMapOvr>
+</p:sld>
+</file>
+
+<file path=ppt/slides/slide12.xml><?xml version="1.0" encoding="utf-8"?>
+<p:sld xmlns:a="http://schemas.openxmlformats.org/drawingml/2006/main" xmlns:r="http://schemas.openxmlformats.org/officeDocument/2006/relationships" xmlns:mc="http://schemas.openxmlformats.org/markup-compatibility/2006" xmlns:mv="urn:schemas-microsoft-com:mac:vml" xmlns:p="http://schemas.openxmlformats.org/presentationml/2006/main" xmlns:c="http://schemas.openxmlformats.org/drawingml/2006/chart" xmlns:dgm="http://schemas.openxmlformats.org/drawingml/2006/diagram" xmlns:o="urn:schemas-microsoft-com:office:office" xmlns:v="urn:schemas-microsoft-com:vml" xmlns:pvml="urn:schemas-microsoft-com:office:powerpoint" xmlns:com="http://schemas.openxmlformats.org/drawingml/2006/compatibility" xmlns:p14="http://schemas.microsoft.com/office/powerpoint/2010/main" xmlns:p15="http://schemas.microsoft.com/office/powerpoint/2012/main" xmlns:ahyp="http://schemas.microsoft.com/office/drawing/2018/hyperlinkcolor">
+  <p:cSld>
+    <p:spTree>
+      <p:nvGrpSpPr>
+        <p:cNvPr id="197" name="Shape 197"/>
+        <p:cNvGrpSpPr/>
+        <p:nvPr/>
+      </p:nvGrpSpPr>
+      <p:grpSpPr>
+        <a:xfrm>
+          <a:off x="0" y="0"/>
+          <a:ext cx="0" cy="0"/>
+          <a:chOff x="0" y="0"/>
+          <a:chExt cx="0" cy="0"/>
+        </a:xfrm>
+      </p:grpSpPr>
+      <p:sp>
+        <p:nvSpPr>
+          <p:cNvPr id="198" name="Google Shape;198;p24"/>
+          <p:cNvSpPr txBox="1"/>
+          <p:nvPr>
+            <p:ph type="title"/>
+          </p:nvPr>
+        </p:nvSpPr>
+        <p:spPr>
+          <a:xfrm>
+            <a:off x="819150" y="845600"/>
+            <a:ext cx="7505700" cy="954600"/>
+          </a:xfrm>
+          <a:prstGeom prst="rect">
+            <a:avLst/>
+          </a:prstGeom>
+        </p:spPr>
+        <p:txBody>
+          <a:bodyPr anchorCtr="0" anchor="t" bIns="91425" lIns="91425" spcFirstLastPara="1" rIns="91425" wrap="square" tIns="91425">
+            <a:normAutofit/>
+          </a:bodyPr>
+          <a:lstStyle/>
+          <a:p>
+            <a:pPr indent="0" lvl="0" marL="0" rtl="0" algn="l">
+              <a:spcBef>
+                <a:spcPts val="0"/>
+              </a:spcBef>
+              <a:spcAft>
+                <a:spcPts val="0"/>
+              </a:spcAft>
+              <a:buNone/>
+            </a:pPr>
+            <a:r>
+              <a:rPr lang="nl"/>
+              <a:t>{!ships}Ship: {name}</a:t>
+            </a:r>
+            <a:endParaRPr/>
+          </a:p>
+        </p:txBody>
+      </p:sp>
+      <p:sp>
+        <p:nvSpPr>
+          <p:cNvPr id="199" name="Google Shape;199;p24"/>
+          <p:cNvSpPr txBox="1"/>
+          <p:nvPr>
+            <p:ph idx="1" type="body"/>
+          </p:nvPr>
+        </p:nvSpPr>
+        <p:spPr>
+          <a:xfrm>
+            <a:off x="819150" y="1990725"/>
+            <a:ext cx="3753000" cy="2448000"/>
+          </a:xfrm>
+          <a:prstGeom prst="rect">
+            <a:avLst/>
+          </a:prstGeom>
+        </p:spPr>
+        <p:txBody>
+          <a:bodyPr anchorCtr="0" anchor="t" bIns="91425" lIns="91425" spcFirstLastPara="1" rIns="91425" wrap="square" tIns="91425">
+            <a:normAutofit/>
+          </a:bodyPr>
+          <a:lstStyle/>
+          <a:p>
+            <a:pPr indent="-311150" lvl="0" marL="457200" rtl="0" algn="l">
+              <a:spcBef>
+                <a:spcPts val="0"/>
+              </a:spcBef>
+              <a:spcAft>
+                <a:spcPts val="0"/>
+              </a:spcAft>
+              <a:buSzPts val="1300"/>
+              <a:buChar char="●"/>
+            </a:pPr>
+            <a:r>
+              <a:rPr lang="nl"/>
               <a:t>Roles: </a:t>
             </a:r>
             <a:endParaRPr/>
@@ -10030,7 +10583,7 @@
             </a:pPr>
             <a:r>
               <a:rPr lang="nl"/>
-              <a:t>Year built: {year_built}</a:t>
+              <a:t>{#year_built}Year built: {year_built}{/year_built}</a:t>
             </a:r>
             <a:endParaRPr/>
           </a:p>
@@ -10038,7 +10591,7 @@
       </p:sp>
       <p:sp>
         <p:nvSpPr>
-          <p:cNvPr id="187" name="Google Shape;187;p22"/>
+          <p:cNvPr id="200" name="Google Shape;200;p24"/>
           <p:cNvSpPr txBox="1"/>
           <p:nvPr>
             <p:ph idx="1" type="body"/>
@@ -10964,7 +11517,11 @@
             </a:pPr>
             <a:r>
               <a:rPr lang="nl"/>
-              <a:t>Landing pads</a:t>
+              <a:t>Launch</a:t>
+            </a:r>
+            <a:r>
+              <a:rPr lang="nl"/>
+              <a:t> pads</a:t>
             </a:r>
             <a:endParaRPr/>
           </a:p>
@@ -11004,7 +11561,7 @@
             </a:pPr>
             <a:r>
               <a:rPr lang="nl"/>
-              <a:t>{landing_pads_description}</a:t>
+              <a:t>{launch_pads_description}</a:t>
             </a:r>
             <a:endParaRPr/>
           </a:p>
@@ -11069,7 +11626,7 @@
             </a:pPr>
             <a:r>
               <a:rPr lang="nl"/>
-              <a:t>{!landing_pads}Landing pad: {full_name}</a:t>
+              <a:t>{!launch_pads}Launch pad: {name}</a:t>
             </a:r>
             <a:endParaRPr/>
           </a:p>
@@ -11110,7 +11667,7 @@
             </a:pPr>
             <a:r>
               <a:rPr lang="nl"/>
-              <a:t>Description: {details}</a:t>
+              <a:t>Full name: {full_name}</a:t>
             </a:r>
             <a:endParaRPr/>
           </a:p>
@@ -11127,7 +11684,7 @@
             </a:pPr>
             <a:r>
               <a:rPr lang="nl"/>
-              <a:t>Type: {type}</a:t>
+              <a:t>Description: {details}</a:t>
             </a:r>
             <a:endParaRPr/>
           </a:p>
@@ -11161,7 +11718,7 @@
             </a:pPr>
             <a:r>
               <a:rPr lang="nl"/>
-              <a:t>Succeeded landing attempts: {landing_successes}/{landing_attempts}</a:t>
+              <a:t>Succeeded launch attempts: {launch_successes}/{launch_attempts}</a:t>
             </a:r>
             <a:endParaRPr/>
           </a:p>
@@ -11179,23 +11736,6 @@
             <a:r>
               <a:rPr lang="nl"/>
               <a:t>Status: {status}</a:t>
-            </a:r>
-            <a:endParaRPr/>
-          </a:p>
-          <a:p>
-            <a:pPr indent="-311150" lvl="0" marL="457200" rtl="0" algn="l">
-              <a:spcBef>
-                <a:spcPts val="0"/>
-              </a:spcBef>
-              <a:spcAft>
-                <a:spcPts val="0"/>
-              </a:spcAft>
-              <a:buSzPts val="1300"/>
-              <a:buChar char="●"/>
-            </a:pPr>
-            <a:r>
-              <a:rPr lang="nl"/>
-              <a:t>Wikipedia: {*wikipedia}</a:t>
             </a:r>
             <a:endParaRPr/>
           </a:p>
@@ -11300,7 +11840,7 @@
             </a:pPr>
             <a:r>
               <a:rPr lang="nl"/>
-              <a:t>Ships</a:t>
+              <a:t>Landing pads</a:t>
             </a:r>
             <a:endParaRPr/>
           </a:p>
@@ -11340,7 +11880,7 @@
             </a:pPr>
             <a:r>
               <a:rPr lang="nl"/>
-              <a:t>{ships_description}</a:t>
+              <a:t>{landing_pads_description}</a:t>
             </a:r>
             <a:endParaRPr/>
           </a:p>
@@ -11355,6 +11895,285 @@
 </file>
 
 <file path=ppt/theme/theme1.xml><?xml version="1.0" encoding="utf-8"?>
+<a:theme xmlns:a="http://schemas.openxmlformats.org/drawingml/2006/main" xmlns:r="http://schemas.openxmlformats.org/officeDocument/2006/relationships" name="Shift">
+  <a:themeElements>
+    <a:clrScheme name="Shift">
+      <a:dk1>
+        <a:srgbClr val="FFFFFF"/>
+      </a:dk1>
+      <a:lt1>
+        <a:srgbClr val="AF7B51"/>
+      </a:lt1>
+      <a:dk2>
+        <a:srgbClr val="233A44"/>
+      </a:dk2>
+      <a:lt2>
+        <a:srgbClr val="D9D9D9"/>
+      </a:lt2>
+      <a:accent1>
+        <a:srgbClr val="00796B"/>
+      </a:accent1>
+      <a:accent2>
+        <a:srgbClr val="D9563F"/>
+      </a:accent2>
+      <a:accent3>
+        <a:srgbClr val="C4A15A"/>
+      </a:accent3>
+      <a:accent4>
+        <a:srgbClr val="14F597"/>
+      </a:accent4>
+      <a:accent5>
+        <a:srgbClr val="3D4594"/>
+      </a:accent5>
+      <a:accent6>
+        <a:srgbClr val="163EF5"/>
+      </a:accent6>
+      <a:hlink>
+        <a:srgbClr val="3D4594"/>
+      </a:hlink>
+      <a:folHlink>
+        <a:srgbClr val="3D4594"/>
+      </a:folHlink>
+    </a:clrScheme>
+    <a:fontScheme name="Office">
+      <a:majorFont>
+        <a:latin typeface="Arial"/>
+        <a:ea typeface=""/>
+        <a:cs typeface=""/>
+        <a:font script="Jpan" typeface="ＭＳ Ｐゴシック"/>
+        <a:font script="Hang" typeface="맑은 고딕"/>
+        <a:font script="Hans" typeface="宋体"/>
+        <a:font script="Hant" typeface="新細明體"/>
+        <a:font script="Arab" typeface="Times New Roman"/>
+        <a:font script="Hebr" typeface="Times New Roman"/>
+        <a:font script="Thai" typeface="Angsana New"/>
+        <a:font script="Ethi" typeface="Nyala"/>
+        <a:font script="Beng" typeface="Vrinda"/>
+        <a:font script="Gujr" typeface="Shruti"/>
+        <a:font script="Khmr" typeface="MoolBoran"/>
+        <a:font script="Knda" typeface="Tunga"/>
+        <a:font script="Guru" typeface="Raavi"/>
+        <a:font script="Cans" typeface="Euphemia"/>
+        <a:font script="Cher" typeface="Plantagenet Cherokee"/>
+        <a:font script="Yiii" typeface="Microsoft Yi Baiti"/>
+        <a:font script="Tibt" typeface="Microsoft Himalaya"/>
+        <a:font script="Thaa" typeface="MV Boli"/>
+        <a:font script="Deva" typeface="Mangal"/>
+        <a:font script="Telu" typeface="Gautami"/>
+        <a:font script="Taml" typeface="Latha"/>
+        <a:font script="Syrc" typeface="Estrangelo Edessa"/>
+        <a:font script="Orya" typeface="Kalinga"/>
+        <a:font script="Mlym" typeface="Kartika"/>
+        <a:font script="Laoo" typeface="DokChampa"/>
+        <a:font script="Sinh" typeface="Iskoola Pota"/>
+        <a:font script="Mong" typeface="Mongolian Baiti"/>
+        <a:font script="Viet" typeface="Times New Roman"/>
+        <a:font script="Uigh" typeface="Microsoft Uighur"/>
+        <a:font script="Geor" typeface="Sylfaen"/>
+      </a:majorFont>
+      <a:minorFont>
+        <a:latin typeface="Arial"/>
+        <a:ea typeface=""/>
+        <a:cs typeface=""/>
+        <a:font script="Jpan" typeface="ＭＳ Ｐゴシック"/>
+        <a:font script="Hang" typeface="맑은 고딕"/>
+        <a:font script="Hans" typeface="宋体"/>
+        <a:font script="Hant" typeface="新細明體"/>
+        <a:font script="Arab" typeface="Arial"/>
+        <a:font script="Hebr" typeface="Arial"/>
+        <a:font script="Thai" typeface="Cordia New"/>
+        <a:font script="Ethi" typeface="Nyala"/>
+        <a:font script="Beng" typeface="Vrinda"/>
+        <a:font script="Gujr" typeface="Shruti"/>
+        <a:font script="Khmr" typeface="DaunPenh"/>
+        <a:font script="Knda" typeface="Tunga"/>
+        <a:font script="Guru" typeface="Raavi"/>
+        <a:font script="Cans" typeface="Euphemia"/>
+        <a:font script="Cher" typeface="Plantagenet Cherokee"/>
+        <a:font script="Yiii" typeface="Microsoft Yi Baiti"/>
+        <a:font script="Tibt" typeface="Microsoft Himalaya"/>
+        <a:font script="Thaa" typeface="MV Boli"/>
+        <a:font script="Deva" typeface="Mangal"/>
+        <a:font script="Telu" typeface="Gautami"/>
+        <a:font script="Taml" typeface="Latha"/>
+        <a:font script="Syrc" typeface="Estrangelo Edessa"/>
+        <a:font script="Orya" typeface="Kalinga"/>
+        <a:font script="Mlym" typeface="Kartika"/>
+        <a:font script="Laoo" typeface="DokChampa"/>
+        <a:font script="Sinh" typeface="Iskoola Pota"/>
+        <a:font script="Mong" typeface="Mongolian Baiti"/>
+        <a:font script="Viet" typeface="Arial"/>
+        <a:font script="Uigh" typeface="Microsoft Uighur"/>
+        <a:font script="Geor" typeface="Sylfaen"/>
+      </a:minorFont>
+    </a:fontScheme>
+    <a:fmtScheme name="Office">
+      <a:fillStyleLst>
+        <a:solidFill>
+          <a:schemeClr val="phClr"/>
+        </a:solidFill>
+        <a:gradFill rotWithShape="1">
+          <a:gsLst>
+            <a:gs pos="0">
+              <a:schemeClr val="phClr">
+                <a:tint val="50000"/>
+                <a:satMod val="300000"/>
+              </a:schemeClr>
+            </a:gs>
+            <a:gs pos="35000">
+              <a:schemeClr val="phClr">
+                <a:tint val="37000"/>
+                <a:satMod val="300000"/>
+              </a:schemeClr>
+            </a:gs>
+            <a:gs pos="100000">
+              <a:schemeClr val="phClr">
+                <a:tint val="15000"/>
+                <a:satMod val="350000"/>
+              </a:schemeClr>
+            </a:gs>
+          </a:gsLst>
+          <a:lin ang="16200000" scaled="1"/>
+        </a:gradFill>
+        <a:gradFill rotWithShape="1">
+          <a:gsLst>
+            <a:gs pos="0">
+              <a:schemeClr val="phClr">
+                <a:tint val="100000"/>
+                <a:shade val="100000"/>
+                <a:satMod val="130000"/>
+              </a:schemeClr>
+            </a:gs>
+            <a:gs pos="100000">
+              <a:schemeClr val="phClr">
+                <a:tint val="50000"/>
+                <a:shade val="100000"/>
+                <a:satMod val="350000"/>
+              </a:schemeClr>
+            </a:gs>
+          </a:gsLst>
+          <a:lin ang="16200000" scaled="0"/>
+        </a:gradFill>
+      </a:fillStyleLst>
+      <a:lnStyleLst>
+        <a:ln w="9525" cap="flat" cmpd="sng" algn="ctr">
+          <a:solidFill>
+            <a:schemeClr val="phClr">
+              <a:shade val="95000"/>
+              <a:satMod val="105000"/>
+            </a:schemeClr>
+          </a:solidFill>
+          <a:prstDash val="solid"/>
+        </a:ln>
+        <a:ln w="25400" cap="flat" cmpd="sng" algn="ctr">
+          <a:solidFill>
+            <a:schemeClr val="phClr"/>
+          </a:solidFill>
+          <a:prstDash val="solid"/>
+        </a:ln>
+        <a:ln w="38100" cap="flat" cmpd="sng" algn="ctr">
+          <a:solidFill>
+            <a:schemeClr val="phClr"/>
+          </a:solidFill>
+          <a:prstDash val="solid"/>
+        </a:ln>
+      </a:lnStyleLst>
+      <a:effectStyleLst>
+        <a:effectStyle>
+          <a:effectLst>
+            <a:outerShdw blurRad="40000" dist="20000" dir="5400000" rotWithShape="0">
+              <a:srgbClr val="000000">
+                <a:alpha val="38000"/>
+              </a:srgbClr>
+            </a:outerShdw>
+          </a:effectLst>
+        </a:effectStyle>
+        <a:effectStyle>
+          <a:effectLst>
+            <a:outerShdw blurRad="40000" dist="23000" dir="5400000" rotWithShape="0">
+              <a:srgbClr val="000000">
+                <a:alpha val="35000"/>
+              </a:srgbClr>
+            </a:outerShdw>
+          </a:effectLst>
+        </a:effectStyle>
+        <a:effectStyle>
+          <a:effectLst>
+            <a:outerShdw blurRad="40000" dist="23000" dir="5400000" rotWithShape="0">
+              <a:srgbClr val="000000">
+                <a:alpha val="35000"/>
+              </a:srgbClr>
+            </a:outerShdw>
+          </a:effectLst>
+          <a:scene3d>
+            <a:camera prst="orthographicFront">
+              <a:rot lat="0" lon="0" rev="0"/>
+            </a:camera>
+            <a:lightRig rig="threePt" dir="t">
+              <a:rot lat="0" lon="0" rev="1200000"/>
+            </a:lightRig>
+          </a:scene3d>
+          <a:sp3d>
+            <a:bevelT w="63500" h="25400"/>
+          </a:sp3d>
+        </a:effectStyle>
+      </a:effectStyleLst>
+      <a:bgFillStyleLst>
+        <a:solidFill>
+          <a:schemeClr val="phClr"/>
+        </a:solidFill>
+        <a:gradFill rotWithShape="1">
+          <a:gsLst>
+            <a:gs pos="0">
+              <a:schemeClr val="phClr">
+                <a:tint val="40000"/>
+                <a:satMod val="350000"/>
+              </a:schemeClr>
+            </a:gs>
+            <a:gs pos="40000">
+              <a:schemeClr val="phClr">
+                <a:tint val="45000"/>
+                <a:shade val="99000"/>
+                <a:satMod val="350000"/>
+              </a:schemeClr>
+            </a:gs>
+            <a:gs pos="100000">
+              <a:schemeClr val="phClr">
+                <a:shade val="20000"/>
+                <a:satMod val="255000"/>
+              </a:schemeClr>
+            </a:gs>
+          </a:gsLst>
+          <a:path path="circle">
+            <a:fillToRect l="50000" t="-80000" r="50000" b="180000"/>
+          </a:path>
+        </a:gradFill>
+        <a:gradFill rotWithShape="1">
+          <a:gsLst>
+            <a:gs pos="0">
+              <a:schemeClr val="phClr">
+                <a:tint val="80000"/>
+                <a:satMod val="300000"/>
+              </a:schemeClr>
+            </a:gs>
+            <a:gs pos="100000">
+              <a:schemeClr val="phClr">
+                <a:shade val="30000"/>
+                <a:satMod val="200000"/>
+              </a:schemeClr>
+            </a:gs>
+          </a:gsLst>
+          <a:path path="circle">
+            <a:fillToRect l="50000" t="50000" r="50000" b="50000"/>
+          </a:path>
+        </a:gradFill>
+      </a:bgFillStyleLst>
+    </a:fmtScheme>
+  </a:themeElements>
+</a:theme>
+</file>
+
+<file path=ppt/theme/theme2.xml><?xml version="1.0" encoding="utf-8"?>
 <a:theme xmlns:a="http://schemas.openxmlformats.org/drawingml/2006/main" xmlns:r="http://schemas.openxmlformats.org/officeDocument/2006/relationships">
   <a:themeElements>
     <a:clrScheme name="Default">
@@ -11631,283 +12450,4 @@
     </a:fmtScheme>
   </a:themeElements>
 </a:theme>
-</file>
-
-<file path=ppt/theme/theme2.xml><?xml version="1.0" encoding="utf-8"?>
-<a:theme xmlns:a="http://schemas.openxmlformats.org/drawingml/2006/main" xmlns:r="http://schemas.openxmlformats.org/officeDocument/2006/relationships" name="Shift">
-  <a:themeElements>
-    <a:clrScheme name="Shift">
-      <a:dk1>
-        <a:srgbClr val="FFFFFF"/>
-      </a:dk1>
-      <a:lt1>
-        <a:srgbClr val="AF7B51"/>
-      </a:lt1>
-      <a:dk2>
-        <a:srgbClr val="233A44"/>
-      </a:dk2>
-      <a:lt2>
-        <a:srgbClr val="D9D9D9"/>
-      </a:lt2>
-      <a:accent1>
-        <a:srgbClr val="00796B"/>
-      </a:accent1>
-      <a:accent2>
-        <a:srgbClr val="D9563F"/>
-      </a:accent2>
-      <a:accent3>
-        <a:srgbClr val="C4A15A"/>
-      </a:accent3>
-      <a:accent4>
-        <a:srgbClr val="14F597"/>
-      </a:accent4>
-      <a:accent5>
-        <a:srgbClr val="3D4594"/>
-      </a:accent5>
-      <a:accent6>
-        <a:srgbClr val="163EF5"/>
-      </a:accent6>
-      <a:hlink>
-        <a:srgbClr val="3D4594"/>
-      </a:hlink>
-      <a:folHlink>
-        <a:srgbClr val="3D4594"/>
-      </a:folHlink>
-    </a:clrScheme>
-    <a:fontScheme name="Office">
-      <a:majorFont>
-        <a:latin typeface="Arial"/>
-        <a:ea typeface=""/>
-        <a:cs typeface=""/>
-        <a:font script="Jpan" typeface="ＭＳ Ｐゴシック"/>
-        <a:font script="Hang" typeface="맑은 고딕"/>
-        <a:font script="Hans" typeface="宋体"/>
-        <a:font script="Hant" typeface="新細明體"/>
-        <a:font script="Arab" typeface="Times New Roman"/>
-        <a:font script="Hebr" typeface="Times New Roman"/>
-        <a:font script="Thai" typeface="Angsana New"/>
-        <a:font script="Ethi" typeface="Nyala"/>
-        <a:font script="Beng" typeface="Vrinda"/>
-        <a:font script="Gujr" typeface="Shruti"/>
-        <a:font script="Khmr" typeface="MoolBoran"/>
-        <a:font script="Knda" typeface="Tunga"/>
-        <a:font script="Guru" typeface="Raavi"/>
-        <a:font script="Cans" typeface="Euphemia"/>
-        <a:font script="Cher" typeface="Plantagenet Cherokee"/>
-        <a:font script="Yiii" typeface="Microsoft Yi Baiti"/>
-        <a:font script="Tibt" typeface="Microsoft Himalaya"/>
-        <a:font script="Thaa" typeface="MV Boli"/>
-        <a:font script="Deva" typeface="Mangal"/>
-        <a:font script="Telu" typeface="Gautami"/>
-        <a:font script="Taml" typeface="Latha"/>
-        <a:font script="Syrc" typeface="Estrangelo Edessa"/>
-        <a:font script="Orya" typeface="Kalinga"/>
-        <a:font script="Mlym" typeface="Kartika"/>
-        <a:font script="Laoo" typeface="DokChampa"/>
-        <a:font script="Sinh" typeface="Iskoola Pota"/>
-        <a:font script="Mong" typeface="Mongolian Baiti"/>
-        <a:font script="Viet" typeface="Times New Roman"/>
-        <a:font script="Uigh" typeface="Microsoft Uighur"/>
-        <a:font script="Geor" typeface="Sylfaen"/>
-      </a:majorFont>
-      <a:minorFont>
-        <a:latin typeface="Arial"/>
-        <a:ea typeface=""/>
-        <a:cs typeface=""/>
-        <a:font script="Jpan" typeface="ＭＳ Ｐゴシック"/>
-        <a:font script="Hang" typeface="맑은 고딕"/>
-        <a:font script="Hans" typeface="宋体"/>
-        <a:font script="Hant" typeface="新細明體"/>
-        <a:font script="Arab" typeface="Arial"/>
-        <a:font script="Hebr" typeface="Arial"/>
-        <a:font script="Thai" typeface="Cordia New"/>
-        <a:font script="Ethi" typeface="Nyala"/>
-        <a:font script="Beng" typeface="Vrinda"/>
-        <a:font script="Gujr" typeface="Shruti"/>
-        <a:font script="Khmr" typeface="DaunPenh"/>
-        <a:font script="Knda" typeface="Tunga"/>
-        <a:font script="Guru" typeface="Raavi"/>
-        <a:font script="Cans" typeface="Euphemia"/>
-        <a:font script="Cher" typeface="Plantagenet Cherokee"/>
-        <a:font script="Yiii" typeface="Microsoft Yi Baiti"/>
-        <a:font script="Tibt" typeface="Microsoft Himalaya"/>
-        <a:font script="Thaa" typeface="MV Boli"/>
-        <a:font script="Deva" typeface="Mangal"/>
-        <a:font script="Telu" typeface="Gautami"/>
-        <a:font script="Taml" typeface="Latha"/>
-        <a:font script="Syrc" typeface="Estrangelo Edessa"/>
-        <a:font script="Orya" typeface="Kalinga"/>
-        <a:font script="Mlym" typeface="Kartika"/>
-        <a:font script="Laoo" typeface="DokChampa"/>
-        <a:font script="Sinh" typeface="Iskoola Pota"/>
-        <a:font script="Mong" typeface="Mongolian Baiti"/>
-        <a:font script="Viet" typeface="Arial"/>
-        <a:font script="Uigh" typeface="Microsoft Uighur"/>
-        <a:font script="Geor" typeface="Sylfaen"/>
-      </a:minorFont>
-    </a:fontScheme>
-    <a:fmtScheme name="Office">
-      <a:fillStyleLst>
-        <a:solidFill>
-          <a:schemeClr val="phClr"/>
-        </a:solidFill>
-        <a:gradFill rotWithShape="1">
-          <a:gsLst>
-            <a:gs pos="0">
-              <a:schemeClr val="phClr">
-                <a:tint val="50000"/>
-                <a:satMod val="300000"/>
-              </a:schemeClr>
-            </a:gs>
-            <a:gs pos="35000">
-              <a:schemeClr val="phClr">
-                <a:tint val="37000"/>
-                <a:satMod val="300000"/>
-              </a:schemeClr>
-            </a:gs>
-            <a:gs pos="100000">
-              <a:schemeClr val="phClr">
-                <a:tint val="15000"/>
-                <a:satMod val="350000"/>
-              </a:schemeClr>
-            </a:gs>
-          </a:gsLst>
-          <a:lin ang="16200000" scaled="1"/>
-        </a:gradFill>
-        <a:gradFill rotWithShape="1">
-          <a:gsLst>
-            <a:gs pos="0">
-              <a:schemeClr val="phClr">
-                <a:tint val="100000"/>
-                <a:shade val="100000"/>
-                <a:satMod val="130000"/>
-              </a:schemeClr>
-            </a:gs>
-            <a:gs pos="100000">
-              <a:schemeClr val="phClr">
-                <a:tint val="50000"/>
-                <a:shade val="100000"/>
-                <a:satMod val="350000"/>
-              </a:schemeClr>
-            </a:gs>
-          </a:gsLst>
-          <a:lin ang="16200000" scaled="0"/>
-        </a:gradFill>
-      </a:fillStyleLst>
-      <a:lnStyleLst>
-        <a:ln w="9525" cap="flat" cmpd="sng" algn="ctr">
-          <a:solidFill>
-            <a:schemeClr val="phClr">
-              <a:shade val="95000"/>
-              <a:satMod val="105000"/>
-            </a:schemeClr>
-          </a:solidFill>
-          <a:prstDash val="solid"/>
-        </a:ln>
-        <a:ln w="25400" cap="flat" cmpd="sng" algn="ctr">
-          <a:solidFill>
-            <a:schemeClr val="phClr"/>
-          </a:solidFill>
-          <a:prstDash val="solid"/>
-        </a:ln>
-        <a:ln w="38100" cap="flat" cmpd="sng" algn="ctr">
-          <a:solidFill>
-            <a:schemeClr val="phClr"/>
-          </a:solidFill>
-          <a:prstDash val="solid"/>
-        </a:ln>
-      </a:lnStyleLst>
-      <a:effectStyleLst>
-        <a:effectStyle>
-          <a:effectLst>
-            <a:outerShdw blurRad="40000" dist="20000" dir="5400000" rotWithShape="0">
-              <a:srgbClr val="000000">
-                <a:alpha val="38000"/>
-              </a:srgbClr>
-            </a:outerShdw>
-          </a:effectLst>
-        </a:effectStyle>
-        <a:effectStyle>
-          <a:effectLst>
-            <a:outerShdw blurRad="40000" dist="23000" dir="5400000" rotWithShape="0">
-              <a:srgbClr val="000000">
-                <a:alpha val="35000"/>
-              </a:srgbClr>
-            </a:outerShdw>
-          </a:effectLst>
-        </a:effectStyle>
-        <a:effectStyle>
-          <a:effectLst>
-            <a:outerShdw blurRad="40000" dist="23000" dir="5400000" rotWithShape="0">
-              <a:srgbClr val="000000">
-                <a:alpha val="35000"/>
-              </a:srgbClr>
-            </a:outerShdw>
-          </a:effectLst>
-          <a:scene3d>
-            <a:camera prst="orthographicFront">
-              <a:rot lat="0" lon="0" rev="0"/>
-            </a:camera>
-            <a:lightRig rig="threePt" dir="t">
-              <a:rot lat="0" lon="0" rev="1200000"/>
-            </a:lightRig>
-          </a:scene3d>
-          <a:sp3d>
-            <a:bevelT w="63500" h="25400"/>
-          </a:sp3d>
-        </a:effectStyle>
-      </a:effectStyleLst>
-      <a:bgFillStyleLst>
-        <a:solidFill>
-          <a:schemeClr val="phClr"/>
-        </a:solidFill>
-        <a:gradFill rotWithShape="1">
-          <a:gsLst>
-            <a:gs pos="0">
-              <a:schemeClr val="phClr">
-                <a:tint val="40000"/>
-                <a:satMod val="350000"/>
-              </a:schemeClr>
-            </a:gs>
-            <a:gs pos="40000">
-              <a:schemeClr val="phClr">
-                <a:tint val="45000"/>
-                <a:shade val="99000"/>
-                <a:satMod val="350000"/>
-              </a:schemeClr>
-            </a:gs>
-            <a:gs pos="100000">
-              <a:schemeClr val="phClr">
-                <a:shade val="20000"/>
-                <a:satMod val="255000"/>
-              </a:schemeClr>
-            </a:gs>
-          </a:gsLst>
-          <a:path path="circle">
-            <a:fillToRect l="50000" t="-80000" r="50000" b="180000"/>
-          </a:path>
-        </a:gradFill>
-        <a:gradFill rotWithShape="1">
-          <a:gsLst>
-            <a:gs pos="0">
-              <a:schemeClr val="phClr">
-                <a:tint val="80000"/>
-                <a:satMod val="300000"/>
-              </a:schemeClr>
-            </a:gs>
-            <a:gs pos="100000">
-              <a:schemeClr val="phClr">
-                <a:shade val="30000"/>
-                <a:satMod val="200000"/>
-              </a:schemeClr>
-            </a:gs>
-          </a:gsLst>
-          <a:path path="circle">
-            <a:fillToRect l="50000" t="50000" r="50000" b="50000"/>
-          </a:path>
-        </a:gradFill>
-      </a:bgFillStyleLst>
-    </a:fmtScheme>
-  </a:themeElements>
-</a:theme>
 </file>
</xml_diff>

<commit_message>
update spacex example: add chart for costs of rocket launches
</commit_message>
<xml_diff>
--- a/spacex_example/spacex_template.pptx
+++ b/spacex_example/spacex_template.pptx
@@ -20,16 +20,17 @@
     <p:sldId id="265" r:id="rId15"/>
     <p:sldId id="266" r:id="rId16"/>
     <p:sldId id="267" r:id="rId17"/>
+    <p:sldId id="268" r:id="rId18"/>
   </p:sldIdLst>
   <p:sldSz cy="5143500" cx="9144000"/>
   <p:notesSz cx="6858000" cy="9144000"/>
   <p:embeddedFontLst>
     <p:embeddedFont>
       <p:font typeface="Nunito"/>
-      <p:regular r:id="rId18"/>
-      <p:bold r:id="rId19"/>
-      <p:italic r:id="rId20"/>
-      <p:boldItalic r:id="rId21"/>
+      <p:regular r:id="rId19"/>
+      <p:bold r:id="rId20"/>
+      <p:italic r:id="rId21"/>
+      <p:boldItalic r:id="rId22"/>
     </p:embeddedFont>
   </p:embeddedFontLst>
   <p:defaultTextStyle>
@@ -824,7 +825,7 @@
       </p:grpSpPr>
       <p:sp>
         <p:nvSpPr>
-          <p:cNvPr id="182" name="Google Shape;182;ge4bd750958_0_26:notes"/>
+          <p:cNvPr id="182" name="Google Shape;182;ge4bd750958_0_10:notes"/>
           <p:cNvSpPr/>
           <p:nvPr>
             <p:ph idx="2" type="sldImg"/>
@@ -859,7 +860,7 @@
       </p:sp>
       <p:sp>
         <p:nvSpPr>
-          <p:cNvPr id="183" name="Google Shape;183;ge4bd750958_0_26:notes"/>
+          <p:cNvPr id="183" name="Google Shape;183;ge4bd750958_0_10:notes"/>
           <p:cNvSpPr txBox="1"/>
           <p:nvPr>
             <p:ph idx="1" type="body"/>
@@ -909,7 +910,7 @@
   <p:cSld>
     <p:spTree>
       <p:nvGrpSpPr>
-        <p:cNvPr id="188" name="Shape 188"/>
+        <p:cNvPr id="187" name="Shape 187"/>
         <p:cNvGrpSpPr/>
         <p:nvPr/>
       </p:nvGrpSpPr>
@@ -923,7 +924,7 @@
       </p:grpSpPr>
       <p:sp>
         <p:nvSpPr>
-          <p:cNvPr id="189" name="Google Shape;189;ge49eb32b0a_0_249:notes"/>
+          <p:cNvPr id="188" name="Google Shape;188;ge4bd750958_0_26:notes"/>
           <p:cNvSpPr/>
           <p:nvPr>
             <p:ph idx="2" type="sldImg"/>
@@ -958,7 +959,7 @@
       </p:sp>
       <p:sp>
         <p:nvSpPr>
-          <p:cNvPr id="190" name="Google Shape;190;ge49eb32b0a_0_249:notes"/>
+          <p:cNvPr id="189" name="Google Shape;189;ge4bd750958_0_26:notes"/>
           <p:cNvSpPr txBox="1"/>
           <p:nvPr>
             <p:ph idx="1" type="body"/>
@@ -1022,7 +1023,7 @@
       </p:grpSpPr>
       <p:sp>
         <p:nvSpPr>
-          <p:cNvPr id="195" name="Google Shape;195;ge49eb32b0a_0_264:notes"/>
+          <p:cNvPr id="195" name="Google Shape;195;ge49eb32b0a_0_249:notes"/>
           <p:cNvSpPr/>
           <p:nvPr>
             <p:ph idx="2" type="sldImg"/>
@@ -1057,7 +1058,106 @@
       </p:sp>
       <p:sp>
         <p:nvSpPr>
-          <p:cNvPr id="196" name="Google Shape;196;ge49eb32b0a_0_264:notes"/>
+          <p:cNvPr id="196" name="Google Shape;196;ge49eb32b0a_0_249:notes"/>
+          <p:cNvSpPr txBox="1"/>
+          <p:nvPr>
+            <p:ph idx="1" type="body"/>
+          </p:nvPr>
+        </p:nvSpPr>
+        <p:spPr>
+          <a:xfrm>
+            <a:off x="685800" y="4343400"/>
+            <a:ext cx="5486400" cy="4114800"/>
+          </a:xfrm>
+          <a:prstGeom prst="rect">
+            <a:avLst/>
+          </a:prstGeom>
+        </p:spPr>
+        <p:txBody>
+          <a:bodyPr anchorCtr="0" anchor="t" bIns="91425" lIns="91425" spcFirstLastPara="1" rIns="91425" wrap="square" tIns="91425">
+            <a:noAutofit/>
+          </a:bodyPr>
+          <a:lstStyle/>
+          <a:p>
+            <a:pPr indent="0" lvl="0" marL="0" rtl="0" algn="l">
+              <a:spcBef>
+                <a:spcPts val="0"/>
+              </a:spcBef>
+              <a:spcAft>
+                <a:spcPts val="0"/>
+              </a:spcAft>
+              <a:buNone/>
+            </a:pPr>
+            <a:r>
+              <a:t/>
+            </a:r>
+            <a:endParaRPr/>
+          </a:p>
+        </p:txBody>
+      </p:sp>
+    </p:spTree>
+  </p:cSld>
+  <p:clrMapOvr>
+    <a:masterClrMapping/>
+  </p:clrMapOvr>
+</p:notes>
+</file>
+
+<file path=ppt/notesSlides/notesSlide13.xml><?xml version="1.0" encoding="utf-8"?>
+<p:notes xmlns:a="http://schemas.openxmlformats.org/drawingml/2006/main" xmlns:r="http://schemas.openxmlformats.org/officeDocument/2006/relationships" xmlns:mc="http://schemas.openxmlformats.org/markup-compatibility/2006" xmlns:mv="urn:schemas-microsoft-com:mac:vml" xmlns:p="http://schemas.openxmlformats.org/presentationml/2006/main" xmlns:c="http://schemas.openxmlformats.org/drawingml/2006/chart" xmlns:dgm="http://schemas.openxmlformats.org/drawingml/2006/diagram" xmlns:o="urn:schemas-microsoft-com:office:office" xmlns:v="urn:schemas-microsoft-com:vml" xmlns:pvml="urn:schemas-microsoft-com:office:powerpoint" xmlns:com="http://schemas.openxmlformats.org/drawingml/2006/compatibility" xmlns:p14="http://schemas.microsoft.com/office/powerpoint/2010/main" xmlns:p15="http://schemas.microsoft.com/office/powerpoint/2012/main" xmlns:ahyp="http://schemas.microsoft.com/office/drawing/2018/hyperlinkcolor" showMasterPhAnim="0" showMasterSp="0">
+  <p:cSld>
+    <p:spTree>
+      <p:nvGrpSpPr>
+        <p:cNvPr id="200" name="Shape 200"/>
+        <p:cNvGrpSpPr/>
+        <p:nvPr/>
+      </p:nvGrpSpPr>
+      <p:grpSpPr>
+        <a:xfrm>
+          <a:off x="0" y="0"/>
+          <a:ext cx="0" cy="0"/>
+          <a:chOff x="0" y="0"/>
+          <a:chExt cx="0" cy="0"/>
+        </a:xfrm>
+      </p:grpSpPr>
+      <p:sp>
+        <p:nvSpPr>
+          <p:cNvPr id="201" name="Google Shape;201;ge49eb32b0a_0_264:notes"/>
+          <p:cNvSpPr/>
+          <p:nvPr>
+            <p:ph idx="2" type="sldImg"/>
+          </p:nvPr>
+        </p:nvSpPr>
+        <p:spPr>
+          <a:xfrm>
+            <a:off x="381300" y="685800"/>
+            <a:ext cx="6096000" cy="3429000"/>
+          </a:xfrm>
+          <a:custGeom>
+            <a:rect b="b" l="l" r="r" t="t"/>
+            <a:pathLst>
+              <a:path extrusionOk="0" h="120000" w="120000">
+                <a:moveTo>
+                  <a:pt x="0" y="0"/>
+                </a:moveTo>
+                <a:lnTo>
+                  <a:pt x="120000" y="0"/>
+                </a:lnTo>
+                <a:lnTo>
+                  <a:pt x="120000" y="120000"/>
+                </a:lnTo>
+                <a:lnTo>
+                  <a:pt x="0" y="120000"/>
+                </a:lnTo>
+                <a:close/>
+              </a:path>
+            </a:pathLst>
+          </a:custGeom>
+        </p:spPr>
+      </p:sp>
+      <p:sp>
+        <p:nvSpPr>
+          <p:cNvPr id="202" name="Google Shape;202;ge49eb32b0a_0_264:notes"/>
           <p:cNvSpPr txBox="1"/>
           <p:nvPr>
             <p:ph idx="1" type="body"/>
@@ -1418,7 +1518,7 @@
       </p:grpSpPr>
       <p:sp>
         <p:nvSpPr>
-          <p:cNvPr id="150" name="Google Shape;150;ge49eb32b0a_0_254:notes"/>
+          <p:cNvPr id="150" name="Google Shape;150;ge4bd750958_0_43:notes"/>
           <p:cNvSpPr/>
           <p:nvPr>
             <p:ph idx="2" type="sldImg"/>
@@ -1453,7 +1553,7 @@
       </p:sp>
       <p:sp>
         <p:nvSpPr>
-          <p:cNvPr id="151" name="Google Shape;151;ge49eb32b0a_0_254:notes"/>
+          <p:cNvPr id="151" name="Google Shape;151;ge4bd750958_0_43:notes"/>
           <p:cNvSpPr txBox="1"/>
           <p:nvPr>
             <p:ph idx="1" type="body"/>
@@ -1517,7 +1617,7 @@
       </p:grpSpPr>
       <p:sp>
         <p:nvSpPr>
-          <p:cNvPr id="156" name="Google Shape;156;ge49eb32b0a_0_269:notes"/>
+          <p:cNvPr id="156" name="Google Shape;156;ge49eb32b0a_0_254:notes"/>
           <p:cNvSpPr/>
           <p:nvPr>
             <p:ph idx="2" type="sldImg"/>
@@ -1552,7 +1652,7 @@
       </p:sp>
       <p:sp>
         <p:nvSpPr>
-          <p:cNvPr id="157" name="Google Shape;157;ge49eb32b0a_0_269:notes"/>
+          <p:cNvPr id="157" name="Google Shape;157;ge49eb32b0a_0_254:notes"/>
           <p:cNvSpPr txBox="1"/>
           <p:nvPr>
             <p:ph idx="1" type="body"/>
@@ -1602,7 +1702,7 @@
   <p:cSld>
     <p:spTree>
       <p:nvGrpSpPr>
-        <p:cNvPr id="162" name="Shape 162"/>
+        <p:cNvPr id="161" name="Shape 161"/>
         <p:cNvGrpSpPr/>
         <p:nvPr/>
       </p:nvGrpSpPr>
@@ -1616,7 +1716,7 @@
       </p:grpSpPr>
       <p:sp>
         <p:nvSpPr>
-          <p:cNvPr id="163" name="Google Shape;163;ge4bd750958_0_32:notes"/>
+          <p:cNvPr id="162" name="Google Shape;162;ge49eb32b0a_0_269:notes"/>
           <p:cNvSpPr/>
           <p:nvPr>
             <p:ph idx="2" type="sldImg"/>
@@ -1651,7 +1751,7 @@
       </p:sp>
       <p:sp>
         <p:nvSpPr>
-          <p:cNvPr id="164" name="Google Shape;164;ge4bd750958_0_32:notes"/>
+          <p:cNvPr id="163" name="Google Shape;163;ge49eb32b0a_0_269:notes"/>
           <p:cNvSpPr txBox="1"/>
           <p:nvPr>
             <p:ph idx="1" type="body"/>
@@ -1715,7 +1815,7 @@
       </p:grpSpPr>
       <p:sp>
         <p:nvSpPr>
-          <p:cNvPr id="169" name="Google Shape;169;ge4bd750958_0_37:notes"/>
+          <p:cNvPr id="169" name="Google Shape;169;ge4bd750958_0_32:notes"/>
           <p:cNvSpPr/>
           <p:nvPr>
             <p:ph idx="2" type="sldImg"/>
@@ -1750,7 +1850,7 @@
       </p:sp>
       <p:sp>
         <p:nvSpPr>
-          <p:cNvPr id="170" name="Google Shape;170;ge4bd750958_0_37:notes"/>
+          <p:cNvPr id="170" name="Google Shape;170;ge4bd750958_0_32:notes"/>
           <p:cNvSpPr txBox="1"/>
           <p:nvPr>
             <p:ph idx="1" type="body"/>
@@ -1800,7 +1900,7 @@
   <p:cSld>
     <p:spTree>
       <p:nvGrpSpPr>
-        <p:cNvPr id="175" name="Shape 175"/>
+        <p:cNvPr id="174" name="Shape 174"/>
         <p:cNvGrpSpPr/>
         <p:nvPr/>
       </p:nvGrpSpPr>
@@ -1814,7 +1914,7 @@
       </p:grpSpPr>
       <p:sp>
         <p:nvSpPr>
-          <p:cNvPr id="176" name="Google Shape;176;ge4bd750958_0_10:notes"/>
+          <p:cNvPr id="175" name="Google Shape;175;ge4bd750958_0_37:notes"/>
           <p:cNvSpPr/>
           <p:nvPr>
             <p:ph idx="2" type="sldImg"/>
@@ -1849,7 +1949,7 @@
       </p:sp>
       <p:sp>
         <p:nvSpPr>
-          <p:cNvPr id="177" name="Google Shape;177;ge4bd750958_0_10:notes"/>
+          <p:cNvPr id="176" name="Google Shape;176;ge4bd750958_0_37:notes"/>
           <p:cNvSpPr txBox="1"/>
           <p:nvPr>
             <p:ph idx="1" type="body"/>
@@ -10121,7 +10221,7 @@
             </a:pPr>
             <a:r>
               <a:rPr lang="nl"/>
-              <a:t>{!landing_pads}Landing pad: {name}</a:t>
+              <a:t>Landing pads</a:t>
             </a:r>
             <a:endParaRPr/>
           </a:p>
@@ -10138,150 +10238,7 @@
         <p:spPr>
           <a:xfrm>
             <a:off x="819150" y="1990725"/>
-            <a:ext cx="3753000" cy="2448000"/>
-          </a:xfrm>
-          <a:prstGeom prst="rect">
-            <a:avLst/>
-          </a:prstGeom>
-        </p:spPr>
-        <p:txBody>
-          <a:bodyPr anchorCtr="0" anchor="t" bIns="91425" lIns="91425" spcFirstLastPara="1" rIns="91425" wrap="square" tIns="91425">
-            <a:normAutofit/>
-          </a:bodyPr>
-          <a:lstStyle/>
-          <a:p>
-            <a:pPr indent="-311150" lvl="0" marL="457200" rtl="0" algn="l">
-              <a:spcBef>
-                <a:spcPts val="0"/>
-              </a:spcBef>
-              <a:spcAft>
-                <a:spcPts val="0"/>
-              </a:spcAft>
-              <a:buSzPts val="1300"/>
-              <a:buChar char="●"/>
-            </a:pPr>
-            <a:r>
-              <a:rPr lang="nl"/>
-              <a:t>Full name: {full_name}</a:t>
-            </a:r>
-            <a:endParaRPr/>
-          </a:p>
-          <a:p>
-            <a:pPr indent="-311150" lvl="0" marL="457200" rtl="0" algn="l">
-              <a:spcBef>
-                <a:spcPts val="0"/>
-              </a:spcBef>
-              <a:spcAft>
-                <a:spcPts val="0"/>
-              </a:spcAft>
-              <a:buSzPts val="1300"/>
-              <a:buChar char="●"/>
-            </a:pPr>
-            <a:r>
-              <a:rPr lang="nl"/>
-              <a:t>Description: {details}</a:t>
-            </a:r>
-            <a:endParaRPr/>
-          </a:p>
-          <a:p>
-            <a:pPr indent="-311150" lvl="0" marL="457200" rtl="0" algn="l">
-              <a:spcBef>
-                <a:spcPts val="0"/>
-              </a:spcBef>
-              <a:spcAft>
-                <a:spcPts val="0"/>
-              </a:spcAft>
-              <a:buSzPts val="1300"/>
-              <a:buChar char="●"/>
-            </a:pPr>
-            <a:r>
-              <a:rPr lang="nl"/>
-              <a:t>Type: {type}</a:t>
-            </a:r>
-            <a:endParaRPr/>
-          </a:p>
-          <a:p>
-            <a:pPr indent="-311150" lvl="0" marL="457200" rtl="0" algn="l">
-              <a:spcBef>
-                <a:spcPts val="0"/>
-              </a:spcBef>
-              <a:spcAft>
-                <a:spcPts val="0"/>
-              </a:spcAft>
-              <a:buSzPts val="1300"/>
-              <a:buChar char="●"/>
-            </a:pPr>
-            <a:r>
-              <a:rPr lang="nl"/>
-              <a:t>Location: {locality}, {region}</a:t>
-            </a:r>
-            <a:endParaRPr/>
-          </a:p>
-          <a:p>
-            <a:pPr indent="-311150" lvl="0" marL="457200" rtl="0" algn="l">
-              <a:spcBef>
-                <a:spcPts val="0"/>
-              </a:spcBef>
-              <a:spcAft>
-                <a:spcPts val="0"/>
-              </a:spcAft>
-              <a:buSzPts val="1300"/>
-              <a:buChar char="●"/>
-            </a:pPr>
-            <a:r>
-              <a:rPr lang="nl"/>
-              <a:t>Succeeded landing attempts: {landing_successes}/{landing_attempts}</a:t>
-            </a:r>
-            <a:endParaRPr/>
-          </a:p>
-          <a:p>
-            <a:pPr indent="-311150" lvl="0" marL="457200" rtl="0" algn="l">
-              <a:spcBef>
-                <a:spcPts val="0"/>
-              </a:spcBef>
-              <a:spcAft>
-                <a:spcPts val="0"/>
-              </a:spcAft>
-              <a:buSzPts val="1300"/>
-              <a:buChar char="●"/>
-            </a:pPr>
-            <a:r>
-              <a:rPr lang="nl"/>
-              <a:t>Status: {status}</a:t>
-            </a:r>
-            <a:endParaRPr/>
-          </a:p>
-          <a:p>
-            <a:pPr indent="-311150" lvl="0" marL="457200" rtl="0" algn="l">
-              <a:spcBef>
-                <a:spcPts val="0"/>
-              </a:spcBef>
-              <a:spcAft>
-                <a:spcPts val="0"/>
-              </a:spcAft>
-              <a:buSzPts val="1300"/>
-              <a:buChar char="●"/>
-            </a:pPr>
-            <a:r>
-              <a:rPr lang="nl"/>
-              <a:t>Wikipedia: {*wikipedia}</a:t>
-            </a:r>
-            <a:endParaRPr/>
-          </a:p>
-        </p:txBody>
-      </p:sp>
-      <p:sp>
-        <p:nvSpPr>
-          <p:cNvPr id="187" name="Google Shape;187;p22"/>
-          <p:cNvSpPr txBox="1"/>
-          <p:nvPr>
-            <p:ph idx="1" type="body"/>
-          </p:nvPr>
-        </p:nvSpPr>
-        <p:spPr>
-          <a:xfrm>
-            <a:off x="4572150" y="1990725"/>
-            <a:ext cx="3753000" cy="2448000"/>
+            <a:ext cx="7505700" cy="2448000"/>
           </a:xfrm>
           <a:prstGeom prst="rect">
             <a:avLst/>
@@ -10304,7 +10261,7 @@
             </a:pPr>
             <a:r>
               <a:rPr lang="nl"/>
-              <a:t>{%image}</a:t>
+              <a:t>{landing_pads_description}</a:t>
             </a:r>
             <a:endParaRPr/>
           </a:p>
@@ -10323,7 +10280,7 @@
   <p:cSld>
     <p:spTree>
       <p:nvGrpSpPr>
-        <p:cNvPr id="191" name="Shape 191"/>
+        <p:cNvPr id="190" name="Shape 190"/>
         <p:cNvGrpSpPr/>
         <p:nvPr/>
       </p:nvGrpSpPr>
@@ -10337,7 +10294,7 @@
       </p:grpSpPr>
       <p:sp>
         <p:nvSpPr>
-          <p:cNvPr id="192" name="Google Shape;192;p23"/>
+          <p:cNvPr id="191" name="Google Shape;191;p23"/>
           <p:cNvSpPr txBox="1"/>
           <p:nvPr>
             <p:ph type="title"/>
@@ -10369,7 +10326,150 @@
             </a:pPr>
             <a:r>
               <a:rPr lang="nl"/>
-              <a:t>Ships</a:t>
+              <a:t>{!landing_pads}Landing pad: {name}</a:t>
+            </a:r>
+            <a:endParaRPr/>
+          </a:p>
+        </p:txBody>
+      </p:sp>
+      <p:sp>
+        <p:nvSpPr>
+          <p:cNvPr id="192" name="Google Shape;192;p23"/>
+          <p:cNvSpPr txBox="1"/>
+          <p:nvPr>
+            <p:ph idx="1" type="body"/>
+          </p:nvPr>
+        </p:nvSpPr>
+        <p:spPr>
+          <a:xfrm>
+            <a:off x="819150" y="1990725"/>
+            <a:ext cx="3753000" cy="2448000"/>
+          </a:xfrm>
+          <a:prstGeom prst="rect">
+            <a:avLst/>
+          </a:prstGeom>
+        </p:spPr>
+        <p:txBody>
+          <a:bodyPr anchorCtr="0" anchor="t" bIns="91425" lIns="91425" spcFirstLastPara="1" rIns="91425" wrap="square" tIns="91425">
+            <a:normAutofit/>
+          </a:bodyPr>
+          <a:lstStyle/>
+          <a:p>
+            <a:pPr indent="-311150" lvl="0" marL="457200" rtl="0" algn="l">
+              <a:spcBef>
+                <a:spcPts val="0"/>
+              </a:spcBef>
+              <a:spcAft>
+                <a:spcPts val="0"/>
+              </a:spcAft>
+              <a:buSzPts val="1300"/>
+              <a:buChar char="●"/>
+            </a:pPr>
+            <a:r>
+              <a:rPr lang="nl"/>
+              <a:t>Full name: {full_name}</a:t>
+            </a:r>
+            <a:endParaRPr/>
+          </a:p>
+          <a:p>
+            <a:pPr indent="-311150" lvl="0" marL="457200" rtl="0" algn="l">
+              <a:spcBef>
+                <a:spcPts val="0"/>
+              </a:spcBef>
+              <a:spcAft>
+                <a:spcPts val="0"/>
+              </a:spcAft>
+              <a:buSzPts val="1300"/>
+              <a:buChar char="●"/>
+            </a:pPr>
+            <a:r>
+              <a:rPr lang="nl"/>
+              <a:t>Description: {details}</a:t>
+            </a:r>
+            <a:endParaRPr/>
+          </a:p>
+          <a:p>
+            <a:pPr indent="-311150" lvl="0" marL="457200" rtl="0" algn="l">
+              <a:spcBef>
+                <a:spcPts val="0"/>
+              </a:spcBef>
+              <a:spcAft>
+                <a:spcPts val="0"/>
+              </a:spcAft>
+              <a:buSzPts val="1300"/>
+              <a:buChar char="●"/>
+            </a:pPr>
+            <a:r>
+              <a:rPr lang="nl"/>
+              <a:t>Type: {type}</a:t>
+            </a:r>
+            <a:endParaRPr/>
+          </a:p>
+          <a:p>
+            <a:pPr indent="-311150" lvl="0" marL="457200" rtl="0" algn="l">
+              <a:spcBef>
+                <a:spcPts val="0"/>
+              </a:spcBef>
+              <a:spcAft>
+                <a:spcPts val="0"/>
+              </a:spcAft>
+              <a:buSzPts val="1300"/>
+              <a:buChar char="●"/>
+            </a:pPr>
+            <a:r>
+              <a:rPr lang="nl"/>
+              <a:t>Location: {locality}, {region}</a:t>
+            </a:r>
+            <a:endParaRPr/>
+          </a:p>
+          <a:p>
+            <a:pPr indent="-311150" lvl="0" marL="457200" rtl="0" algn="l">
+              <a:spcBef>
+                <a:spcPts val="0"/>
+              </a:spcBef>
+              <a:spcAft>
+                <a:spcPts val="0"/>
+              </a:spcAft>
+              <a:buSzPts val="1300"/>
+              <a:buChar char="●"/>
+            </a:pPr>
+            <a:r>
+              <a:rPr lang="nl"/>
+              <a:t>Succeeded landing attempts: {landing_successes}/{landing_attempts}</a:t>
+            </a:r>
+            <a:endParaRPr/>
+          </a:p>
+          <a:p>
+            <a:pPr indent="-311150" lvl="0" marL="457200" rtl="0" algn="l">
+              <a:spcBef>
+                <a:spcPts val="0"/>
+              </a:spcBef>
+              <a:spcAft>
+                <a:spcPts val="0"/>
+              </a:spcAft>
+              <a:buSzPts val="1300"/>
+              <a:buChar char="●"/>
+            </a:pPr>
+            <a:r>
+              <a:rPr lang="nl"/>
+              <a:t>Status: {status}</a:t>
+            </a:r>
+            <a:endParaRPr/>
+          </a:p>
+          <a:p>
+            <a:pPr indent="-311150" lvl="0" marL="457200" rtl="0" algn="l">
+              <a:spcBef>
+                <a:spcPts val="0"/>
+              </a:spcBef>
+              <a:spcAft>
+                <a:spcPts val="0"/>
+              </a:spcAft>
+              <a:buSzPts val="1300"/>
+              <a:buChar char="●"/>
+            </a:pPr>
+            <a:r>
+              <a:rPr lang="nl"/>
+              <a:t>Wikipedia: {*wikipedia}</a:t>
             </a:r>
             <a:endParaRPr/>
           </a:p>
@@ -10385,8 +10485,8 @@
         </p:nvSpPr>
         <p:spPr>
           <a:xfrm>
-            <a:off x="819150" y="1990725"/>
-            <a:ext cx="7505700" cy="2448000"/>
+            <a:off x="4572150" y="1990725"/>
+            <a:ext cx="3753000" cy="2448000"/>
           </a:xfrm>
           <a:prstGeom prst="rect">
             <a:avLst/>
@@ -10409,7 +10509,7 @@
             </a:pPr>
             <a:r>
               <a:rPr lang="nl"/>
-              <a:t>{ships_description}</a:t>
+              <a:t>{%image}</a:t>
             </a:r>
             <a:endParaRPr/>
           </a:p>
@@ -10474,7 +10574,7 @@
             </a:pPr>
             <a:r>
               <a:rPr lang="nl"/>
-              <a:t>{!ships}Ship: {name}</a:t>
+              <a:t>Ships</a:t>
             </a:r>
             <a:endParaRPr/>
           </a:p>
@@ -10491,6 +10591,111 @@
         <p:spPr>
           <a:xfrm>
             <a:off x="819150" y="1990725"/>
+            <a:ext cx="7505700" cy="2448000"/>
+          </a:xfrm>
+          <a:prstGeom prst="rect">
+            <a:avLst/>
+          </a:prstGeom>
+        </p:spPr>
+        <p:txBody>
+          <a:bodyPr anchorCtr="0" anchor="t" bIns="91425" lIns="91425" spcFirstLastPara="1" rIns="91425" wrap="square" tIns="91425">
+            <a:normAutofit/>
+          </a:bodyPr>
+          <a:lstStyle/>
+          <a:p>
+            <a:pPr indent="0" lvl="0" marL="0" rtl="0" algn="l">
+              <a:spcBef>
+                <a:spcPts val="0"/>
+              </a:spcBef>
+              <a:spcAft>
+                <a:spcPts val="1200"/>
+              </a:spcAft>
+              <a:buNone/>
+            </a:pPr>
+            <a:r>
+              <a:rPr lang="nl"/>
+              <a:t>{ships_description}</a:t>
+            </a:r>
+            <a:endParaRPr/>
+          </a:p>
+        </p:txBody>
+      </p:sp>
+    </p:spTree>
+  </p:cSld>
+  <p:clrMapOvr>
+    <a:masterClrMapping/>
+  </p:clrMapOvr>
+</p:sld>
+</file>
+
+<file path=ppt/slides/slide13.xml><?xml version="1.0" encoding="utf-8"?>
+<p:sld xmlns:a="http://schemas.openxmlformats.org/drawingml/2006/main" xmlns:r="http://schemas.openxmlformats.org/officeDocument/2006/relationships" xmlns:mc="http://schemas.openxmlformats.org/markup-compatibility/2006" xmlns:mv="urn:schemas-microsoft-com:mac:vml" xmlns:p="http://schemas.openxmlformats.org/presentationml/2006/main" xmlns:c="http://schemas.openxmlformats.org/drawingml/2006/chart" xmlns:dgm="http://schemas.openxmlformats.org/drawingml/2006/diagram" xmlns:o="urn:schemas-microsoft-com:office:office" xmlns:v="urn:schemas-microsoft-com:vml" xmlns:pvml="urn:schemas-microsoft-com:office:powerpoint" xmlns:com="http://schemas.openxmlformats.org/drawingml/2006/compatibility" xmlns:p14="http://schemas.microsoft.com/office/powerpoint/2010/main" xmlns:p15="http://schemas.microsoft.com/office/powerpoint/2012/main" xmlns:ahyp="http://schemas.microsoft.com/office/drawing/2018/hyperlinkcolor">
+  <p:cSld>
+    <p:spTree>
+      <p:nvGrpSpPr>
+        <p:cNvPr id="203" name="Shape 203"/>
+        <p:cNvGrpSpPr/>
+        <p:nvPr/>
+      </p:nvGrpSpPr>
+      <p:grpSpPr>
+        <a:xfrm>
+          <a:off x="0" y="0"/>
+          <a:ext cx="0" cy="0"/>
+          <a:chOff x="0" y="0"/>
+          <a:chExt cx="0" cy="0"/>
+        </a:xfrm>
+      </p:grpSpPr>
+      <p:sp>
+        <p:nvSpPr>
+          <p:cNvPr id="204" name="Google Shape;204;p25"/>
+          <p:cNvSpPr txBox="1"/>
+          <p:nvPr>
+            <p:ph type="title"/>
+          </p:nvPr>
+        </p:nvSpPr>
+        <p:spPr>
+          <a:xfrm>
+            <a:off x="819150" y="845600"/>
+            <a:ext cx="7505700" cy="954600"/>
+          </a:xfrm>
+          <a:prstGeom prst="rect">
+            <a:avLst/>
+          </a:prstGeom>
+        </p:spPr>
+        <p:txBody>
+          <a:bodyPr anchorCtr="0" anchor="t" bIns="91425" lIns="91425" spcFirstLastPara="1" rIns="91425" wrap="square" tIns="91425">
+            <a:normAutofit/>
+          </a:bodyPr>
+          <a:lstStyle/>
+          <a:p>
+            <a:pPr indent="0" lvl="0" marL="0" rtl="0" algn="l">
+              <a:spcBef>
+                <a:spcPts val="0"/>
+              </a:spcBef>
+              <a:spcAft>
+                <a:spcPts val="0"/>
+              </a:spcAft>
+              <a:buNone/>
+            </a:pPr>
+            <a:r>
+              <a:rPr lang="nl"/>
+              <a:t>{!ships}Ship: {name}</a:t>
+            </a:r>
+            <a:endParaRPr/>
+          </a:p>
+        </p:txBody>
+      </p:sp>
+      <p:sp>
+        <p:nvSpPr>
+          <p:cNvPr id="205" name="Google Shape;205;p25"/>
+          <p:cNvSpPr txBox="1"/>
+          <p:nvPr>
+            <p:ph idx="1" type="body"/>
+          </p:nvPr>
+        </p:nvSpPr>
+        <p:spPr>
+          <a:xfrm>
+            <a:off x="819150" y="1990725"/>
             <a:ext cx="3753000" cy="2448000"/>
           </a:xfrm>
           <a:prstGeom prst="rect">
@@ -10587,11 +10792,28 @@
             </a:r>
             <a:endParaRPr/>
           </a:p>
+          <a:p>
+            <a:pPr indent="-311150" lvl="0" marL="457200" rtl="0" algn="l">
+              <a:spcBef>
+                <a:spcPts val="0"/>
+              </a:spcBef>
+              <a:spcAft>
+                <a:spcPts val="0"/>
+              </a:spcAft>
+              <a:buSzPts val="1300"/>
+              <a:buChar char="●"/>
+            </a:pPr>
+            <a:r>
+              <a:rPr lang="nl"/>
+              <a:t>{#mass_kg}Mass: {mass_kg} kg{/mass_kg}</a:t>
+            </a:r>
+            <a:endParaRPr/>
+          </a:p>
         </p:txBody>
       </p:sp>
       <p:sp>
         <p:nvSpPr>
-          <p:cNvPr id="200" name="Google Shape;200;p24"/>
+          <p:cNvPr id="206" name="Google Shape;206;p25"/>
           <p:cNvSpPr txBox="1"/>
           <p:nvPr>
             <p:ph idx="1" type="body"/>
@@ -11215,7 +11437,7 @@
             </a:pPr>
             <a:r>
               <a:rPr lang="nl"/>
-              <a:t>Dragons</a:t>
+              <a:t>Rockets: cost per launch</a:t>
             </a:r>
             <a:endParaRPr/>
           </a:p>
@@ -11231,7 +11453,7 @@
         </p:nvSpPr>
         <p:spPr>
           <a:xfrm>
-            <a:off x="819150" y="1990725"/>
+            <a:off x="819150" y="1529125"/>
             <a:ext cx="7505700" cy="2448000"/>
           </a:xfrm>
           <a:prstGeom prst="rect">
@@ -11255,7 +11477,7 @@
             </a:pPr>
             <a:r>
               <a:rPr lang="nl"/>
-              <a:t>{dragons_description}</a:t>
+              <a:t>{$rockets_chart}</a:t>
             </a:r>
             <a:endParaRPr/>
           </a:p>
@@ -11320,7 +11542,7 @@
             </a:pPr>
             <a:r>
               <a:rPr lang="nl"/>
-              <a:t>{!dragons}Dragon: {name}</a:t>
+              <a:t>Dragons</a:t>
             </a:r>
             <a:endParaRPr/>
           </a:p>
@@ -11337,99 +11559,7 @@
         <p:spPr>
           <a:xfrm>
             <a:off x="819150" y="1990725"/>
-            <a:ext cx="3753000" cy="2448000"/>
-          </a:xfrm>
-          <a:prstGeom prst="rect">
-            <a:avLst/>
-          </a:prstGeom>
-        </p:spPr>
-        <p:txBody>
-          <a:bodyPr anchorCtr="0" anchor="t" bIns="91425" lIns="91425" spcFirstLastPara="1" rIns="91425" wrap="square" tIns="91425">
-            <a:normAutofit/>
-          </a:bodyPr>
-          <a:lstStyle/>
-          <a:p>
-            <a:pPr indent="-311150" lvl="0" marL="457200" rtl="0" algn="l">
-              <a:spcBef>
-                <a:spcPts val="0"/>
-              </a:spcBef>
-              <a:spcAft>
-                <a:spcPts val="0"/>
-              </a:spcAft>
-              <a:buSzPts val="1300"/>
-              <a:buChar char="●"/>
-            </a:pPr>
-            <a:r>
-              <a:rPr lang="nl"/>
-              <a:t>Diameter: {diameter.meters} m</a:t>
-            </a:r>
-            <a:endParaRPr/>
-          </a:p>
-          <a:p>
-            <a:pPr indent="-311150" lvl="0" marL="457200" rtl="0" algn="l">
-              <a:spcBef>
-                <a:spcPts val="0"/>
-              </a:spcBef>
-              <a:spcAft>
-                <a:spcPts val="0"/>
-              </a:spcAft>
-              <a:buSzPts val="1300"/>
-              <a:buChar char="●"/>
-            </a:pPr>
-            <a:r>
-              <a:rPr lang="nl"/>
-              <a:t>Dry mass: {dry_mass_kg} kg</a:t>
-            </a:r>
-            <a:endParaRPr/>
-          </a:p>
-          <a:p>
-            <a:pPr indent="-311150" lvl="0" marL="457200" rtl="0" algn="l">
-              <a:spcBef>
-                <a:spcPts val="0"/>
-              </a:spcBef>
-              <a:spcAft>
-                <a:spcPts val="0"/>
-              </a:spcAft>
-              <a:buSzPts val="1300"/>
-              <a:buChar char="●"/>
-            </a:pPr>
-            <a:r>
-              <a:rPr lang="nl"/>
-              <a:t>Wikipedia: {*wikipedia}</a:t>
-            </a:r>
-            <a:endParaRPr/>
-          </a:p>
-          <a:p>
-            <a:pPr indent="-311150" lvl="0" marL="457200" rtl="0" algn="l">
-              <a:spcBef>
-                <a:spcPts val="0"/>
-              </a:spcBef>
-              <a:spcAft>
-                <a:spcPts val="0"/>
-              </a:spcAft>
-              <a:buSzPts val="1300"/>
-              <a:buChar char="●"/>
-            </a:pPr>
-            <a:r>
-              <a:rPr lang="nl"/>
-              <a:t>Description: {description}</a:t>
-            </a:r>
-            <a:endParaRPr/>
-          </a:p>
-        </p:txBody>
-      </p:sp>
-      <p:sp>
-        <p:nvSpPr>
-          <p:cNvPr id="161" name="Google Shape;161;p18"/>
-          <p:cNvSpPr txBox="1"/>
-          <p:nvPr>
-            <p:ph idx="1" type="body"/>
-          </p:nvPr>
-        </p:nvSpPr>
-        <p:spPr>
-          <a:xfrm>
-            <a:off x="4572150" y="1990725"/>
-            <a:ext cx="3753000" cy="2448000"/>
+            <a:ext cx="7505700" cy="2448000"/>
           </a:xfrm>
           <a:prstGeom prst="rect">
             <a:avLst/>
@@ -11452,7 +11582,7 @@
             </a:pPr>
             <a:r>
               <a:rPr lang="nl"/>
-              <a:t>{%image}</a:t>
+              <a:t>{dragons_description}</a:t>
             </a:r>
             <a:endParaRPr/>
           </a:p>
@@ -11471,7 +11601,7 @@
   <p:cSld>
     <p:spTree>
       <p:nvGrpSpPr>
-        <p:cNvPr id="165" name="Shape 165"/>
+        <p:cNvPr id="164" name="Shape 164"/>
         <p:cNvGrpSpPr/>
         <p:nvPr/>
       </p:nvGrpSpPr>
@@ -11485,7 +11615,7 @@
       </p:grpSpPr>
       <p:sp>
         <p:nvSpPr>
-          <p:cNvPr id="166" name="Google Shape;166;p19"/>
+          <p:cNvPr id="165" name="Google Shape;165;p19"/>
           <p:cNvSpPr txBox="1"/>
           <p:nvPr>
             <p:ph type="title"/>
@@ -11517,11 +11647,99 @@
             </a:pPr>
             <a:r>
               <a:rPr lang="nl"/>
-              <a:t>Launch</a:t>
+              <a:t>{!dragons}Dragon: {name}</a:t>
             </a:r>
+            <a:endParaRPr/>
+          </a:p>
+        </p:txBody>
+      </p:sp>
+      <p:sp>
+        <p:nvSpPr>
+          <p:cNvPr id="166" name="Google Shape;166;p19"/>
+          <p:cNvSpPr txBox="1"/>
+          <p:nvPr>
+            <p:ph idx="1" type="body"/>
+          </p:nvPr>
+        </p:nvSpPr>
+        <p:spPr>
+          <a:xfrm>
+            <a:off x="819150" y="1990725"/>
+            <a:ext cx="3753000" cy="2448000"/>
+          </a:xfrm>
+          <a:prstGeom prst="rect">
+            <a:avLst/>
+          </a:prstGeom>
+        </p:spPr>
+        <p:txBody>
+          <a:bodyPr anchorCtr="0" anchor="t" bIns="91425" lIns="91425" spcFirstLastPara="1" rIns="91425" wrap="square" tIns="91425">
+            <a:normAutofit/>
+          </a:bodyPr>
+          <a:lstStyle/>
+          <a:p>
+            <a:pPr indent="-311150" lvl="0" marL="457200" rtl="0" algn="l">
+              <a:spcBef>
+                <a:spcPts val="0"/>
+              </a:spcBef>
+              <a:spcAft>
+                <a:spcPts val="0"/>
+              </a:spcAft>
+              <a:buSzPts val="1300"/>
+              <a:buChar char="●"/>
+            </a:pPr>
             <a:r>
               <a:rPr lang="nl"/>
-              <a:t> pads</a:t>
+              <a:t>Diameter: {diameter.meters} m</a:t>
+            </a:r>
+            <a:endParaRPr/>
+          </a:p>
+          <a:p>
+            <a:pPr indent="-311150" lvl="0" marL="457200" rtl="0" algn="l">
+              <a:spcBef>
+                <a:spcPts val="0"/>
+              </a:spcBef>
+              <a:spcAft>
+                <a:spcPts val="0"/>
+              </a:spcAft>
+              <a:buSzPts val="1300"/>
+              <a:buChar char="●"/>
+            </a:pPr>
+            <a:r>
+              <a:rPr lang="nl"/>
+              <a:t>Dry mass: {dry_mass_kg} kg</a:t>
+            </a:r>
+            <a:endParaRPr/>
+          </a:p>
+          <a:p>
+            <a:pPr indent="-311150" lvl="0" marL="457200" rtl="0" algn="l">
+              <a:spcBef>
+                <a:spcPts val="0"/>
+              </a:spcBef>
+              <a:spcAft>
+                <a:spcPts val="0"/>
+              </a:spcAft>
+              <a:buSzPts val="1300"/>
+              <a:buChar char="●"/>
+            </a:pPr>
+            <a:r>
+              <a:rPr lang="nl"/>
+              <a:t>Wikipedia: {*wikipedia}</a:t>
+            </a:r>
+            <a:endParaRPr/>
+          </a:p>
+          <a:p>
+            <a:pPr indent="-311150" lvl="0" marL="457200" rtl="0" algn="l">
+              <a:spcBef>
+                <a:spcPts val="0"/>
+              </a:spcBef>
+              <a:spcAft>
+                <a:spcPts val="0"/>
+              </a:spcAft>
+              <a:buSzPts val="1300"/>
+              <a:buChar char="●"/>
+            </a:pPr>
+            <a:r>
+              <a:rPr lang="nl"/>
+              <a:t>Description: {description}</a:t>
             </a:r>
             <a:endParaRPr/>
           </a:p>
@@ -11537,8 +11755,8 @@
         </p:nvSpPr>
         <p:spPr>
           <a:xfrm>
-            <a:off x="819150" y="1990725"/>
-            <a:ext cx="7505700" cy="2448000"/>
+            <a:off x="4572150" y="1990725"/>
+            <a:ext cx="3753000" cy="2448000"/>
           </a:xfrm>
           <a:prstGeom prst="rect">
             <a:avLst/>
@@ -11561,7 +11779,7 @@
             </a:pPr>
             <a:r>
               <a:rPr lang="nl"/>
-              <a:t>{launch_pads_description}</a:t>
+              <a:t>{%image}</a:t>
             </a:r>
             <a:endParaRPr/>
           </a:p>
@@ -11626,7 +11844,11 @@
             </a:pPr>
             <a:r>
               <a:rPr lang="nl"/>
-              <a:t>{!launch_pads}Launch pad: {name}</a:t>
+              <a:t>Launch</a:t>
+            </a:r>
+            <a:r>
+              <a:rPr lang="nl"/>
+              <a:t> pads</a:t>
             </a:r>
             <a:endParaRPr/>
           </a:p>
@@ -11643,116 +11865,7 @@
         <p:spPr>
           <a:xfrm>
             <a:off x="819150" y="1990725"/>
-            <a:ext cx="3753000" cy="2448000"/>
-          </a:xfrm>
-          <a:prstGeom prst="rect">
-            <a:avLst/>
-          </a:prstGeom>
-        </p:spPr>
-        <p:txBody>
-          <a:bodyPr anchorCtr="0" anchor="t" bIns="91425" lIns="91425" spcFirstLastPara="1" rIns="91425" wrap="square" tIns="91425">
-            <a:normAutofit/>
-          </a:bodyPr>
-          <a:lstStyle/>
-          <a:p>
-            <a:pPr indent="-311150" lvl="0" marL="457200" rtl="0" algn="l">
-              <a:spcBef>
-                <a:spcPts val="0"/>
-              </a:spcBef>
-              <a:spcAft>
-                <a:spcPts val="0"/>
-              </a:spcAft>
-              <a:buSzPts val="1300"/>
-              <a:buChar char="●"/>
-            </a:pPr>
-            <a:r>
-              <a:rPr lang="nl"/>
-              <a:t>Full name: {full_name}</a:t>
-            </a:r>
-            <a:endParaRPr/>
-          </a:p>
-          <a:p>
-            <a:pPr indent="-311150" lvl="0" marL="457200" rtl="0" algn="l">
-              <a:spcBef>
-                <a:spcPts val="0"/>
-              </a:spcBef>
-              <a:spcAft>
-                <a:spcPts val="0"/>
-              </a:spcAft>
-              <a:buSzPts val="1300"/>
-              <a:buChar char="●"/>
-            </a:pPr>
-            <a:r>
-              <a:rPr lang="nl"/>
-              <a:t>Description: {details}</a:t>
-            </a:r>
-            <a:endParaRPr/>
-          </a:p>
-          <a:p>
-            <a:pPr indent="-311150" lvl="0" marL="457200" rtl="0" algn="l">
-              <a:spcBef>
-                <a:spcPts val="0"/>
-              </a:spcBef>
-              <a:spcAft>
-                <a:spcPts val="0"/>
-              </a:spcAft>
-              <a:buSzPts val="1300"/>
-              <a:buChar char="●"/>
-            </a:pPr>
-            <a:r>
-              <a:rPr lang="nl"/>
-              <a:t>Location: {locality}, {region}</a:t>
-            </a:r>
-            <a:endParaRPr/>
-          </a:p>
-          <a:p>
-            <a:pPr indent="-311150" lvl="0" marL="457200" rtl="0" algn="l">
-              <a:spcBef>
-                <a:spcPts val="0"/>
-              </a:spcBef>
-              <a:spcAft>
-                <a:spcPts val="0"/>
-              </a:spcAft>
-              <a:buSzPts val="1300"/>
-              <a:buChar char="●"/>
-            </a:pPr>
-            <a:r>
-              <a:rPr lang="nl"/>
-              <a:t>Succeeded launch attempts: {launch_successes}/{launch_attempts}</a:t>
-            </a:r>
-            <a:endParaRPr/>
-          </a:p>
-          <a:p>
-            <a:pPr indent="-311150" lvl="0" marL="457200" rtl="0" algn="l">
-              <a:spcBef>
-                <a:spcPts val="0"/>
-              </a:spcBef>
-              <a:spcAft>
-                <a:spcPts val="0"/>
-              </a:spcAft>
-              <a:buSzPts val="1300"/>
-              <a:buChar char="●"/>
-            </a:pPr>
-            <a:r>
-              <a:rPr lang="nl"/>
-              <a:t>Status: {status}</a:t>
-            </a:r>
-            <a:endParaRPr/>
-          </a:p>
-        </p:txBody>
-      </p:sp>
-      <p:sp>
-        <p:nvSpPr>
-          <p:cNvPr id="174" name="Google Shape;174;p20"/>
-          <p:cNvSpPr txBox="1"/>
-          <p:nvPr>
-            <p:ph idx="1" type="body"/>
-          </p:nvPr>
-        </p:nvSpPr>
-        <p:spPr>
-          <a:xfrm>
-            <a:off x="4572150" y="1990725"/>
-            <a:ext cx="3753000" cy="2448000"/>
+            <a:ext cx="7505700" cy="2448000"/>
           </a:xfrm>
           <a:prstGeom prst="rect">
             <a:avLst/>
@@ -11775,7 +11888,7 @@
             </a:pPr>
             <a:r>
               <a:rPr lang="nl"/>
-              <a:t>{%image}</a:t>
+              <a:t>{launch_pads_description}</a:t>
             </a:r>
             <a:endParaRPr/>
           </a:p>
@@ -11794,7 +11907,7 @@
   <p:cSld>
     <p:spTree>
       <p:nvGrpSpPr>
-        <p:cNvPr id="178" name="Shape 178"/>
+        <p:cNvPr id="177" name="Shape 177"/>
         <p:cNvGrpSpPr/>
         <p:nvPr/>
       </p:nvGrpSpPr>
@@ -11808,7 +11921,7 @@
       </p:grpSpPr>
       <p:sp>
         <p:nvSpPr>
-          <p:cNvPr id="179" name="Google Shape;179;p21"/>
+          <p:cNvPr id="178" name="Google Shape;178;p21"/>
           <p:cNvSpPr txBox="1"/>
           <p:nvPr>
             <p:ph type="title"/>
@@ -11840,7 +11953,116 @@
             </a:pPr>
             <a:r>
               <a:rPr lang="nl"/>
-              <a:t>Landing pads</a:t>
+              <a:t>{!launch_pads}Launch pad: {name}</a:t>
+            </a:r>
+            <a:endParaRPr/>
+          </a:p>
+        </p:txBody>
+      </p:sp>
+      <p:sp>
+        <p:nvSpPr>
+          <p:cNvPr id="179" name="Google Shape;179;p21"/>
+          <p:cNvSpPr txBox="1"/>
+          <p:nvPr>
+            <p:ph idx="1" type="body"/>
+          </p:nvPr>
+        </p:nvSpPr>
+        <p:spPr>
+          <a:xfrm>
+            <a:off x="819150" y="1990725"/>
+            <a:ext cx="3753000" cy="2448000"/>
+          </a:xfrm>
+          <a:prstGeom prst="rect">
+            <a:avLst/>
+          </a:prstGeom>
+        </p:spPr>
+        <p:txBody>
+          <a:bodyPr anchorCtr="0" anchor="t" bIns="91425" lIns="91425" spcFirstLastPara="1" rIns="91425" wrap="square" tIns="91425">
+            <a:normAutofit/>
+          </a:bodyPr>
+          <a:lstStyle/>
+          <a:p>
+            <a:pPr indent="-311150" lvl="0" marL="457200" rtl="0" algn="l">
+              <a:spcBef>
+                <a:spcPts val="0"/>
+              </a:spcBef>
+              <a:spcAft>
+                <a:spcPts val="0"/>
+              </a:spcAft>
+              <a:buSzPts val="1300"/>
+              <a:buChar char="●"/>
+            </a:pPr>
+            <a:r>
+              <a:rPr lang="nl"/>
+              <a:t>Full name: {full_name}</a:t>
+            </a:r>
+            <a:endParaRPr/>
+          </a:p>
+          <a:p>
+            <a:pPr indent="-311150" lvl="0" marL="457200" rtl="0" algn="l">
+              <a:spcBef>
+                <a:spcPts val="0"/>
+              </a:spcBef>
+              <a:spcAft>
+                <a:spcPts val="0"/>
+              </a:spcAft>
+              <a:buSzPts val="1300"/>
+              <a:buChar char="●"/>
+            </a:pPr>
+            <a:r>
+              <a:rPr lang="nl"/>
+              <a:t>Description: {details}</a:t>
+            </a:r>
+            <a:endParaRPr/>
+          </a:p>
+          <a:p>
+            <a:pPr indent="-311150" lvl="0" marL="457200" rtl="0" algn="l">
+              <a:spcBef>
+                <a:spcPts val="0"/>
+              </a:spcBef>
+              <a:spcAft>
+                <a:spcPts val="0"/>
+              </a:spcAft>
+              <a:buSzPts val="1300"/>
+              <a:buChar char="●"/>
+            </a:pPr>
+            <a:r>
+              <a:rPr lang="nl"/>
+              <a:t>Location: {locality}, {region}</a:t>
+            </a:r>
+            <a:endParaRPr/>
+          </a:p>
+          <a:p>
+            <a:pPr indent="-311150" lvl="0" marL="457200" rtl="0" algn="l">
+              <a:spcBef>
+                <a:spcPts val="0"/>
+              </a:spcBef>
+              <a:spcAft>
+                <a:spcPts val="0"/>
+              </a:spcAft>
+              <a:buSzPts val="1300"/>
+              <a:buChar char="●"/>
+            </a:pPr>
+            <a:r>
+              <a:rPr lang="nl"/>
+              <a:t>Succeeded launch attempts: {launch_successes}/{launch_attempts}</a:t>
+            </a:r>
+            <a:endParaRPr/>
+          </a:p>
+          <a:p>
+            <a:pPr indent="-311150" lvl="0" marL="457200" rtl="0" algn="l">
+              <a:spcBef>
+                <a:spcPts val="0"/>
+              </a:spcBef>
+              <a:spcAft>
+                <a:spcPts val="0"/>
+              </a:spcAft>
+              <a:buSzPts val="1300"/>
+              <a:buChar char="●"/>
+            </a:pPr>
+            <a:r>
+              <a:rPr lang="nl"/>
+              <a:t>Status: {status}</a:t>
             </a:r>
             <a:endParaRPr/>
           </a:p>
@@ -11856,8 +12078,8 @@
         </p:nvSpPr>
         <p:spPr>
           <a:xfrm>
-            <a:off x="819150" y="1990725"/>
-            <a:ext cx="7505700" cy="2448000"/>
+            <a:off x="4572150" y="1990725"/>
+            <a:ext cx="3753000" cy="2448000"/>
           </a:xfrm>
           <a:prstGeom prst="rect">
             <a:avLst/>
@@ -11880,7 +12102,7 @@
             </a:pPr>
             <a:r>
               <a:rPr lang="nl"/>
-              <a:t>{landing_pads_description}</a:t>
+              <a:t>{%image}</a:t>
             </a:r>
             <a:endParaRPr/>
           </a:p>

</xml_diff>

<commit_message>
add hyperlinks for websites and wikipedia
</commit_message>
<xml_diff>
--- a/spacex_example/spacex_template.pptx
+++ b/spacex_example/spacex_template.pptx
@@ -10156,7 +10156,7 @@
             </a:pPr>
             <a:r>
               <a:rPr lang="nl"/>
-              <a:t>{data_source}</a:t>
+              <a:t>{*data_source}</a:t>
             </a:r>
             <a:endParaRPr/>
           </a:p>
@@ -10469,7 +10469,7 @@
             </a:pPr>
             <a:r>
               <a:rPr lang="nl"/>
-              <a:t>Wikipedia: {*wikipedia}</a:t>
+              <a:t>{*wikipedia}</a:t>
             </a:r>
             <a:endParaRPr/>
           </a:p>
@@ -10809,6 +10809,23 @@
             </a:r>
             <a:endParaRPr/>
           </a:p>
+          <a:p>
+            <a:pPr indent="-311150" lvl="0" marL="457200" rtl="0" algn="l">
+              <a:spcBef>
+                <a:spcPts val="0"/>
+              </a:spcBef>
+              <a:spcAft>
+                <a:spcPts val="0"/>
+              </a:spcAft>
+              <a:buSzPts val="1300"/>
+              <a:buChar char="●"/>
+            </a:pPr>
+            <a:r>
+              <a:rPr lang="nl"/>
+              <a:t>{#website}{*website}{/website}</a:t>
+            </a:r>
+            <a:endParaRPr/>
+          </a:p>
         </p:txBody>
       </p:sp>
       <p:sp>
@@ -11053,7 +11070,7 @@
             </a:pPr>
             <a:r>
               <a:rPr lang="nl"/>
-              <a:t>Website: {links.website}</a:t>
+              <a:t>{*spacex_website}</a:t>
             </a:r>
             <a:endParaRPr/>
           </a:p>
@@ -11336,6 +11353,23 @@
             </a:r>
             <a:endParaRPr/>
           </a:p>
+          <a:p>
+            <a:pPr indent="-311150" lvl="0" marL="457200" rtl="0" algn="l">
+              <a:spcBef>
+                <a:spcPts val="0"/>
+              </a:spcBef>
+              <a:spcAft>
+                <a:spcPts val="0"/>
+              </a:spcAft>
+              <a:buSzPts val="1300"/>
+              <a:buChar char="●"/>
+            </a:pPr>
+            <a:r>
+              <a:rPr lang="nl"/>
+              <a:t>{*wikipedia}</a:t>
+            </a:r>
+            <a:endParaRPr/>
+          </a:p>
         </p:txBody>
       </p:sp>
       <p:sp>
@@ -11722,7 +11756,7 @@
             </a:pPr>
             <a:r>
               <a:rPr lang="nl"/>
-              <a:t>Wikipedia: {*wikipedia}</a:t>
+              <a:t>Description: {description}</a:t>
             </a:r>
             <a:endParaRPr/>
           </a:p>
@@ -11739,7 +11773,7 @@
             </a:pPr>
             <a:r>
               <a:rPr lang="nl"/>
-              <a:t>Description: {description}</a:t>
+              <a:t>{*wikipedia}</a:t>
             </a:r>
             <a:endParaRPr/>
           </a:p>
@@ -12117,6 +12151,285 @@
 </file>
 
 <file path=ppt/theme/theme1.xml><?xml version="1.0" encoding="utf-8"?>
+<a:theme xmlns:a="http://schemas.openxmlformats.org/drawingml/2006/main" xmlns:r="http://schemas.openxmlformats.org/officeDocument/2006/relationships">
+  <a:themeElements>
+    <a:clrScheme name="Default">
+      <a:dk1>
+        <a:srgbClr val="000000"/>
+      </a:dk1>
+      <a:lt1>
+        <a:srgbClr val="FFFFFF"/>
+      </a:lt1>
+      <a:dk2>
+        <a:srgbClr val="158158"/>
+      </a:dk2>
+      <a:lt2>
+        <a:srgbClr val="F3F3F3"/>
+      </a:lt2>
+      <a:accent1>
+        <a:srgbClr val="058DC7"/>
+      </a:accent1>
+      <a:accent2>
+        <a:srgbClr val="50B432"/>
+      </a:accent2>
+      <a:accent3>
+        <a:srgbClr val="ED561B"/>
+      </a:accent3>
+      <a:accent4>
+        <a:srgbClr val="EDEF00"/>
+      </a:accent4>
+      <a:accent5>
+        <a:srgbClr val="24CBE5"/>
+      </a:accent5>
+      <a:accent6>
+        <a:srgbClr val="64E572"/>
+      </a:accent6>
+      <a:hlink>
+        <a:srgbClr val="2200CC"/>
+      </a:hlink>
+      <a:folHlink>
+        <a:srgbClr val="551A8B"/>
+      </a:folHlink>
+    </a:clrScheme>
+    <a:fontScheme name="Office">
+      <a:majorFont>
+        <a:latin typeface="Arial"/>
+        <a:ea typeface=""/>
+        <a:cs typeface=""/>
+        <a:font script="Jpan" typeface="ＭＳ Ｐゴシック"/>
+        <a:font script="Hang" typeface="맑은 고딕"/>
+        <a:font script="Hans" typeface="宋体"/>
+        <a:font script="Hant" typeface="新細明體"/>
+        <a:font script="Arab" typeface="Times New Roman"/>
+        <a:font script="Hebr" typeface="Times New Roman"/>
+        <a:font script="Thai" typeface="Angsana New"/>
+        <a:font script="Ethi" typeface="Nyala"/>
+        <a:font script="Beng" typeface="Vrinda"/>
+        <a:font script="Gujr" typeface="Shruti"/>
+        <a:font script="Khmr" typeface="MoolBoran"/>
+        <a:font script="Knda" typeface="Tunga"/>
+        <a:font script="Guru" typeface="Raavi"/>
+        <a:font script="Cans" typeface="Euphemia"/>
+        <a:font script="Cher" typeface="Plantagenet Cherokee"/>
+        <a:font script="Yiii" typeface="Microsoft Yi Baiti"/>
+        <a:font script="Tibt" typeface="Microsoft Himalaya"/>
+        <a:font script="Thaa" typeface="MV Boli"/>
+        <a:font script="Deva" typeface="Mangal"/>
+        <a:font script="Telu" typeface="Gautami"/>
+        <a:font script="Taml" typeface="Latha"/>
+        <a:font script="Syrc" typeface="Estrangelo Edessa"/>
+        <a:font script="Orya" typeface="Kalinga"/>
+        <a:font script="Mlym" typeface="Kartika"/>
+        <a:font script="Laoo" typeface="DokChampa"/>
+        <a:font script="Sinh" typeface="Iskoola Pota"/>
+        <a:font script="Mong" typeface="Mongolian Baiti"/>
+        <a:font script="Viet" typeface="Times New Roman"/>
+        <a:font script="Uigh" typeface="Microsoft Uighur"/>
+        <a:font script="Geor" typeface="Sylfaen"/>
+      </a:majorFont>
+      <a:minorFont>
+        <a:latin typeface="Arial"/>
+        <a:ea typeface=""/>
+        <a:cs typeface=""/>
+        <a:font script="Jpan" typeface="ＭＳ Ｐゴシック"/>
+        <a:font script="Hang" typeface="맑은 고딕"/>
+        <a:font script="Hans" typeface="宋体"/>
+        <a:font script="Hant" typeface="新細明體"/>
+        <a:font script="Arab" typeface="Arial"/>
+        <a:font script="Hebr" typeface="Arial"/>
+        <a:font script="Thai" typeface="Cordia New"/>
+        <a:font script="Ethi" typeface="Nyala"/>
+        <a:font script="Beng" typeface="Vrinda"/>
+        <a:font script="Gujr" typeface="Shruti"/>
+        <a:font script="Khmr" typeface="DaunPenh"/>
+        <a:font script="Knda" typeface="Tunga"/>
+        <a:font script="Guru" typeface="Raavi"/>
+        <a:font script="Cans" typeface="Euphemia"/>
+        <a:font script="Cher" typeface="Plantagenet Cherokee"/>
+        <a:font script="Yiii" typeface="Microsoft Yi Baiti"/>
+        <a:font script="Tibt" typeface="Microsoft Himalaya"/>
+        <a:font script="Thaa" typeface="MV Boli"/>
+        <a:font script="Deva" typeface="Mangal"/>
+        <a:font script="Telu" typeface="Gautami"/>
+        <a:font script="Taml" typeface="Latha"/>
+        <a:font script="Syrc" typeface="Estrangelo Edessa"/>
+        <a:font script="Orya" typeface="Kalinga"/>
+        <a:font script="Mlym" typeface="Kartika"/>
+        <a:font script="Laoo" typeface="DokChampa"/>
+        <a:font script="Sinh" typeface="Iskoola Pota"/>
+        <a:font script="Mong" typeface="Mongolian Baiti"/>
+        <a:font script="Viet" typeface="Arial"/>
+        <a:font script="Uigh" typeface="Microsoft Uighur"/>
+        <a:font script="Geor" typeface="Sylfaen"/>
+      </a:minorFont>
+    </a:fontScheme>
+    <a:fmtScheme name="Office">
+      <a:fillStyleLst>
+        <a:solidFill>
+          <a:schemeClr val="phClr"/>
+        </a:solidFill>
+        <a:gradFill rotWithShape="1">
+          <a:gsLst>
+            <a:gs pos="0">
+              <a:schemeClr val="phClr">
+                <a:tint val="50000"/>
+                <a:satMod val="300000"/>
+              </a:schemeClr>
+            </a:gs>
+            <a:gs pos="35000">
+              <a:schemeClr val="phClr">
+                <a:tint val="37000"/>
+                <a:satMod val="300000"/>
+              </a:schemeClr>
+            </a:gs>
+            <a:gs pos="100000">
+              <a:schemeClr val="phClr">
+                <a:tint val="15000"/>
+                <a:satMod val="350000"/>
+              </a:schemeClr>
+            </a:gs>
+          </a:gsLst>
+          <a:lin ang="16200000" scaled="1"/>
+        </a:gradFill>
+        <a:gradFill rotWithShape="1">
+          <a:gsLst>
+            <a:gs pos="0">
+              <a:schemeClr val="phClr">
+                <a:tint val="100000"/>
+                <a:shade val="100000"/>
+                <a:satMod val="130000"/>
+              </a:schemeClr>
+            </a:gs>
+            <a:gs pos="100000">
+              <a:schemeClr val="phClr">
+                <a:tint val="50000"/>
+                <a:shade val="100000"/>
+                <a:satMod val="350000"/>
+              </a:schemeClr>
+            </a:gs>
+          </a:gsLst>
+          <a:lin ang="16200000" scaled="0"/>
+        </a:gradFill>
+      </a:fillStyleLst>
+      <a:lnStyleLst>
+        <a:ln w="9525" cap="flat" cmpd="sng" algn="ctr">
+          <a:solidFill>
+            <a:schemeClr val="phClr">
+              <a:shade val="95000"/>
+              <a:satMod val="105000"/>
+            </a:schemeClr>
+          </a:solidFill>
+          <a:prstDash val="solid"/>
+        </a:ln>
+        <a:ln w="25400" cap="flat" cmpd="sng" algn="ctr">
+          <a:solidFill>
+            <a:schemeClr val="phClr"/>
+          </a:solidFill>
+          <a:prstDash val="solid"/>
+        </a:ln>
+        <a:ln w="38100" cap="flat" cmpd="sng" algn="ctr">
+          <a:solidFill>
+            <a:schemeClr val="phClr"/>
+          </a:solidFill>
+          <a:prstDash val="solid"/>
+        </a:ln>
+      </a:lnStyleLst>
+      <a:effectStyleLst>
+        <a:effectStyle>
+          <a:effectLst>
+            <a:outerShdw blurRad="40000" dist="20000" dir="5400000" rotWithShape="0">
+              <a:srgbClr val="000000">
+                <a:alpha val="38000"/>
+              </a:srgbClr>
+            </a:outerShdw>
+          </a:effectLst>
+        </a:effectStyle>
+        <a:effectStyle>
+          <a:effectLst>
+            <a:outerShdw blurRad="40000" dist="23000" dir="5400000" rotWithShape="0">
+              <a:srgbClr val="000000">
+                <a:alpha val="35000"/>
+              </a:srgbClr>
+            </a:outerShdw>
+          </a:effectLst>
+        </a:effectStyle>
+        <a:effectStyle>
+          <a:effectLst>
+            <a:outerShdw blurRad="40000" dist="23000" dir="5400000" rotWithShape="0">
+              <a:srgbClr val="000000">
+                <a:alpha val="35000"/>
+              </a:srgbClr>
+            </a:outerShdw>
+          </a:effectLst>
+          <a:scene3d>
+            <a:camera prst="orthographicFront">
+              <a:rot lat="0" lon="0" rev="0"/>
+            </a:camera>
+            <a:lightRig rig="threePt" dir="t">
+              <a:rot lat="0" lon="0" rev="1200000"/>
+            </a:lightRig>
+          </a:scene3d>
+          <a:sp3d>
+            <a:bevelT w="63500" h="25400"/>
+          </a:sp3d>
+        </a:effectStyle>
+      </a:effectStyleLst>
+      <a:bgFillStyleLst>
+        <a:solidFill>
+          <a:schemeClr val="phClr"/>
+        </a:solidFill>
+        <a:gradFill rotWithShape="1">
+          <a:gsLst>
+            <a:gs pos="0">
+              <a:schemeClr val="phClr">
+                <a:tint val="40000"/>
+                <a:satMod val="350000"/>
+              </a:schemeClr>
+            </a:gs>
+            <a:gs pos="40000">
+              <a:schemeClr val="phClr">
+                <a:tint val="45000"/>
+                <a:shade val="99000"/>
+                <a:satMod val="350000"/>
+              </a:schemeClr>
+            </a:gs>
+            <a:gs pos="100000">
+              <a:schemeClr val="phClr">
+                <a:shade val="20000"/>
+                <a:satMod val="255000"/>
+              </a:schemeClr>
+            </a:gs>
+          </a:gsLst>
+          <a:path path="circle">
+            <a:fillToRect l="50000" t="-80000" r="50000" b="180000"/>
+          </a:path>
+        </a:gradFill>
+        <a:gradFill rotWithShape="1">
+          <a:gsLst>
+            <a:gs pos="0">
+              <a:schemeClr val="phClr">
+                <a:tint val="80000"/>
+                <a:satMod val="300000"/>
+              </a:schemeClr>
+            </a:gs>
+            <a:gs pos="100000">
+              <a:schemeClr val="phClr">
+                <a:shade val="30000"/>
+                <a:satMod val="200000"/>
+              </a:schemeClr>
+            </a:gs>
+          </a:gsLst>
+          <a:path path="circle">
+            <a:fillToRect l="50000" t="50000" r="50000" b="50000"/>
+          </a:path>
+        </a:gradFill>
+      </a:bgFillStyleLst>
+    </a:fmtScheme>
+  </a:themeElements>
+</a:theme>
+</file>
+
+<file path=ppt/theme/theme2.xml><?xml version="1.0" encoding="utf-8"?>
 <a:theme xmlns:a="http://schemas.openxmlformats.org/drawingml/2006/main" xmlns:r="http://schemas.openxmlformats.org/officeDocument/2006/relationships" name="Shift">
   <a:themeElements>
     <a:clrScheme name="Shift">
@@ -12393,283 +12706,4 @@
     </a:fmtScheme>
   </a:themeElements>
 </a:theme>
-</file>
-
-<file path=ppt/theme/theme2.xml><?xml version="1.0" encoding="utf-8"?>
-<a:theme xmlns:a="http://schemas.openxmlformats.org/drawingml/2006/main" xmlns:r="http://schemas.openxmlformats.org/officeDocument/2006/relationships">
-  <a:themeElements>
-    <a:clrScheme name="Default">
-      <a:dk1>
-        <a:srgbClr val="000000"/>
-      </a:dk1>
-      <a:lt1>
-        <a:srgbClr val="FFFFFF"/>
-      </a:lt1>
-      <a:dk2>
-        <a:srgbClr val="158158"/>
-      </a:dk2>
-      <a:lt2>
-        <a:srgbClr val="F3F3F3"/>
-      </a:lt2>
-      <a:accent1>
-        <a:srgbClr val="058DC7"/>
-      </a:accent1>
-      <a:accent2>
-        <a:srgbClr val="50B432"/>
-      </a:accent2>
-      <a:accent3>
-        <a:srgbClr val="ED561B"/>
-      </a:accent3>
-      <a:accent4>
-        <a:srgbClr val="EDEF00"/>
-      </a:accent4>
-      <a:accent5>
-        <a:srgbClr val="24CBE5"/>
-      </a:accent5>
-      <a:accent6>
-        <a:srgbClr val="64E572"/>
-      </a:accent6>
-      <a:hlink>
-        <a:srgbClr val="2200CC"/>
-      </a:hlink>
-      <a:folHlink>
-        <a:srgbClr val="551A8B"/>
-      </a:folHlink>
-    </a:clrScheme>
-    <a:fontScheme name="Office">
-      <a:majorFont>
-        <a:latin typeface="Arial"/>
-        <a:ea typeface=""/>
-        <a:cs typeface=""/>
-        <a:font script="Jpan" typeface="ＭＳ Ｐゴシック"/>
-        <a:font script="Hang" typeface="맑은 고딕"/>
-        <a:font script="Hans" typeface="宋体"/>
-        <a:font script="Hant" typeface="新細明體"/>
-        <a:font script="Arab" typeface="Times New Roman"/>
-        <a:font script="Hebr" typeface="Times New Roman"/>
-        <a:font script="Thai" typeface="Angsana New"/>
-        <a:font script="Ethi" typeface="Nyala"/>
-        <a:font script="Beng" typeface="Vrinda"/>
-        <a:font script="Gujr" typeface="Shruti"/>
-        <a:font script="Khmr" typeface="MoolBoran"/>
-        <a:font script="Knda" typeface="Tunga"/>
-        <a:font script="Guru" typeface="Raavi"/>
-        <a:font script="Cans" typeface="Euphemia"/>
-        <a:font script="Cher" typeface="Plantagenet Cherokee"/>
-        <a:font script="Yiii" typeface="Microsoft Yi Baiti"/>
-        <a:font script="Tibt" typeface="Microsoft Himalaya"/>
-        <a:font script="Thaa" typeface="MV Boli"/>
-        <a:font script="Deva" typeface="Mangal"/>
-        <a:font script="Telu" typeface="Gautami"/>
-        <a:font script="Taml" typeface="Latha"/>
-        <a:font script="Syrc" typeface="Estrangelo Edessa"/>
-        <a:font script="Orya" typeface="Kalinga"/>
-        <a:font script="Mlym" typeface="Kartika"/>
-        <a:font script="Laoo" typeface="DokChampa"/>
-        <a:font script="Sinh" typeface="Iskoola Pota"/>
-        <a:font script="Mong" typeface="Mongolian Baiti"/>
-        <a:font script="Viet" typeface="Times New Roman"/>
-        <a:font script="Uigh" typeface="Microsoft Uighur"/>
-        <a:font script="Geor" typeface="Sylfaen"/>
-      </a:majorFont>
-      <a:minorFont>
-        <a:latin typeface="Arial"/>
-        <a:ea typeface=""/>
-        <a:cs typeface=""/>
-        <a:font script="Jpan" typeface="ＭＳ Ｐゴシック"/>
-        <a:font script="Hang" typeface="맑은 고딕"/>
-        <a:font script="Hans" typeface="宋体"/>
-        <a:font script="Hant" typeface="新細明體"/>
-        <a:font script="Arab" typeface="Arial"/>
-        <a:font script="Hebr" typeface="Arial"/>
-        <a:font script="Thai" typeface="Cordia New"/>
-        <a:font script="Ethi" typeface="Nyala"/>
-        <a:font script="Beng" typeface="Vrinda"/>
-        <a:font script="Gujr" typeface="Shruti"/>
-        <a:font script="Khmr" typeface="DaunPenh"/>
-        <a:font script="Knda" typeface="Tunga"/>
-        <a:font script="Guru" typeface="Raavi"/>
-        <a:font script="Cans" typeface="Euphemia"/>
-        <a:font script="Cher" typeface="Plantagenet Cherokee"/>
-        <a:font script="Yiii" typeface="Microsoft Yi Baiti"/>
-        <a:font script="Tibt" typeface="Microsoft Himalaya"/>
-        <a:font script="Thaa" typeface="MV Boli"/>
-        <a:font script="Deva" typeface="Mangal"/>
-        <a:font script="Telu" typeface="Gautami"/>
-        <a:font script="Taml" typeface="Latha"/>
-        <a:font script="Syrc" typeface="Estrangelo Edessa"/>
-        <a:font script="Orya" typeface="Kalinga"/>
-        <a:font script="Mlym" typeface="Kartika"/>
-        <a:font script="Laoo" typeface="DokChampa"/>
-        <a:font script="Sinh" typeface="Iskoola Pota"/>
-        <a:font script="Mong" typeface="Mongolian Baiti"/>
-        <a:font script="Viet" typeface="Arial"/>
-        <a:font script="Uigh" typeface="Microsoft Uighur"/>
-        <a:font script="Geor" typeface="Sylfaen"/>
-      </a:minorFont>
-    </a:fontScheme>
-    <a:fmtScheme name="Office">
-      <a:fillStyleLst>
-        <a:solidFill>
-          <a:schemeClr val="phClr"/>
-        </a:solidFill>
-        <a:gradFill rotWithShape="1">
-          <a:gsLst>
-            <a:gs pos="0">
-              <a:schemeClr val="phClr">
-                <a:tint val="50000"/>
-                <a:satMod val="300000"/>
-              </a:schemeClr>
-            </a:gs>
-            <a:gs pos="35000">
-              <a:schemeClr val="phClr">
-                <a:tint val="37000"/>
-                <a:satMod val="300000"/>
-              </a:schemeClr>
-            </a:gs>
-            <a:gs pos="100000">
-              <a:schemeClr val="phClr">
-                <a:tint val="15000"/>
-                <a:satMod val="350000"/>
-              </a:schemeClr>
-            </a:gs>
-          </a:gsLst>
-          <a:lin ang="16200000" scaled="1"/>
-        </a:gradFill>
-        <a:gradFill rotWithShape="1">
-          <a:gsLst>
-            <a:gs pos="0">
-              <a:schemeClr val="phClr">
-                <a:tint val="100000"/>
-                <a:shade val="100000"/>
-                <a:satMod val="130000"/>
-              </a:schemeClr>
-            </a:gs>
-            <a:gs pos="100000">
-              <a:schemeClr val="phClr">
-                <a:tint val="50000"/>
-                <a:shade val="100000"/>
-                <a:satMod val="350000"/>
-              </a:schemeClr>
-            </a:gs>
-          </a:gsLst>
-          <a:lin ang="16200000" scaled="0"/>
-        </a:gradFill>
-      </a:fillStyleLst>
-      <a:lnStyleLst>
-        <a:ln w="9525" cap="flat" cmpd="sng" algn="ctr">
-          <a:solidFill>
-            <a:schemeClr val="phClr">
-              <a:shade val="95000"/>
-              <a:satMod val="105000"/>
-            </a:schemeClr>
-          </a:solidFill>
-          <a:prstDash val="solid"/>
-        </a:ln>
-        <a:ln w="25400" cap="flat" cmpd="sng" algn="ctr">
-          <a:solidFill>
-            <a:schemeClr val="phClr"/>
-          </a:solidFill>
-          <a:prstDash val="solid"/>
-        </a:ln>
-        <a:ln w="38100" cap="flat" cmpd="sng" algn="ctr">
-          <a:solidFill>
-            <a:schemeClr val="phClr"/>
-          </a:solidFill>
-          <a:prstDash val="solid"/>
-        </a:ln>
-      </a:lnStyleLst>
-      <a:effectStyleLst>
-        <a:effectStyle>
-          <a:effectLst>
-            <a:outerShdw blurRad="40000" dist="20000" dir="5400000" rotWithShape="0">
-              <a:srgbClr val="000000">
-                <a:alpha val="38000"/>
-              </a:srgbClr>
-            </a:outerShdw>
-          </a:effectLst>
-        </a:effectStyle>
-        <a:effectStyle>
-          <a:effectLst>
-            <a:outerShdw blurRad="40000" dist="23000" dir="5400000" rotWithShape="0">
-              <a:srgbClr val="000000">
-                <a:alpha val="35000"/>
-              </a:srgbClr>
-            </a:outerShdw>
-          </a:effectLst>
-        </a:effectStyle>
-        <a:effectStyle>
-          <a:effectLst>
-            <a:outerShdw blurRad="40000" dist="23000" dir="5400000" rotWithShape="0">
-              <a:srgbClr val="000000">
-                <a:alpha val="35000"/>
-              </a:srgbClr>
-            </a:outerShdw>
-          </a:effectLst>
-          <a:scene3d>
-            <a:camera prst="orthographicFront">
-              <a:rot lat="0" lon="0" rev="0"/>
-            </a:camera>
-            <a:lightRig rig="threePt" dir="t">
-              <a:rot lat="0" lon="0" rev="1200000"/>
-            </a:lightRig>
-          </a:scene3d>
-          <a:sp3d>
-            <a:bevelT w="63500" h="25400"/>
-          </a:sp3d>
-        </a:effectStyle>
-      </a:effectStyleLst>
-      <a:bgFillStyleLst>
-        <a:solidFill>
-          <a:schemeClr val="phClr"/>
-        </a:solidFill>
-        <a:gradFill rotWithShape="1">
-          <a:gsLst>
-            <a:gs pos="0">
-              <a:schemeClr val="phClr">
-                <a:tint val="40000"/>
-                <a:satMod val="350000"/>
-              </a:schemeClr>
-            </a:gs>
-            <a:gs pos="40000">
-              <a:schemeClr val="phClr">
-                <a:tint val="45000"/>
-                <a:shade val="99000"/>
-                <a:satMod val="350000"/>
-              </a:schemeClr>
-            </a:gs>
-            <a:gs pos="100000">
-              <a:schemeClr val="phClr">
-                <a:shade val="20000"/>
-                <a:satMod val="255000"/>
-              </a:schemeClr>
-            </a:gs>
-          </a:gsLst>
-          <a:path path="circle">
-            <a:fillToRect l="50000" t="-80000" r="50000" b="180000"/>
-          </a:path>
-        </a:gradFill>
-        <a:gradFill rotWithShape="1">
-          <a:gsLst>
-            <a:gs pos="0">
-              <a:schemeClr val="phClr">
-                <a:tint val="80000"/>
-                <a:satMod val="300000"/>
-              </a:schemeClr>
-            </a:gs>
-            <a:gs pos="100000">
-              <a:schemeClr val="phClr">
-                <a:shade val="30000"/>
-                <a:satMod val="200000"/>
-              </a:schemeClr>
-            </a:gs>
-          </a:gsLst>
-          <a:path path="circle">
-            <a:fillToRect l="50000" t="50000" r="50000" b="50000"/>
-          </a:path>
-        </a:gradFill>
-      </a:bgFillStyleLst>
-    </a:fmtScheme>
-  </a:themeElements>
-</a:theme>
 </file>
</xml_diff>